<commit_message>
reordered Module 06 lessons (trees)
</commit_message>
<xml_diff>
--- a/Slides/Lesson 6.4 Lists of Lists.pptx
+++ b/Slides/Lesson 6.4 Lists of Lists.pptx
@@ -5,7 +5,7 @@
     <p:sldMasterId id="2147483660" r:id="rId1"/>
   </p:sldMasterIdLst>
   <p:notesMasterIdLst>
-    <p:notesMasterId r:id="rId30"/>
+    <p:notesMasterId r:id="rId32"/>
   </p:notesMasterIdLst>
   <p:sldIdLst>
     <p:sldId id="256" r:id="rId2"/>
@@ -16,31 +16,33 @@
     <p:sldId id="259" r:id="rId7"/>
     <p:sldId id="260" r:id="rId8"/>
     <p:sldId id="261" r:id="rId9"/>
-    <p:sldId id="262" r:id="rId10"/>
-    <p:sldId id="263" r:id="rId11"/>
-    <p:sldId id="264" r:id="rId12"/>
-    <p:sldId id="282" r:id="rId13"/>
-    <p:sldId id="266" r:id="rId14"/>
-    <p:sldId id="267" r:id="rId15"/>
-    <p:sldId id="268" r:id="rId16"/>
-    <p:sldId id="269" r:id="rId17"/>
-    <p:sldId id="270" r:id="rId18"/>
-    <p:sldId id="284" r:id="rId19"/>
-    <p:sldId id="285" r:id="rId20"/>
-    <p:sldId id="271" r:id="rId21"/>
-    <p:sldId id="272" r:id="rId22"/>
-    <p:sldId id="273" r:id="rId23"/>
-    <p:sldId id="274" r:id="rId24"/>
-    <p:sldId id="275" r:id="rId25"/>
-    <p:sldId id="276" r:id="rId26"/>
-    <p:sldId id="277" r:id="rId27"/>
-    <p:sldId id="278" r:id="rId28"/>
-    <p:sldId id="279" r:id="rId29"/>
+    <p:sldId id="286" r:id="rId10"/>
+    <p:sldId id="287" r:id="rId11"/>
+    <p:sldId id="262" r:id="rId12"/>
+    <p:sldId id="263" r:id="rId13"/>
+    <p:sldId id="264" r:id="rId14"/>
+    <p:sldId id="282" r:id="rId15"/>
+    <p:sldId id="266" r:id="rId16"/>
+    <p:sldId id="267" r:id="rId17"/>
+    <p:sldId id="268" r:id="rId18"/>
+    <p:sldId id="269" r:id="rId19"/>
+    <p:sldId id="270" r:id="rId20"/>
+    <p:sldId id="284" r:id="rId21"/>
+    <p:sldId id="285" r:id="rId22"/>
+    <p:sldId id="271" r:id="rId23"/>
+    <p:sldId id="272" r:id="rId24"/>
+    <p:sldId id="273" r:id="rId25"/>
+    <p:sldId id="274" r:id="rId26"/>
+    <p:sldId id="275" r:id="rId27"/>
+    <p:sldId id="276" r:id="rId28"/>
+    <p:sldId id="277" r:id="rId29"/>
+    <p:sldId id="278" r:id="rId30"/>
+    <p:sldId id="279" r:id="rId31"/>
   </p:sldIdLst>
   <p:sldSz cx="9144000" cy="6858000" type="screen4x3"/>
   <p:notesSz cx="6858000" cy="9144000"/>
   <p:custDataLst>
-    <p:tags r:id="rId31"/>
+    <p:tags r:id="rId33"/>
   </p:custDataLst>
   <p:defaultTextStyle>
     <a:defPPr>
@@ -238,7 +240,7 @@
           <a:p>
             <a:fld id="{1AC50D25-69DA-4251-A3B1-10895C6A89D6}" type="datetimeFigureOut">
               <a:rPr lang="en-US" smtClean="0"/>
-              <a:t>9/7/2016</a:t>
+              <a:t>9/6/2016</a:t>
             </a:fld>
             <a:endParaRPr lang="en-US"/>
           </a:p>
@@ -788,7 +790,7 @@
             <a:fld id="{00E1DFD8-B619-4FFF-B366-BDCC98D08110}" type="slidenum">
               <a:rPr lang="en-US" smtClean="0"/>
               <a:pPr/>
-              <a:t>25</a:t>
+              <a:t>27</a:t>
             </a:fld>
             <a:endParaRPr lang="en-US"/>
           </a:p>
@@ -986,7 +988,7 @@
           <a:p>
             <a:fld id="{2F1F79F5-7BEC-496A-AFC7-876E38F64D71}" type="datetime1">
               <a:rPr lang="en-US" smtClean="0"/>
-              <a:t>9/7/2016</a:t>
+              <a:t>9/6/2016</a:t>
             </a:fld>
             <a:endParaRPr lang="en-US"/>
           </a:p>
@@ -1081,7 +1083,7 @@
           <a:p>
             <a:fld id="{0A05703A-7669-4FEA-9056-25299B4D29D4}" type="datetime1">
               <a:rPr lang="en-US" smtClean="0"/>
-              <a:t>9/7/2016</a:t>
+              <a:t>9/6/2016</a:t>
             </a:fld>
             <a:endParaRPr lang="en-US"/>
           </a:p>
@@ -1356,7 +1358,7 @@
           <a:p>
             <a:fld id="{6E5077B5-BB57-49DB-88CA-226A139E5C01}" type="datetime1">
               <a:rPr lang="en-US" smtClean="0"/>
-              <a:t>9/7/2016</a:t>
+              <a:t>9/6/2016</a:t>
             </a:fld>
             <a:endParaRPr lang="en-US"/>
           </a:p>
@@ -1608,7 +1610,7 @@
           <a:p>
             <a:fld id="{C48D9447-CBD6-49A1-89FD-8512A8CF8999}" type="datetime1">
               <a:rPr lang="en-US" smtClean="0"/>
-              <a:t>9/7/2016</a:t>
+              <a:t>9/6/2016</a:t>
             </a:fld>
             <a:endParaRPr lang="en-US"/>
           </a:p>
@@ -1776,7 +1778,7 @@
           <a:p>
             <a:fld id="{A3639A2A-823D-48B7-9ACE-7FAF42870BA9}" type="datetime1">
               <a:rPr lang="en-US" smtClean="0"/>
-              <a:t>9/7/2016</a:t>
+              <a:t>9/6/2016</a:t>
             </a:fld>
             <a:endParaRPr lang="en-US"/>
           </a:p>
@@ -1954,7 +1956,7 @@
           <a:p>
             <a:fld id="{ED1B6996-82E9-463C-972C-7B56056E426C}" type="datetime1">
               <a:rPr lang="en-US" smtClean="0"/>
-              <a:t>9/7/2016</a:t>
+              <a:t>9/6/2016</a:t>
             </a:fld>
             <a:endParaRPr lang="en-US"/>
           </a:p>
@@ -2128,7 +2130,7 @@
           <a:p>
             <a:fld id="{E22ED4DA-448D-4BB1-B935-CC112220207B}" type="datetime1">
               <a:rPr lang="en-US" smtClean="0"/>
-              <a:t>9/7/2016</a:t>
+              <a:t>9/6/2016</a:t>
             </a:fld>
             <a:endParaRPr lang="en-US"/>
           </a:p>
@@ -2301,7 +2303,7 @@
           <a:p>
             <a:fld id="{E22ED4DA-448D-4BB1-B935-CC112220207B}" type="datetime1">
               <a:rPr lang="en-US" smtClean="0"/>
-              <a:t>9/7/2016</a:t>
+              <a:t>9/6/2016</a:t>
             </a:fld>
             <a:endParaRPr lang="en-US"/>
           </a:p>
@@ -2561,7 +2563,7 @@
           <a:p>
             <a:fld id="{FF5D65A6-AB94-4435-B0B7-3743215FA46C}" type="datetime1">
               <a:rPr lang="en-US" smtClean="0"/>
-              <a:t>9/7/2016</a:t>
+              <a:t>9/6/2016</a:t>
             </a:fld>
             <a:endParaRPr lang="en-US"/>
           </a:p>
@@ -2737,7 +2739,7 @@
           <a:p>
             <a:fld id="{FF5D65A6-AB94-4435-B0B7-3743215FA46C}" type="datetime1">
               <a:rPr lang="en-US" smtClean="0"/>
-              <a:t>9/7/2016</a:t>
+              <a:t>9/6/2016</a:t>
             </a:fld>
             <a:endParaRPr lang="en-US"/>
           </a:p>
@@ -3031,7 +3033,7 @@
           <a:p>
             <a:fld id="{7C193DC4-6EF0-48C9-B29C-616106A645E1}" type="datetime1">
               <a:rPr lang="en-US" smtClean="0"/>
-              <a:t>9/7/2016</a:t>
+              <a:t>9/6/2016</a:t>
             </a:fld>
             <a:endParaRPr lang="en-US"/>
           </a:p>
@@ -3316,7 +3318,7 @@
           <a:p>
             <a:fld id="{5D1846AD-9252-4647-9435-4C2AC365653A}" type="datetime1">
               <a:rPr lang="en-US" smtClean="0"/>
-              <a:t>9/7/2016</a:t>
+              <a:t>9/6/2016</a:t>
             </a:fld>
             <a:endParaRPr lang="en-US"/>
           </a:p>
@@ -3735,7 +3737,7 @@
           <a:p>
             <a:fld id="{CE56DC10-3561-4063-A6AF-C1CC7A41040A}" type="datetime1">
               <a:rPr lang="en-US" smtClean="0"/>
-              <a:t>9/7/2016</a:t>
+              <a:t>9/6/2016</a:t>
             </a:fld>
             <a:endParaRPr lang="en-US"/>
           </a:p>
@@ -3852,7 +3854,7 @@
           <a:p>
             <a:fld id="{2F7B77F5-1464-4F6B-92A8-64FC8A508293}" type="datetime1">
               <a:rPr lang="en-US" smtClean="0"/>
-              <a:t>9/7/2016</a:t>
+              <a:t>9/6/2016</a:t>
             </a:fld>
             <a:endParaRPr lang="en-US"/>
           </a:p>
@@ -4075,7 +4077,7 @@
           <a:p>
             <a:fld id="{02B3F677-983B-48DB-ADFD-63FE6CBC7FB2}" type="datetime1">
               <a:rPr lang="en-US" smtClean="0"/>
-              <a:t>9/7/2016</a:t>
+              <a:t>9/6/2016</a:t>
             </a:fld>
             <a:endParaRPr lang="en-US"/>
           </a:p>
@@ -4700,6 +4702,1570 @@
           <a:p>
             <a:r>
               <a:rPr lang="en-US" dirty="0"/>
+              <a:t>Elaborating the Data Definition (2)</a:t>
+            </a:r>
+          </a:p>
+        </p:txBody>
+      </p:sp>
+      <p:sp>
+        <p:nvSpPr>
+          <p:cNvPr id="5" name="Content Placeholder 4"/>
+          <p:cNvSpPr>
+            <a:spLocks noGrp="1"/>
+          </p:cNvSpPr>
+          <p:nvPr>
+            <p:ph idx="1"/>
+          </p:nvPr>
+        </p:nvSpPr>
+        <p:spPr/>
+        <p:txBody>
+          <a:bodyPr>
+            <a:normAutofit fontScale="32500" lnSpcReduction="20000"/>
+          </a:bodyPr>
+          <a:lstStyle/>
+          <a:p>
+            <a:r>
+              <a:rPr lang="en-US" dirty="0" err="1"/>
+              <a:t>SoS</a:t>
+            </a:r>
+            <a:endParaRPr lang="en-US" dirty="0"/>
+          </a:p>
+          <a:p>
+            <a:r>
+              <a:rPr lang="en-US" dirty="0">
+                <a:solidFill>
+                  <a:srgbClr val="FF0000"/>
+                </a:solidFill>
+              </a:rPr>
+              <a:t>-&gt;</a:t>
+            </a:r>
+            <a:r>
+              <a:rPr lang="en-US" dirty="0"/>
+              <a:t> </a:t>
+            </a:r>
+            <a:r>
+              <a:rPr lang="en-US" dirty="0" err="1"/>
+              <a:t>LoSS</a:t>
+            </a:r>
+            <a:endParaRPr lang="en-US" dirty="0"/>
+          </a:p>
+          <a:p>
+            <a:r>
+              <a:rPr lang="en-US" dirty="0"/>
+              <a:t>-&gt; (cons </a:t>
+            </a:r>
+            <a:r>
+              <a:rPr lang="en-US" dirty="0" err="1"/>
+              <a:t>SoS</a:t>
+            </a:r>
+            <a:r>
+              <a:rPr lang="en-US" dirty="0"/>
+              <a:t> </a:t>
+            </a:r>
+            <a:r>
+              <a:rPr lang="en-US" dirty="0" err="1"/>
+              <a:t>LoSS</a:t>
+            </a:r>
+            <a:r>
+              <a:rPr lang="en-US" dirty="0"/>
+              <a:t>)</a:t>
+            </a:r>
+          </a:p>
+          <a:p>
+            <a:r>
+              <a:rPr lang="en-US" dirty="0">
+                <a:solidFill>
+                  <a:srgbClr val="FF0000"/>
+                </a:solidFill>
+              </a:rPr>
+              <a:t>-&gt;</a:t>
+            </a:r>
+            <a:r>
+              <a:rPr lang="en-US" dirty="0"/>
+              <a:t> (cons </a:t>
+            </a:r>
+            <a:r>
+              <a:rPr lang="en-US" dirty="0" err="1"/>
+              <a:t>LoSS</a:t>
+            </a:r>
+            <a:r>
+              <a:rPr lang="en-US" dirty="0"/>
+              <a:t> </a:t>
+            </a:r>
+            <a:r>
+              <a:rPr lang="en-US" dirty="0" err="1"/>
+              <a:t>LoSS</a:t>
+            </a:r>
+            <a:r>
+              <a:rPr lang="en-US" dirty="0"/>
+              <a:t>)</a:t>
+            </a:r>
+          </a:p>
+          <a:p>
+            <a:r>
+              <a:rPr lang="en-US" dirty="0"/>
+              <a:t>-&gt; (cons (cons </a:t>
+            </a:r>
+            <a:r>
+              <a:rPr lang="en-US" dirty="0" err="1"/>
+              <a:t>SoS</a:t>
+            </a:r>
+            <a:r>
+              <a:rPr lang="en-US" dirty="0"/>
+              <a:t> </a:t>
+            </a:r>
+            <a:r>
+              <a:rPr lang="en-US" dirty="0" err="1"/>
+              <a:t>LoSS</a:t>
+            </a:r>
+            <a:r>
+              <a:rPr lang="en-US" dirty="0"/>
+              <a:t>)</a:t>
+            </a:r>
+          </a:p>
+          <a:p>
+            <a:r>
+              <a:rPr lang="en-US" dirty="0"/>
+              <a:t>         </a:t>
+            </a:r>
+            <a:r>
+              <a:rPr lang="en-US" dirty="0" err="1"/>
+              <a:t>LoSS</a:t>
+            </a:r>
+            <a:r>
+              <a:rPr lang="en-US" dirty="0"/>
+              <a:t>)</a:t>
+            </a:r>
+          </a:p>
+          <a:p>
+            <a:r>
+              <a:rPr lang="en-US" dirty="0">
+                <a:solidFill>
+                  <a:srgbClr val="FF0000"/>
+                </a:solidFill>
+              </a:rPr>
+              <a:t>-&gt;</a:t>
+            </a:r>
+            <a:r>
+              <a:rPr lang="en-US" dirty="0"/>
+              <a:t> (cons (cons </a:t>
+            </a:r>
+            <a:r>
+              <a:rPr lang="en-US" dirty="0" err="1"/>
+              <a:t>LoSS</a:t>
+            </a:r>
+            <a:r>
+              <a:rPr lang="en-US" dirty="0"/>
+              <a:t> </a:t>
+            </a:r>
+            <a:r>
+              <a:rPr lang="en-US" dirty="0" err="1"/>
+              <a:t>LoSS</a:t>
+            </a:r>
+            <a:r>
+              <a:rPr lang="en-US" dirty="0"/>
+              <a:t>)</a:t>
+            </a:r>
+          </a:p>
+          <a:p>
+            <a:r>
+              <a:rPr lang="en-US" dirty="0"/>
+              <a:t>         </a:t>
+            </a:r>
+            <a:r>
+              <a:rPr lang="en-US" dirty="0" err="1"/>
+              <a:t>LoSS</a:t>
+            </a:r>
+            <a:r>
+              <a:rPr lang="en-US" dirty="0"/>
+              <a:t>)</a:t>
+            </a:r>
+          </a:p>
+          <a:p>
+            <a:r>
+              <a:rPr lang="en-US" dirty="0">
+                <a:solidFill>
+                  <a:srgbClr val="FF0000"/>
+                </a:solidFill>
+              </a:rPr>
+              <a:t>-&gt; </a:t>
+            </a:r>
+            <a:r>
+              <a:rPr lang="en-US" dirty="0"/>
+              <a:t>(cons (cons String </a:t>
+            </a:r>
+            <a:r>
+              <a:rPr lang="en-US" dirty="0" err="1"/>
+              <a:t>LoSS</a:t>
+            </a:r>
+            <a:r>
+              <a:rPr lang="en-US" dirty="0"/>
+              <a:t>)</a:t>
+            </a:r>
+          </a:p>
+          <a:p>
+            <a:r>
+              <a:rPr lang="en-US" dirty="0"/>
+              <a:t>         </a:t>
+            </a:r>
+            <a:r>
+              <a:rPr lang="en-US" dirty="0" err="1"/>
+              <a:t>LoSS</a:t>
+            </a:r>
+            <a:r>
+              <a:rPr lang="en-US" dirty="0"/>
+              <a:t>)</a:t>
+            </a:r>
+          </a:p>
+          <a:p>
+            <a:r>
+              <a:rPr lang="en-US" dirty="0">
+                <a:solidFill>
+                  <a:srgbClr val="FF0000"/>
+                </a:solidFill>
+              </a:rPr>
+              <a:t>-&gt;</a:t>
+            </a:r>
+            <a:r>
+              <a:rPr lang="en-US" dirty="0"/>
+              <a:t> (cons (cons "</a:t>
+            </a:r>
+            <a:r>
+              <a:rPr lang="en-US" dirty="0" err="1"/>
+              <a:t>alice</a:t>
+            </a:r>
+            <a:r>
+              <a:rPr lang="en-US" dirty="0"/>
+              <a:t>" </a:t>
+            </a:r>
+            <a:r>
+              <a:rPr lang="en-US" dirty="0" err="1"/>
+              <a:t>LoSS</a:t>
+            </a:r>
+            <a:r>
+              <a:rPr lang="en-US" dirty="0"/>
+              <a:t>)</a:t>
+            </a:r>
+          </a:p>
+          <a:p>
+            <a:r>
+              <a:rPr lang="en-US" dirty="0"/>
+              <a:t>         </a:t>
+            </a:r>
+            <a:r>
+              <a:rPr lang="en-US" dirty="0" err="1"/>
+              <a:t>LoSS</a:t>
+            </a:r>
+            <a:r>
+              <a:rPr lang="en-US" dirty="0"/>
+              <a:t>)</a:t>
+            </a:r>
+          </a:p>
+          <a:p>
+            <a:r>
+              <a:rPr lang="en-US" dirty="0"/>
+              <a:t>-&gt; (cons (cons "</a:t>
+            </a:r>
+            <a:r>
+              <a:rPr lang="en-US" dirty="0" err="1"/>
+              <a:t>alice</a:t>
+            </a:r>
+            <a:r>
+              <a:rPr lang="en-US" dirty="0"/>
+              <a:t>" (cons </a:t>
+            </a:r>
+            <a:r>
+              <a:rPr lang="en-US" dirty="0" err="1"/>
+              <a:t>SoS</a:t>
+            </a:r>
+            <a:r>
+              <a:rPr lang="en-US" dirty="0"/>
+              <a:t> </a:t>
+            </a:r>
+            <a:r>
+              <a:rPr lang="en-US" dirty="0" err="1"/>
+              <a:t>LoSS</a:t>
+            </a:r>
+            <a:r>
+              <a:rPr lang="en-US" dirty="0"/>
+              <a:t>))</a:t>
+            </a:r>
+          </a:p>
+          <a:p>
+            <a:r>
+              <a:rPr lang="en-US" dirty="0"/>
+              <a:t>         </a:t>
+            </a:r>
+            <a:r>
+              <a:rPr lang="en-US" dirty="0" err="1"/>
+              <a:t>LoSS</a:t>
+            </a:r>
+            <a:r>
+              <a:rPr lang="en-US" dirty="0"/>
+              <a:t>)</a:t>
+            </a:r>
+          </a:p>
+          <a:p>
+            <a:r>
+              <a:rPr lang="en-US" dirty="0">
+                <a:solidFill>
+                  <a:srgbClr val="FF0000"/>
+                </a:solidFill>
+              </a:rPr>
+              <a:t>-&gt;</a:t>
+            </a:r>
+            <a:r>
+              <a:rPr lang="en-US" dirty="0"/>
+              <a:t> (cons (cons "</a:t>
+            </a:r>
+            <a:r>
+              <a:rPr lang="en-US" dirty="0" err="1"/>
+              <a:t>alice</a:t>
+            </a:r>
+            <a:r>
+              <a:rPr lang="en-US" dirty="0"/>
+              <a:t>" (cons String </a:t>
+            </a:r>
+            <a:r>
+              <a:rPr lang="en-US" dirty="0" err="1"/>
+              <a:t>LoSS</a:t>
+            </a:r>
+            <a:r>
+              <a:rPr lang="en-US" dirty="0"/>
+              <a:t>))</a:t>
+            </a:r>
+          </a:p>
+          <a:p>
+            <a:r>
+              <a:rPr lang="en-US" dirty="0"/>
+              <a:t>         </a:t>
+            </a:r>
+            <a:r>
+              <a:rPr lang="en-US" dirty="0" err="1"/>
+              <a:t>LoSS</a:t>
+            </a:r>
+            <a:r>
+              <a:rPr lang="en-US" dirty="0"/>
+              <a:t>)</a:t>
+            </a:r>
+          </a:p>
+          <a:p>
+            <a:r>
+              <a:rPr lang="en-US" dirty="0">
+                <a:solidFill>
+                  <a:srgbClr val="FF0000"/>
+                </a:solidFill>
+              </a:rPr>
+              <a:t>-&gt;</a:t>
+            </a:r>
+            <a:r>
+              <a:rPr lang="en-US" dirty="0"/>
+              <a:t> (cons (cons "</a:t>
+            </a:r>
+            <a:r>
+              <a:rPr lang="en-US" dirty="0" err="1"/>
+              <a:t>alice</a:t>
+            </a:r>
+            <a:r>
+              <a:rPr lang="en-US" dirty="0"/>
+              <a:t>" (cons "bob" </a:t>
+            </a:r>
+            <a:r>
+              <a:rPr lang="en-US" dirty="0" err="1"/>
+              <a:t>LoSS</a:t>
+            </a:r>
+            <a:r>
+              <a:rPr lang="en-US" dirty="0"/>
+              <a:t>))</a:t>
+            </a:r>
+          </a:p>
+          <a:p>
+            <a:r>
+              <a:rPr lang="en-US" dirty="0"/>
+              <a:t>         </a:t>
+            </a:r>
+            <a:r>
+              <a:rPr lang="en-US" dirty="0" err="1"/>
+              <a:t>LoSS</a:t>
+            </a:r>
+            <a:r>
+              <a:rPr lang="en-US" dirty="0"/>
+              <a:t>)</a:t>
+            </a:r>
+          </a:p>
+          <a:p>
+            <a:r>
+              <a:rPr lang="en-US" dirty="0">
+                <a:solidFill>
+                  <a:srgbClr val="FF0000"/>
+                </a:solidFill>
+              </a:rPr>
+              <a:t>-&gt;</a:t>
+            </a:r>
+            <a:r>
+              <a:rPr lang="en-US" dirty="0"/>
+              <a:t> (cons (cons "</a:t>
+            </a:r>
+            <a:r>
+              <a:rPr lang="en-US" dirty="0" err="1"/>
+              <a:t>alice</a:t>
+            </a:r>
+            <a:r>
+              <a:rPr lang="en-US" dirty="0"/>
+              <a:t>" (cons "bob" empty))</a:t>
+            </a:r>
+          </a:p>
+          <a:p>
+            <a:r>
+              <a:rPr lang="en-US" dirty="0"/>
+              <a:t>         </a:t>
+            </a:r>
+            <a:r>
+              <a:rPr lang="en-US" dirty="0" err="1"/>
+              <a:t>LoSS</a:t>
+            </a:r>
+            <a:r>
+              <a:rPr lang="en-US" dirty="0"/>
+              <a:t>)</a:t>
+            </a:r>
+          </a:p>
+          <a:p>
+            <a:r>
+              <a:rPr lang="en-US" dirty="0"/>
+              <a:t>-&gt; (cons (cons "</a:t>
+            </a:r>
+            <a:r>
+              <a:rPr lang="en-US" dirty="0" err="1"/>
+              <a:t>alice</a:t>
+            </a:r>
+            <a:r>
+              <a:rPr lang="en-US" dirty="0"/>
+              <a:t>" (cons "bob" empty))</a:t>
+            </a:r>
+          </a:p>
+          <a:p>
+            <a:r>
+              <a:rPr lang="en-US" dirty="0"/>
+              <a:t>         (cons </a:t>
+            </a:r>
+            <a:r>
+              <a:rPr lang="en-US" dirty="0" err="1"/>
+              <a:t>SoS</a:t>
+            </a:r>
+            <a:r>
+              <a:rPr lang="en-US" dirty="0"/>
+              <a:t> </a:t>
+            </a:r>
+            <a:r>
+              <a:rPr lang="en-US" dirty="0" err="1"/>
+              <a:t>LoSS</a:t>
+            </a:r>
+            <a:r>
+              <a:rPr lang="en-US" dirty="0"/>
+              <a:t>))</a:t>
+            </a:r>
+          </a:p>
+          <a:p>
+            <a:r>
+              <a:rPr lang="en-US" dirty="0">
+                <a:solidFill>
+                  <a:srgbClr val="FF0000"/>
+                </a:solidFill>
+              </a:rPr>
+              <a:t>-&gt;</a:t>
+            </a:r>
+            <a:r>
+              <a:rPr lang="en-US" dirty="0"/>
+              <a:t> (cons (cons "</a:t>
+            </a:r>
+            <a:r>
+              <a:rPr lang="en-US" dirty="0" err="1"/>
+              <a:t>alice</a:t>
+            </a:r>
+            <a:r>
+              <a:rPr lang="en-US" dirty="0"/>
+              <a:t>" (cons "bob" empty))</a:t>
+            </a:r>
+          </a:p>
+          <a:p>
+            <a:r>
+              <a:rPr lang="en-US" dirty="0"/>
+              <a:t>         (cons String </a:t>
+            </a:r>
+            <a:r>
+              <a:rPr lang="en-US" dirty="0" err="1"/>
+              <a:t>LoSS</a:t>
+            </a:r>
+            <a:r>
+              <a:rPr lang="en-US" dirty="0"/>
+              <a:t>))</a:t>
+            </a:r>
+          </a:p>
+          <a:p>
+            <a:r>
+              <a:rPr lang="en-US" dirty="0">
+                <a:solidFill>
+                  <a:srgbClr val="FF0000"/>
+                </a:solidFill>
+              </a:rPr>
+              <a:t>-&gt;</a:t>
+            </a:r>
+            <a:r>
+              <a:rPr lang="en-US" dirty="0"/>
+              <a:t> (cons (cons "</a:t>
+            </a:r>
+            <a:r>
+              <a:rPr lang="en-US" dirty="0" err="1"/>
+              <a:t>alice</a:t>
+            </a:r>
+            <a:r>
+              <a:rPr lang="en-US" dirty="0"/>
+              <a:t>" (cons "bob" empty))</a:t>
+            </a:r>
+          </a:p>
+          <a:p>
+            <a:r>
+              <a:rPr lang="en-US" dirty="0"/>
+              <a:t>         (cons "</a:t>
+            </a:r>
+            <a:r>
+              <a:rPr lang="en-US" dirty="0" err="1"/>
+              <a:t>carole</a:t>
+            </a:r>
+            <a:r>
+              <a:rPr lang="en-US" dirty="0"/>
+              <a:t>" </a:t>
+            </a:r>
+            <a:r>
+              <a:rPr lang="en-US" dirty="0" err="1"/>
+              <a:t>LoSS</a:t>
+            </a:r>
+            <a:r>
+              <a:rPr lang="en-US" dirty="0"/>
+              <a:t>))</a:t>
+            </a:r>
+          </a:p>
+          <a:p>
+            <a:r>
+              <a:rPr lang="en-US" dirty="0">
+                <a:solidFill>
+                  <a:srgbClr val="FF0000"/>
+                </a:solidFill>
+              </a:rPr>
+              <a:t>-&gt;</a:t>
+            </a:r>
+            <a:r>
+              <a:rPr lang="en-US" dirty="0"/>
+              <a:t> (cons (cons "</a:t>
+            </a:r>
+            <a:r>
+              <a:rPr lang="en-US" dirty="0" err="1"/>
+              <a:t>alice</a:t>
+            </a:r>
+            <a:r>
+              <a:rPr lang="en-US" dirty="0"/>
+              <a:t>" (cons "bob" empty))</a:t>
+            </a:r>
+          </a:p>
+          <a:p>
+            <a:r>
+              <a:rPr lang="en-US" dirty="0"/>
+              <a:t>         (cons "</a:t>
+            </a:r>
+            <a:r>
+              <a:rPr lang="en-US" dirty="0" err="1"/>
+              <a:t>carole</a:t>
+            </a:r>
+            <a:r>
+              <a:rPr lang="en-US" dirty="0"/>
+              <a:t>" empty))</a:t>
+            </a:r>
+          </a:p>
+        </p:txBody>
+      </p:sp>
+      <p:sp>
+        <p:nvSpPr>
+          <p:cNvPr id="4" name="Slide Number Placeholder 3"/>
+          <p:cNvSpPr>
+            <a:spLocks noGrp="1"/>
+          </p:cNvSpPr>
+          <p:nvPr>
+            <p:ph type="sldNum" sz="quarter" idx="12"/>
+          </p:nvPr>
+        </p:nvSpPr>
+        <p:spPr/>
+        <p:txBody>
+          <a:bodyPr/>
+          <a:lstStyle/>
+          <a:p>
+            <a:fld id="{2AF3B5EA-18B6-4040-9F78-6052AF49C681}" type="slidenum">
+              <a:rPr lang="en-US" smtClean="0"/>
+              <a:t>10</a:t>
+            </a:fld>
+            <a:endParaRPr lang="en-US"/>
+          </a:p>
+        </p:txBody>
+      </p:sp>
+      <p:sp>
+        <p:nvSpPr>
+          <p:cNvPr id="6" name="Rectangle 5"/>
+          <p:cNvSpPr/>
+          <p:nvPr/>
+        </p:nvSpPr>
+        <p:spPr>
+          <a:xfrm>
+            <a:off x="838200" y="6051550"/>
+            <a:ext cx="1295400" cy="609600"/>
+          </a:xfrm>
+          <a:prstGeom prst="rect">
+            <a:avLst/>
+          </a:prstGeom>
+          <a:solidFill>
+            <a:schemeClr val="accent3">
+              <a:lumMod val="40000"/>
+              <a:lumOff val="60000"/>
+            </a:schemeClr>
+          </a:solidFill>
+          <a:ln/>
+        </p:spPr>
+        <p:style>
+          <a:lnRef idx="2">
+            <a:schemeClr val="accent1"/>
+          </a:lnRef>
+          <a:fillRef idx="1">
+            <a:schemeClr val="lt1"/>
+          </a:fillRef>
+          <a:effectRef idx="0">
+            <a:schemeClr val="accent1"/>
+          </a:effectRef>
+          <a:fontRef idx="minor">
+            <a:schemeClr val="dk1"/>
+          </a:fontRef>
+        </p:style>
+        <p:txBody>
+          <a:bodyPr rot="0" spcFirstLastPara="0" vertOverflow="overflow" horzOverflow="overflow" vert="horz" wrap="square" lIns="91440" tIns="45720" rIns="91440" bIns="45720" numCol="1" spcCol="0" rtlCol="0" fromWordArt="0" anchor="ctr" anchorCtr="0" forceAA="0" compatLnSpc="1">
+            <a:prstTxWarp prst="textNoShape">
+              <a:avLst/>
+            </a:prstTxWarp>
+            <a:noAutofit/>
+          </a:bodyPr>
+          <a:lstStyle/>
+          <a:p>
+            <a:pPr algn="ctr"/>
+            <a:r>
+              <a:rPr lang="en-US" dirty="0">
+                <a:solidFill>
+                  <a:schemeClr val="tx1"/>
+                </a:solidFill>
+              </a:rPr>
+              <a:t>15 steps!</a:t>
+            </a:r>
+          </a:p>
+        </p:txBody>
+      </p:sp>
+      <p:sp>
+        <p:nvSpPr>
+          <p:cNvPr id="7" name="Rectangle 6"/>
+          <p:cNvSpPr/>
+          <p:nvPr/>
+        </p:nvSpPr>
+        <p:spPr>
+          <a:xfrm>
+            <a:off x="4572000" y="1828799"/>
+            <a:ext cx="3581400" cy="4832351"/>
+          </a:xfrm>
+          <a:prstGeom prst="rect">
+            <a:avLst/>
+          </a:prstGeom>
+          <a:solidFill>
+            <a:schemeClr val="accent3">
+              <a:lumMod val="40000"/>
+              <a:lumOff val="60000"/>
+            </a:schemeClr>
+          </a:solidFill>
+          <a:ln/>
+        </p:spPr>
+        <p:style>
+          <a:lnRef idx="2">
+            <a:schemeClr val="accent1"/>
+          </a:lnRef>
+          <a:fillRef idx="1">
+            <a:schemeClr val="lt1"/>
+          </a:fillRef>
+          <a:effectRef idx="0">
+            <a:schemeClr val="accent1"/>
+          </a:effectRef>
+          <a:fontRef idx="minor">
+            <a:schemeClr val="dk1"/>
+          </a:fontRef>
+        </p:style>
+        <p:txBody>
+          <a:bodyPr rot="0" spcFirstLastPara="0" vertOverflow="overflow" horzOverflow="overflow" vert="horz" wrap="square" lIns="91440" tIns="45720" rIns="91440" bIns="45720" numCol="1" spcCol="0" rtlCol="0" fromWordArt="0" anchor="t" anchorCtr="0" forceAA="0" compatLnSpc="1">
+            <a:prstTxWarp prst="textNoShape">
+              <a:avLst/>
+            </a:prstTxWarp>
+            <a:noAutofit/>
+          </a:bodyPr>
+          <a:lstStyle/>
+          <a:p>
+            <a:r>
+              <a:rPr lang="en-US" dirty="0">
+                <a:solidFill>
+                  <a:schemeClr val="tx1"/>
+                </a:solidFill>
+              </a:rPr>
+              <a:t>A data definition is like a grammar.  Here we’ve written out the derivation of our cons-expression in the grammar.</a:t>
+            </a:r>
+          </a:p>
+          <a:p>
+            <a:endParaRPr lang="en-US" dirty="0">
+              <a:solidFill>
+                <a:schemeClr val="tx1"/>
+              </a:solidFill>
+            </a:endParaRPr>
+          </a:p>
+          <a:p>
+            <a:r>
+              <a:rPr lang="en-US" dirty="0">
+                <a:solidFill>
+                  <a:schemeClr val="tx1"/>
+                </a:solidFill>
+              </a:rPr>
+              <a:t>This may seem like overkill now, but </a:t>
+            </a:r>
+          </a:p>
+          <a:p>
+            <a:r>
+              <a:rPr lang="en-US" dirty="0">
+                <a:solidFill>
+                  <a:schemeClr val="tx1"/>
+                </a:solidFill>
+              </a:rPr>
+              <a:t>we will need this level of detail when we think about halting measures for functions on S-expressions.</a:t>
+            </a:r>
+          </a:p>
+          <a:p>
+            <a:endParaRPr lang="en-US" dirty="0">
+              <a:solidFill>
+                <a:schemeClr val="tx1"/>
+              </a:solidFill>
+            </a:endParaRPr>
+          </a:p>
+          <a:p>
+            <a:r>
+              <a:rPr lang="en-US" dirty="0">
+                <a:solidFill>
+                  <a:schemeClr val="tx1"/>
+                </a:solidFill>
+              </a:rPr>
+              <a:t>Note that many of the steps (the ones marked in red) don’t make the expression any bigger.  These correspond to “chain productions” in the grammar, like </a:t>
+            </a:r>
+            <a:r>
+              <a:rPr lang="en-US" b="1" dirty="0" err="1">
+                <a:solidFill>
+                  <a:schemeClr val="tx1"/>
+                </a:solidFill>
+              </a:rPr>
+              <a:t>SoS</a:t>
+            </a:r>
+            <a:r>
+              <a:rPr lang="en-US" b="1" dirty="0">
+                <a:solidFill>
+                  <a:schemeClr val="tx1"/>
+                </a:solidFill>
+              </a:rPr>
+              <a:t> </a:t>
+            </a:r>
+            <a:r>
+              <a:rPr lang="en-US" b="1" dirty="0">
+                <a:solidFill>
+                  <a:schemeClr val="tx1"/>
+                </a:solidFill>
+                <a:sym typeface="Wingdings" panose="05000000000000000000" pitchFamily="2" charset="2"/>
+              </a:rPr>
+              <a:t> </a:t>
+            </a:r>
+            <a:r>
+              <a:rPr lang="en-US" b="1" dirty="0" err="1">
+                <a:solidFill>
+                  <a:schemeClr val="tx1"/>
+                </a:solidFill>
+                <a:sym typeface="Wingdings" panose="05000000000000000000" pitchFamily="2" charset="2"/>
+              </a:rPr>
+              <a:t>LoSS</a:t>
+            </a:r>
+            <a:r>
+              <a:rPr lang="en-US" b="1" dirty="0">
+                <a:solidFill>
+                  <a:schemeClr val="tx1"/>
+                </a:solidFill>
+                <a:sym typeface="Wingdings" panose="05000000000000000000" pitchFamily="2" charset="2"/>
+              </a:rPr>
+              <a:t> </a:t>
+            </a:r>
+            <a:r>
+              <a:rPr lang="en-US" dirty="0">
+                <a:solidFill>
+                  <a:schemeClr val="tx1"/>
+                </a:solidFill>
+                <a:sym typeface="Wingdings" panose="05000000000000000000" pitchFamily="2" charset="2"/>
+              </a:rPr>
+              <a:t>or </a:t>
+            </a:r>
+            <a:r>
+              <a:rPr lang="en-US" b="1" dirty="0" err="1">
+                <a:solidFill>
+                  <a:schemeClr val="tx1"/>
+                </a:solidFill>
+                <a:sym typeface="Wingdings" panose="05000000000000000000" pitchFamily="2" charset="2"/>
+              </a:rPr>
+              <a:t>SoS</a:t>
+            </a:r>
+            <a:r>
+              <a:rPr lang="en-US" b="1" dirty="0">
+                <a:solidFill>
+                  <a:schemeClr val="tx1"/>
+                </a:solidFill>
+                <a:sym typeface="Wingdings" panose="05000000000000000000" pitchFamily="2" charset="2"/>
+              </a:rPr>
+              <a:t>  String</a:t>
+            </a:r>
+            <a:endParaRPr lang="en-US" b="1" dirty="0">
+              <a:solidFill>
+                <a:schemeClr val="tx1"/>
+              </a:solidFill>
+            </a:endParaRPr>
+          </a:p>
+          <a:p>
+            <a:endParaRPr lang="en-US" dirty="0">
+              <a:solidFill>
+                <a:schemeClr val="tx1"/>
+              </a:solidFill>
+            </a:endParaRPr>
+          </a:p>
+        </p:txBody>
+      </p:sp>
+    </p:spTree>
+    <p:extLst>
+      <p:ext uri="{BB962C8B-B14F-4D97-AF65-F5344CB8AC3E}">
+        <p14:creationId xmlns:p14="http://schemas.microsoft.com/office/powerpoint/2010/main" val="239584471"/>
+      </p:ext>
+    </p:extLst>
+  </p:cSld>
+  <p:clrMapOvr>
+    <a:masterClrMapping/>
+  </p:clrMapOvr>
+</p:sld>
+</file>
+
+<file path=ppt/slides/slide11.xml><?xml version="1.0" encoding="utf-8"?>
+<p:sld xmlns:a="http://schemas.openxmlformats.org/drawingml/2006/main" xmlns:r="http://schemas.openxmlformats.org/officeDocument/2006/relationships" xmlns:p="http://schemas.openxmlformats.org/presentationml/2006/main">
+  <p:cSld>
+    <p:spTree>
+      <p:nvGrpSpPr>
+        <p:cNvPr id="1" name=""/>
+        <p:cNvGrpSpPr/>
+        <p:nvPr/>
+      </p:nvGrpSpPr>
+      <p:grpSpPr>
+        <a:xfrm>
+          <a:off x="0" y="0"/>
+          <a:ext cx="0" cy="0"/>
+          <a:chOff x="0" y="0"/>
+          <a:chExt cx="0" cy="0"/>
+        </a:xfrm>
+      </p:grpSpPr>
+      <p:sp>
+        <p:nvSpPr>
+          <p:cNvPr id="2" name="Title 1"/>
+          <p:cNvSpPr>
+            <a:spLocks noGrp="1"/>
+          </p:cNvSpPr>
+          <p:nvPr>
+            <p:ph type="title"/>
+          </p:nvPr>
+        </p:nvSpPr>
+        <p:spPr/>
+        <p:txBody>
+          <a:bodyPr/>
+          <a:lstStyle/>
+          <a:p>
+            <a:r>
+              <a:rPr lang="en-US" dirty="0"/>
+              <a:t>Data Structures</a:t>
+            </a:r>
+          </a:p>
+        </p:txBody>
+      </p:sp>
+      <p:sp>
+        <p:nvSpPr>
+          <p:cNvPr id="3" name="Content Placeholder 2"/>
+          <p:cNvSpPr>
+            <a:spLocks noGrp="1"/>
+          </p:cNvSpPr>
+          <p:nvPr>
+            <p:ph idx="1"/>
+          </p:nvPr>
+        </p:nvSpPr>
+        <p:spPr/>
+        <p:txBody>
+          <a:bodyPr>
+            <a:normAutofit/>
+          </a:bodyPr>
+          <a:lstStyle/>
+          <a:p>
+            <a:pPr>
+              <a:buNone/>
+            </a:pPr>
+            <a:r>
+              <a:rPr lang="en-US" b="1" dirty="0">
+                <a:latin typeface="Consolas" pitchFamily="49" charset="0"/>
+                <a:cs typeface="Consolas" pitchFamily="49" charset="0"/>
+              </a:rPr>
+              <a:t>"</a:t>
+            </a:r>
+            <a:r>
+              <a:rPr lang="en-US" b="1" dirty="0" err="1">
+                <a:latin typeface="Consolas" pitchFamily="49" charset="0"/>
+                <a:cs typeface="Consolas" pitchFamily="49" charset="0"/>
+              </a:rPr>
+              <a:t>alice</a:t>
+            </a:r>
+            <a:r>
+              <a:rPr lang="en-US" b="1" dirty="0">
+                <a:latin typeface="Consolas" pitchFamily="49" charset="0"/>
+                <a:cs typeface="Consolas" pitchFamily="49" charset="0"/>
+              </a:rPr>
+              <a:t>"</a:t>
+            </a:r>
+          </a:p>
+          <a:p>
+            <a:pPr>
+              <a:buNone/>
+            </a:pPr>
+            <a:r>
+              <a:rPr lang="en-US" b="1" dirty="0">
+                <a:latin typeface="Consolas" pitchFamily="49" charset="0"/>
+                <a:cs typeface="Consolas" pitchFamily="49" charset="0"/>
+              </a:rPr>
+              <a:t>"bob"</a:t>
+            </a:r>
+          </a:p>
+          <a:p>
+            <a:pPr>
+              <a:buNone/>
+            </a:pPr>
+            <a:r>
+              <a:rPr lang="en-US" b="1" dirty="0">
+                <a:latin typeface="Consolas" pitchFamily="49" charset="0"/>
+                <a:cs typeface="Consolas" pitchFamily="49" charset="0"/>
+              </a:rPr>
+              <a:t>"</a:t>
+            </a:r>
+            <a:r>
+              <a:rPr lang="en-US" b="1" dirty="0" err="1">
+                <a:latin typeface="Consolas" pitchFamily="49" charset="0"/>
+                <a:cs typeface="Consolas" pitchFamily="49" charset="0"/>
+              </a:rPr>
+              <a:t>carole</a:t>
+            </a:r>
+            <a:r>
+              <a:rPr lang="en-US" b="1" dirty="0">
+                <a:latin typeface="Consolas" pitchFamily="49" charset="0"/>
+                <a:cs typeface="Consolas" pitchFamily="49" charset="0"/>
+              </a:rPr>
+              <a:t>"</a:t>
+            </a:r>
+          </a:p>
+          <a:p>
+            <a:pPr>
+              <a:buNone/>
+            </a:pPr>
+            <a:r>
+              <a:rPr lang="en-US" b="1" dirty="0">
+                <a:latin typeface="Consolas" pitchFamily="49" charset="0"/>
+                <a:cs typeface="Consolas" pitchFamily="49" charset="0"/>
+              </a:rPr>
+              <a:t>("</a:t>
+            </a:r>
+            <a:r>
+              <a:rPr lang="en-US" b="1" dirty="0" err="1">
+                <a:latin typeface="Consolas" pitchFamily="49" charset="0"/>
+                <a:cs typeface="Consolas" pitchFamily="49" charset="0"/>
+              </a:rPr>
+              <a:t>alice</a:t>
+            </a:r>
+            <a:r>
+              <a:rPr lang="en-US" b="1" dirty="0">
+                <a:latin typeface="Consolas" pitchFamily="49" charset="0"/>
+                <a:cs typeface="Consolas" pitchFamily="49" charset="0"/>
+              </a:rPr>
+              <a:t>" "bob")</a:t>
+            </a:r>
+          </a:p>
+        </p:txBody>
+      </p:sp>
+      <p:sp>
+        <p:nvSpPr>
+          <p:cNvPr id="18" name="Slide Number Placeholder 17"/>
+          <p:cNvSpPr>
+            <a:spLocks noGrp="1"/>
+          </p:cNvSpPr>
+          <p:nvPr>
+            <p:ph type="sldNum" sz="quarter" idx="12"/>
+          </p:nvPr>
+        </p:nvSpPr>
+        <p:spPr/>
+        <p:txBody>
+          <a:bodyPr/>
+          <a:lstStyle/>
+          <a:p>
+            <a:fld id="{C1D4534E-1B22-4A44-850A-B3E8E9EE687A}" type="slidenum">
+              <a:rPr lang="en-US" smtClean="0"/>
+              <a:t>11</a:t>
+            </a:fld>
+            <a:endParaRPr lang="en-US"/>
+          </a:p>
+        </p:txBody>
+      </p:sp>
+      <p:grpSp>
+        <p:nvGrpSpPr>
+          <p:cNvPr id="4" name="Group 4"/>
+          <p:cNvGrpSpPr>
+            <a:grpSpLocks/>
+          </p:cNvGrpSpPr>
+          <p:nvPr/>
+        </p:nvGrpSpPr>
+        <p:grpSpPr bwMode="auto">
+          <a:xfrm>
+            <a:off x="3619500" y="4578351"/>
+            <a:ext cx="2933700" cy="1071563"/>
+            <a:chOff x="2493" y="1488"/>
+            <a:chExt cx="1152" cy="675"/>
+          </a:xfrm>
+        </p:grpSpPr>
+        <p:grpSp>
+          <p:nvGrpSpPr>
+            <p:cNvPr id="5" name="Group 5"/>
+            <p:cNvGrpSpPr>
+              <a:grpSpLocks/>
+            </p:cNvGrpSpPr>
+            <p:nvPr/>
+          </p:nvGrpSpPr>
+          <p:grpSpPr bwMode="auto">
+            <a:xfrm>
+              <a:off x="2493" y="1488"/>
+              <a:ext cx="480" cy="192"/>
+              <a:chOff x="1392" y="1536"/>
+              <a:chExt cx="480" cy="192"/>
+            </a:xfrm>
+          </p:grpSpPr>
+          <p:sp>
+            <p:nvSpPr>
+              <p:cNvPr id="15" name="Rectangle 6"/>
+              <p:cNvSpPr>
+                <a:spLocks noChangeArrowheads="1"/>
+              </p:cNvSpPr>
+              <p:nvPr/>
+            </p:nvSpPr>
+            <p:spPr bwMode="auto">
+              <a:xfrm>
+                <a:off x="1392" y="1536"/>
+                <a:ext cx="240" cy="192"/>
+              </a:xfrm>
+              <a:prstGeom prst="rect">
+                <a:avLst/>
+              </a:prstGeom>
+              <a:noFill/>
+              <a:ln w="9525">
+                <a:solidFill>
+                  <a:schemeClr val="tx1"/>
+                </a:solidFill>
+                <a:miter lim="800000"/>
+                <a:headEnd/>
+                <a:tailEnd/>
+              </a:ln>
+              <a:effectLst/>
+            </p:spPr>
+            <p:txBody>
+              <a:bodyPr wrap="none" anchor="ctr"/>
+              <a:lstStyle/>
+              <a:p>
+                <a:endParaRPr lang="en-US"/>
+              </a:p>
+            </p:txBody>
+          </p:sp>
+          <p:sp>
+            <p:nvSpPr>
+              <p:cNvPr id="16" name="Rectangle 7"/>
+              <p:cNvSpPr>
+                <a:spLocks noChangeArrowheads="1"/>
+              </p:cNvSpPr>
+              <p:nvPr/>
+            </p:nvSpPr>
+            <p:spPr bwMode="auto">
+              <a:xfrm>
+                <a:off x="1632" y="1536"/>
+                <a:ext cx="240" cy="192"/>
+              </a:xfrm>
+              <a:prstGeom prst="rect">
+                <a:avLst/>
+              </a:prstGeom>
+              <a:noFill/>
+              <a:ln w="9525">
+                <a:solidFill>
+                  <a:schemeClr val="tx1"/>
+                </a:solidFill>
+                <a:miter lim="800000"/>
+                <a:headEnd/>
+                <a:tailEnd/>
+              </a:ln>
+              <a:effectLst/>
+            </p:spPr>
+            <p:txBody>
+              <a:bodyPr wrap="none" anchor="ctr"/>
+              <a:lstStyle/>
+              <a:p>
+                <a:endParaRPr lang="en-US"/>
+              </a:p>
+            </p:txBody>
+          </p:sp>
+        </p:grpSp>
+        <p:grpSp>
+          <p:nvGrpSpPr>
+            <p:cNvPr id="6" name="Group 8"/>
+            <p:cNvGrpSpPr>
+              <a:grpSpLocks/>
+            </p:cNvGrpSpPr>
+            <p:nvPr/>
+          </p:nvGrpSpPr>
+          <p:grpSpPr bwMode="auto">
+            <a:xfrm>
+              <a:off x="3165" y="1488"/>
+              <a:ext cx="480" cy="192"/>
+              <a:chOff x="1392" y="1536"/>
+              <a:chExt cx="480" cy="192"/>
+            </a:xfrm>
+          </p:grpSpPr>
+          <p:sp>
+            <p:nvSpPr>
+              <p:cNvPr id="13" name="Rectangle 9"/>
+              <p:cNvSpPr>
+                <a:spLocks noChangeArrowheads="1"/>
+              </p:cNvSpPr>
+              <p:nvPr/>
+            </p:nvSpPr>
+            <p:spPr bwMode="auto">
+              <a:xfrm>
+                <a:off x="1392" y="1536"/>
+                <a:ext cx="240" cy="192"/>
+              </a:xfrm>
+              <a:prstGeom prst="rect">
+                <a:avLst/>
+              </a:prstGeom>
+              <a:noFill/>
+              <a:ln w="9525">
+                <a:solidFill>
+                  <a:schemeClr val="tx1"/>
+                </a:solidFill>
+                <a:miter lim="800000"/>
+                <a:headEnd/>
+                <a:tailEnd/>
+              </a:ln>
+              <a:effectLst/>
+            </p:spPr>
+            <p:txBody>
+              <a:bodyPr wrap="none" anchor="ctr"/>
+              <a:lstStyle/>
+              <a:p>
+                <a:endParaRPr lang="en-US"/>
+              </a:p>
+            </p:txBody>
+          </p:sp>
+          <p:sp>
+            <p:nvSpPr>
+              <p:cNvPr id="14" name="Rectangle 10"/>
+              <p:cNvSpPr>
+                <a:spLocks noChangeArrowheads="1"/>
+              </p:cNvSpPr>
+              <p:nvPr/>
+            </p:nvSpPr>
+            <p:spPr bwMode="auto">
+              <a:xfrm>
+                <a:off x="1632" y="1536"/>
+                <a:ext cx="240" cy="192"/>
+              </a:xfrm>
+              <a:prstGeom prst="rect">
+                <a:avLst/>
+              </a:prstGeom>
+              <a:noFill/>
+              <a:ln w="9525">
+                <a:solidFill>
+                  <a:schemeClr val="tx1"/>
+                </a:solidFill>
+                <a:miter lim="800000"/>
+                <a:headEnd/>
+                <a:tailEnd/>
+              </a:ln>
+              <a:effectLst/>
+            </p:spPr>
+            <p:txBody>
+              <a:bodyPr wrap="none" anchor="ctr"/>
+              <a:lstStyle/>
+              <a:p>
+                <a:endParaRPr lang="en-US"/>
+              </a:p>
+            </p:txBody>
+          </p:sp>
+        </p:grpSp>
+        <p:sp>
+          <p:nvSpPr>
+            <p:cNvPr id="7" name="Line 11"/>
+            <p:cNvSpPr>
+              <a:spLocks noChangeShapeType="1"/>
+            </p:cNvSpPr>
+            <p:nvPr/>
+          </p:nvSpPr>
+          <p:spPr bwMode="auto">
+            <a:xfrm>
+              <a:off x="2829" y="1584"/>
+              <a:ext cx="336" cy="0"/>
+            </a:xfrm>
+            <a:prstGeom prst="line">
+              <a:avLst/>
+            </a:prstGeom>
+            <a:noFill/>
+            <a:ln w="9525">
+              <a:solidFill>
+                <a:schemeClr val="tx1"/>
+              </a:solidFill>
+              <a:round/>
+              <a:headEnd/>
+              <a:tailEnd type="triangle" w="med" len="med"/>
+            </a:ln>
+            <a:effectLst/>
+          </p:spPr>
+          <p:txBody>
+            <a:bodyPr wrap="none" anchor="ctr"/>
+            <a:lstStyle/>
+            <a:p>
+              <a:endParaRPr lang="en-US"/>
+            </a:p>
+          </p:txBody>
+        </p:sp>
+        <p:sp>
+          <p:nvSpPr>
+            <p:cNvPr id="8" name="Line 12"/>
+            <p:cNvSpPr>
+              <a:spLocks noChangeShapeType="1"/>
+            </p:cNvSpPr>
+            <p:nvPr/>
+          </p:nvSpPr>
+          <p:spPr bwMode="auto">
+            <a:xfrm>
+              <a:off x="3405" y="1488"/>
+              <a:ext cx="240" cy="192"/>
+            </a:xfrm>
+            <a:prstGeom prst="line">
+              <a:avLst/>
+            </a:prstGeom>
+            <a:noFill/>
+            <a:ln w="9525">
+              <a:solidFill>
+                <a:schemeClr val="tx1"/>
+              </a:solidFill>
+              <a:round/>
+              <a:headEnd/>
+              <a:tailEnd/>
+            </a:ln>
+            <a:effectLst/>
+          </p:spPr>
+          <p:txBody>
+            <a:bodyPr wrap="none" anchor="ctr"/>
+            <a:lstStyle/>
+            <a:p>
+              <a:endParaRPr lang="en-US"/>
+            </a:p>
+          </p:txBody>
+        </p:sp>
+        <p:sp>
+          <p:nvSpPr>
+            <p:cNvPr id="9" name="Line 13"/>
+            <p:cNvSpPr>
+              <a:spLocks noChangeShapeType="1"/>
+            </p:cNvSpPr>
+            <p:nvPr/>
+          </p:nvSpPr>
+          <p:spPr bwMode="auto">
+            <a:xfrm>
+              <a:off x="2589" y="1584"/>
+              <a:ext cx="0" cy="336"/>
+            </a:xfrm>
+            <a:prstGeom prst="line">
+              <a:avLst/>
+            </a:prstGeom>
+            <a:noFill/>
+            <a:ln w="9525">
+              <a:solidFill>
+                <a:schemeClr val="tx1"/>
+              </a:solidFill>
+              <a:round/>
+              <a:headEnd/>
+              <a:tailEnd type="triangle" w="med" len="med"/>
+            </a:ln>
+            <a:effectLst/>
+          </p:spPr>
+          <p:txBody>
+            <a:bodyPr wrap="none" anchor="ctr"/>
+            <a:lstStyle/>
+            <a:p>
+              <a:endParaRPr lang="en-US"/>
+            </a:p>
+          </p:txBody>
+        </p:sp>
+        <p:sp>
+          <p:nvSpPr>
+            <p:cNvPr id="10" name="Line 14"/>
+            <p:cNvSpPr>
+              <a:spLocks noChangeShapeType="1"/>
+            </p:cNvSpPr>
+            <p:nvPr/>
+          </p:nvSpPr>
+          <p:spPr bwMode="auto">
+            <a:xfrm>
+              <a:off x="3261" y="1584"/>
+              <a:ext cx="0" cy="336"/>
+            </a:xfrm>
+            <a:prstGeom prst="line">
+              <a:avLst/>
+            </a:prstGeom>
+            <a:noFill/>
+            <a:ln w="9525">
+              <a:solidFill>
+                <a:schemeClr val="tx1"/>
+              </a:solidFill>
+              <a:round/>
+              <a:headEnd/>
+              <a:tailEnd type="triangle" w="med" len="med"/>
+            </a:ln>
+            <a:effectLst/>
+          </p:spPr>
+          <p:txBody>
+            <a:bodyPr wrap="none" anchor="ctr"/>
+            <a:lstStyle/>
+            <a:p>
+              <a:endParaRPr lang="en-US"/>
+            </a:p>
+          </p:txBody>
+        </p:sp>
+        <p:sp>
+          <p:nvSpPr>
+            <p:cNvPr id="11" name="Text Box 15"/>
+            <p:cNvSpPr txBox="1">
+              <a:spLocks noChangeArrowheads="1"/>
+            </p:cNvSpPr>
+            <p:nvPr/>
+          </p:nvSpPr>
+          <p:spPr bwMode="auto">
+            <a:xfrm>
+              <a:off x="2501" y="1872"/>
+              <a:ext cx="540" cy="291"/>
+            </a:xfrm>
+            <a:prstGeom prst="rect">
+              <a:avLst/>
+            </a:prstGeom>
+            <a:noFill/>
+            <a:ln w="9525">
+              <a:noFill/>
+              <a:miter lim="800000"/>
+              <a:headEnd/>
+              <a:tailEnd/>
+            </a:ln>
+            <a:effectLst/>
+          </p:spPr>
+          <p:txBody>
+            <a:bodyPr wrap="none">
+              <a:spAutoFit/>
+            </a:bodyPr>
+            <a:lstStyle/>
+            <a:p>
+              <a:r>
+                <a:rPr lang="en-US" sz="2400" b="1" dirty="0">
+                  <a:latin typeface="Consolas" pitchFamily="49" charset="0"/>
+                  <a:cs typeface="Consolas" pitchFamily="49" charset="0"/>
+                </a:rPr>
+                <a:t>"</a:t>
+              </a:r>
+              <a:r>
+                <a:rPr lang="en-US" sz="2400" b="1" dirty="0" err="1">
+                  <a:latin typeface="Consolas" pitchFamily="49" charset="0"/>
+                  <a:cs typeface="Consolas" pitchFamily="49" charset="0"/>
+                </a:rPr>
+                <a:t>alice</a:t>
+              </a:r>
+              <a:r>
+                <a:rPr lang="en-US" sz="2400" b="1" dirty="0">
+                  <a:latin typeface="Consolas" pitchFamily="49" charset="0"/>
+                  <a:cs typeface="Consolas" pitchFamily="49" charset="0"/>
+                </a:rPr>
+                <a:t>"</a:t>
+              </a:r>
+              <a:endParaRPr lang="en-US" sz="2400" b="1" i="0" dirty="0">
+                <a:latin typeface="Consolas" pitchFamily="49" charset="0"/>
+                <a:cs typeface="Consolas" pitchFamily="49" charset="0"/>
+              </a:endParaRPr>
+            </a:p>
+          </p:txBody>
+        </p:sp>
+        <p:sp>
+          <p:nvSpPr>
+            <p:cNvPr id="12" name="Text Box 16"/>
+            <p:cNvSpPr txBox="1">
+              <a:spLocks noChangeArrowheads="1"/>
+            </p:cNvSpPr>
+            <p:nvPr/>
+          </p:nvSpPr>
+          <p:spPr bwMode="auto">
+            <a:xfrm>
+              <a:off x="3161" y="1872"/>
+              <a:ext cx="406" cy="291"/>
+            </a:xfrm>
+            <a:prstGeom prst="rect">
+              <a:avLst/>
+            </a:prstGeom>
+            <a:noFill/>
+            <a:ln w="9525">
+              <a:noFill/>
+              <a:miter lim="800000"/>
+              <a:headEnd/>
+              <a:tailEnd/>
+            </a:ln>
+            <a:effectLst/>
+          </p:spPr>
+          <p:txBody>
+            <a:bodyPr wrap="none">
+              <a:spAutoFit/>
+            </a:bodyPr>
+            <a:lstStyle/>
+            <a:p>
+              <a:r>
+                <a:rPr lang="en-US" sz="2400" b="1" i="0" dirty="0">
+                  <a:latin typeface="Consolas" pitchFamily="49" charset="0"/>
+                  <a:cs typeface="Consolas" pitchFamily="49" charset="0"/>
+                </a:rPr>
+                <a:t>"bob"</a:t>
+              </a:r>
+            </a:p>
+          </p:txBody>
+        </p:sp>
+      </p:grpSp>
+      <p:sp>
+        <p:nvSpPr>
+          <p:cNvPr id="17" name="Rectangle 16"/>
+          <p:cNvSpPr/>
+          <p:nvPr/>
+        </p:nvSpPr>
+        <p:spPr>
+          <a:xfrm>
+            <a:off x="5410200" y="1676400"/>
+            <a:ext cx="3581400" cy="914400"/>
+          </a:xfrm>
+          <a:prstGeom prst="rect">
+            <a:avLst/>
+          </a:prstGeom>
+          <a:solidFill>
+            <a:schemeClr val="accent3">
+              <a:lumMod val="40000"/>
+              <a:lumOff val="60000"/>
+            </a:schemeClr>
+          </a:solidFill>
+          <a:ln/>
+        </p:spPr>
+        <p:style>
+          <a:lnRef idx="2">
+            <a:schemeClr val="accent1"/>
+          </a:lnRef>
+          <a:fillRef idx="1">
+            <a:schemeClr val="lt1"/>
+          </a:fillRef>
+          <a:effectRef idx="0">
+            <a:schemeClr val="accent1"/>
+          </a:effectRef>
+          <a:fontRef idx="minor">
+            <a:schemeClr val="dk1"/>
+          </a:fontRef>
+        </p:style>
+        <p:txBody>
+          <a:bodyPr rot="0" spcFirstLastPara="0" vertOverflow="overflow" horzOverflow="overflow" vert="horz" wrap="square" lIns="91440" tIns="45720" rIns="91440" bIns="45720" numCol="1" spcCol="0" rtlCol="0" fromWordArt="0" anchor="ctr" anchorCtr="0" forceAA="0" compatLnSpc="1">
+            <a:prstTxWarp prst="textNoShape">
+              <a:avLst/>
+            </a:prstTxWarp>
+            <a:noAutofit/>
+          </a:bodyPr>
+          <a:lstStyle/>
+          <a:p>
+            <a:pPr>
+              <a:defRPr/>
+            </a:pPr>
+            <a:r>
+              <a:rPr lang="en-US" dirty="0">
+                <a:solidFill>
+                  <a:schemeClr val="tx1"/>
+                </a:solidFill>
+              </a:rPr>
+              <a:t>A list of S-expressions is implemented as a singly-linked list.  Here is an example.</a:t>
+            </a:r>
+            <a:endParaRPr lang="en-US" dirty="0"/>
+          </a:p>
+        </p:txBody>
+      </p:sp>
+    </p:spTree>
+    <p:extLst>
+      <p:ext uri="{BB962C8B-B14F-4D97-AF65-F5344CB8AC3E}">
+        <p14:creationId xmlns:p14="http://schemas.microsoft.com/office/powerpoint/2010/main" val="3808444269"/>
+      </p:ext>
+    </p:extLst>
+  </p:cSld>
+  <p:clrMapOvr>
+    <a:masterClrMapping/>
+  </p:clrMapOvr>
+</p:sld>
+</file>
+
+<file path=ppt/slides/slide12.xml><?xml version="1.0" encoding="utf-8"?>
+<p:sld xmlns:a="http://schemas.openxmlformats.org/drawingml/2006/main" xmlns:r="http://schemas.openxmlformats.org/officeDocument/2006/relationships" xmlns:p="http://schemas.openxmlformats.org/presentationml/2006/main">
+  <p:cSld>
+    <p:spTree>
+      <p:nvGrpSpPr>
+        <p:cNvPr id="1" name=""/>
+        <p:cNvGrpSpPr/>
+        <p:nvPr/>
+      </p:nvGrpSpPr>
+      <p:grpSpPr>
+        <a:xfrm>
+          <a:off x="0" y="0"/>
+          <a:ext cx="0" cy="0"/>
+          <a:chOff x="0" y="0"/>
+          <a:chExt cx="0" cy="0"/>
+        </a:xfrm>
+      </p:grpSpPr>
+      <p:sp>
+        <p:nvSpPr>
+          <p:cNvPr id="2" name="Title 1"/>
+          <p:cNvSpPr>
+            <a:spLocks noGrp="1"/>
+          </p:cNvSpPr>
+          <p:nvPr>
+            <p:ph type="title"/>
+          </p:nvPr>
+        </p:nvSpPr>
+        <p:spPr/>
+        <p:txBody>
+          <a:bodyPr/>
+          <a:lstStyle/>
+          <a:p>
+            <a:r>
+              <a:rPr lang="en-US" dirty="0"/>
               <a:t>Data Structures</a:t>
             </a:r>
           </a:p>
@@ -4807,7 +6373,7 @@
           <a:p>
             <a:fld id="{C1D4534E-1B22-4A44-850A-B3E8E9EE687A}" type="slidenum">
               <a:rPr lang="en-US" smtClean="0"/>
-              <a:t>10</a:t>
+              <a:t>12</a:t>
             </a:fld>
             <a:endParaRPr lang="en-US"/>
           </a:p>
@@ -5776,7 +7342,7 @@
 </p:sld>
 </file>
 
-<file path=ppt/slides/slide11.xml><?xml version="1.0" encoding="utf-8"?>
+<file path=ppt/slides/slide13.xml><?xml version="1.0" encoding="utf-8"?>
 <p:sld xmlns:a="http://schemas.openxmlformats.org/drawingml/2006/main" xmlns:r="http://schemas.openxmlformats.org/officeDocument/2006/relationships" xmlns:p="http://schemas.openxmlformats.org/presentationml/2006/main">
   <p:cSld>
     <p:spTree>
@@ -5946,7 +7512,7 @@
           <a:p>
             <a:fld id="{C1D4534E-1B22-4A44-850A-B3E8E9EE687A}" type="slidenum">
               <a:rPr lang="en-US" smtClean="0"/>
-              <a:t>11</a:t>
+              <a:t>13</a:t>
             </a:fld>
             <a:endParaRPr lang="en-US"/>
           </a:p>
@@ -7449,7 +9015,7 @@
 </p:sld>
 </file>
 
-<file path=ppt/slides/slide12.xml><?xml version="1.0" encoding="utf-8"?>
+<file path=ppt/slides/slide14.xml><?xml version="1.0" encoding="utf-8"?>
 <p:sld xmlns:a="http://schemas.openxmlformats.org/drawingml/2006/main" xmlns:r="http://schemas.openxmlformats.org/officeDocument/2006/relationships" xmlns:p="http://schemas.openxmlformats.org/presentationml/2006/main">
   <p:cSld>
     <p:spTree>
@@ -7818,7 +9384,7 @@
           <a:p>
             <a:fld id="{C1D4534E-1B22-4A44-850A-B3E8E9EE687A}" type="slidenum">
               <a:rPr lang="en-US" smtClean="0"/>
-              <a:t>12</a:t>
+              <a:t>14</a:t>
             </a:fld>
             <a:endParaRPr lang="en-US"/>
           </a:p>
@@ -7894,7 +9460,7 @@
 </p:sld>
 </file>
 
-<file path=ppt/slides/slide13.xml><?xml version="1.0" encoding="utf-8"?>
+<file path=ppt/slides/slide15.xml><?xml version="1.0" encoding="utf-8"?>
 <p:sld xmlns:a="http://schemas.openxmlformats.org/drawingml/2006/main" xmlns:r="http://schemas.openxmlformats.org/officeDocument/2006/relationships" xmlns:p="http://schemas.openxmlformats.org/presentationml/2006/main">
   <p:cSld>
     <p:spTree>
@@ -8314,7 +9880,7 @@
           <a:p>
             <a:fld id="{C1D4534E-1B22-4A44-850A-B3E8E9EE687A}" type="slidenum">
               <a:rPr lang="en-US" smtClean="0"/>
-              <a:t>13</a:t>
+              <a:t>15</a:t>
             </a:fld>
             <a:endParaRPr lang="en-US"/>
           </a:p>
@@ -8743,7 +10309,7 @@
 </p:sld>
 </file>
 
-<file path=ppt/slides/slide14.xml><?xml version="1.0" encoding="utf-8"?>
+<file path=ppt/slides/slide16.xml><?xml version="1.0" encoding="utf-8"?>
 <p:sld xmlns:a="http://schemas.openxmlformats.org/drawingml/2006/main" xmlns:r="http://schemas.openxmlformats.org/officeDocument/2006/relationships" xmlns:p="http://schemas.openxmlformats.org/presentationml/2006/main">
   <p:cSld>
     <p:spTree>
@@ -8886,7 +10452,7 @@
           <a:p>
             <a:fld id="{C1D4534E-1B22-4A44-850A-B3E8E9EE687A}" type="slidenum">
               <a:rPr lang="en-US" smtClean="0"/>
-              <a:t>14</a:t>
+              <a:t>16</a:t>
             </a:fld>
             <a:endParaRPr lang="en-US"/>
           </a:p>
@@ -9069,7 +10635,7 @@
 </p:sld>
 </file>
 
-<file path=ppt/slides/slide15.xml><?xml version="1.0" encoding="utf-8"?>
+<file path=ppt/slides/slide17.xml><?xml version="1.0" encoding="utf-8"?>
 <p:sld xmlns:a="http://schemas.openxmlformats.org/drawingml/2006/main" xmlns:r="http://schemas.openxmlformats.org/officeDocument/2006/relationships" xmlns:p="http://schemas.openxmlformats.org/presentationml/2006/main">
   <p:cSld>
     <p:spTree>
@@ -9179,7 +10745,7 @@
           <a:p>
             <a:fld id="{C1D4534E-1B22-4A44-850A-B3E8E9EE687A}" type="slidenum">
               <a:rPr lang="en-US" smtClean="0"/>
-              <a:t>15</a:t>
+              <a:t>17</a:t>
             </a:fld>
             <a:endParaRPr lang="en-US"/>
           </a:p>
@@ -9198,7 +10764,7 @@
 </p:sld>
 </file>
 
-<file path=ppt/slides/slide16.xml><?xml version="1.0" encoding="utf-8"?>
+<file path=ppt/slides/slide18.xml><?xml version="1.0" encoding="utf-8"?>
 <p:sld xmlns:a="http://schemas.openxmlformats.org/drawingml/2006/main" xmlns:r="http://schemas.openxmlformats.org/officeDocument/2006/relationships" xmlns:p="http://schemas.openxmlformats.org/presentationml/2006/main">
   <p:cSld>
     <p:spTree>
@@ -9390,7 +10956,7 @@
           <a:p>
             <a:fld id="{C1D4534E-1B22-4A44-850A-B3E8E9EE687A}" type="slidenum">
               <a:rPr lang="en-US" smtClean="0"/>
-              <a:t>16</a:t>
+              <a:t>18</a:t>
             </a:fld>
             <a:endParaRPr lang="en-US"/>
           </a:p>
@@ -9529,7 +11095,7 @@
 </p:sld>
 </file>
 
-<file path=ppt/slides/slide17.xml><?xml version="1.0" encoding="utf-8"?>
+<file path=ppt/slides/slide19.xml><?xml version="1.0" encoding="utf-8"?>
 <p:sld xmlns:a="http://schemas.openxmlformats.org/drawingml/2006/main" xmlns:r="http://schemas.openxmlformats.org/officeDocument/2006/relationships" xmlns:p="http://schemas.openxmlformats.org/presentationml/2006/main">
   <p:cSld>
     <p:spTree>
@@ -10108,7 +11674,7 @@
           <a:p>
             <a:fld id="{C1D4534E-1B22-4A44-850A-B3E8E9EE687A}" type="slidenum">
               <a:rPr lang="en-US" smtClean="0"/>
-              <a:t>17</a:t>
+              <a:t>19</a:t>
             </a:fld>
             <a:endParaRPr lang="en-US"/>
           </a:p>
@@ -10127,7 +11693,125 @@
 </p:sld>
 </file>
 
-<file path=ppt/slides/slide18.xml><?xml version="1.0" encoding="utf-8"?>
+<file path=ppt/slides/slide2.xml><?xml version="1.0" encoding="utf-8"?>
+<p:sld xmlns:a="http://schemas.openxmlformats.org/drawingml/2006/main" xmlns:r="http://schemas.openxmlformats.org/officeDocument/2006/relationships" xmlns:p="http://schemas.openxmlformats.org/presentationml/2006/main">
+  <p:cSld>
+    <p:spTree>
+      <p:nvGrpSpPr>
+        <p:cNvPr id="1" name=""/>
+        <p:cNvGrpSpPr/>
+        <p:nvPr/>
+      </p:nvGrpSpPr>
+      <p:grpSpPr>
+        <a:xfrm>
+          <a:off x="0" y="0"/>
+          <a:ext cx="0" cy="0"/>
+          <a:chOff x="0" y="0"/>
+          <a:chExt cx="0" cy="0"/>
+        </a:xfrm>
+      </p:grpSpPr>
+      <p:sp>
+        <p:nvSpPr>
+          <p:cNvPr id="2" name="Title 1"/>
+          <p:cNvSpPr>
+            <a:spLocks noGrp="1"/>
+          </p:cNvSpPr>
+          <p:nvPr>
+            <p:ph type="title"/>
+          </p:nvPr>
+        </p:nvSpPr>
+        <p:spPr/>
+        <p:txBody>
+          <a:bodyPr/>
+          <a:lstStyle/>
+          <a:p>
+            <a:r>
+              <a:rPr lang="en-US" dirty="0"/>
+              <a:t>Learning Outcomes</a:t>
+            </a:r>
+          </a:p>
+        </p:txBody>
+      </p:sp>
+      <p:sp>
+        <p:nvSpPr>
+          <p:cNvPr id="3" name="Content Placeholder 2"/>
+          <p:cNvSpPr>
+            <a:spLocks noGrp="1"/>
+          </p:cNvSpPr>
+          <p:nvPr>
+            <p:ph idx="1"/>
+          </p:nvPr>
+        </p:nvSpPr>
+        <p:spPr/>
+        <p:txBody>
+          <a:bodyPr/>
+          <a:lstStyle/>
+          <a:p>
+            <a:r>
+              <a:rPr lang="en-US" dirty="0"/>
+              <a:t>At the end of this lesson, the student should be able to</a:t>
+            </a:r>
+          </a:p>
+          <a:p>
+            <a:pPr lvl="1"/>
+            <a:r>
+              <a:rPr lang="en-US" dirty="0"/>
+              <a:t>Give examples of S-expressions</a:t>
+            </a:r>
+          </a:p>
+          <a:p>
+            <a:pPr lvl="1"/>
+            <a:r>
+              <a:rPr lang="en-US" dirty="0"/>
+              <a:t>Write the data definition and template for S-expressions</a:t>
+            </a:r>
+          </a:p>
+          <a:p>
+            <a:pPr lvl="1"/>
+            <a:r>
+              <a:rPr lang="en-US" dirty="0"/>
+              <a:t>Write functions on S-expressions using the template</a:t>
+            </a:r>
+          </a:p>
+        </p:txBody>
+      </p:sp>
+      <p:sp>
+        <p:nvSpPr>
+          <p:cNvPr id="4" name="Slide Number Placeholder 3"/>
+          <p:cNvSpPr>
+            <a:spLocks noGrp="1"/>
+          </p:cNvSpPr>
+          <p:nvPr>
+            <p:ph type="sldNum" sz="quarter" idx="12"/>
+          </p:nvPr>
+        </p:nvSpPr>
+        <p:spPr/>
+        <p:txBody>
+          <a:bodyPr/>
+          <a:lstStyle/>
+          <a:p>
+            <a:fld id="{C1D4534E-1B22-4A44-850A-B3E8E9EE687A}" type="slidenum">
+              <a:rPr lang="en-US" smtClean="0"/>
+              <a:t>2</a:t>
+            </a:fld>
+            <a:endParaRPr lang="en-US"/>
+          </a:p>
+        </p:txBody>
+      </p:sp>
+    </p:spTree>
+    <p:extLst>
+      <p:ext uri="{BB962C8B-B14F-4D97-AF65-F5344CB8AC3E}">
+        <p14:creationId xmlns:p14="http://schemas.microsoft.com/office/powerpoint/2010/main" val="2186847188"/>
+      </p:ext>
+    </p:extLst>
+  </p:cSld>
+  <p:clrMapOvr>
+    <a:masterClrMapping/>
+  </p:clrMapOvr>
+</p:sld>
+</file>
+
+<file path=ppt/slides/slide20.xml><?xml version="1.0" encoding="utf-8"?>
 <p:sld xmlns:a="http://schemas.openxmlformats.org/drawingml/2006/main" xmlns:r="http://schemas.openxmlformats.org/officeDocument/2006/relationships" xmlns:p="http://schemas.openxmlformats.org/presentationml/2006/main">
   <p:cSld>
     <p:spTree>
@@ -10219,7 +11903,7 @@
           <a:p>
             <a:fld id="{C1D4534E-1B22-4A44-850A-B3E8E9EE687A}" type="slidenum">
               <a:rPr lang="en-US" smtClean="0"/>
-              <a:t>18</a:t>
+              <a:t>20</a:t>
             </a:fld>
             <a:endParaRPr lang="en-US"/>
           </a:p>
@@ -10318,7 +12002,7 @@
 </p:sld>
 </file>
 
-<file path=ppt/slides/slide19.xml><?xml version="1.0" encoding="utf-8"?>
+<file path=ppt/slides/slide21.xml><?xml version="1.0" encoding="utf-8"?>
 <p:sld xmlns:a="http://schemas.openxmlformats.org/drawingml/2006/main" xmlns:r="http://schemas.openxmlformats.org/officeDocument/2006/relationships" xmlns:p="http://schemas.openxmlformats.org/presentationml/2006/main">
   <p:cSld>
     <p:spTree>
@@ -10410,7 +12094,7 @@
           <a:p>
             <a:fld id="{C1D4534E-1B22-4A44-850A-B3E8E9EE687A}" type="slidenum">
               <a:rPr lang="en-US" smtClean="0"/>
-              <a:t>19</a:t>
+              <a:t>21</a:t>
             </a:fld>
             <a:endParaRPr lang="en-US"/>
           </a:p>
@@ -10600,7 +12284,7 @@
 </p:sld>
 </file>
 
-<file path=ppt/slides/slide2.xml><?xml version="1.0" encoding="utf-8"?>
+<file path=ppt/slides/slide22.xml><?xml version="1.0" encoding="utf-8"?>
 <p:sld xmlns:a="http://schemas.openxmlformats.org/drawingml/2006/main" xmlns:r="http://schemas.openxmlformats.org/officeDocument/2006/relationships" xmlns:p="http://schemas.openxmlformats.org/presentationml/2006/main">
   <p:cSld>
     <p:spTree>
@@ -10619,124 +12303,6 @@
       </p:grpSpPr>
       <p:sp>
         <p:nvSpPr>
-          <p:cNvPr id="2" name="Title 1"/>
-          <p:cNvSpPr>
-            <a:spLocks noGrp="1"/>
-          </p:cNvSpPr>
-          <p:nvPr>
-            <p:ph type="title"/>
-          </p:nvPr>
-        </p:nvSpPr>
-        <p:spPr/>
-        <p:txBody>
-          <a:bodyPr/>
-          <a:lstStyle/>
-          <a:p>
-            <a:r>
-              <a:rPr lang="en-US" dirty="0"/>
-              <a:t>Learning Outcomes</a:t>
-            </a:r>
-          </a:p>
-        </p:txBody>
-      </p:sp>
-      <p:sp>
-        <p:nvSpPr>
-          <p:cNvPr id="3" name="Content Placeholder 2"/>
-          <p:cNvSpPr>
-            <a:spLocks noGrp="1"/>
-          </p:cNvSpPr>
-          <p:nvPr>
-            <p:ph idx="1"/>
-          </p:nvPr>
-        </p:nvSpPr>
-        <p:spPr/>
-        <p:txBody>
-          <a:bodyPr/>
-          <a:lstStyle/>
-          <a:p>
-            <a:r>
-              <a:rPr lang="en-US" dirty="0"/>
-              <a:t>At the end of this lesson, the student should be able to</a:t>
-            </a:r>
-          </a:p>
-          <a:p>
-            <a:pPr lvl="1"/>
-            <a:r>
-              <a:rPr lang="en-US" dirty="0"/>
-              <a:t>Give examples of S-expressions</a:t>
-            </a:r>
-          </a:p>
-          <a:p>
-            <a:pPr lvl="1"/>
-            <a:r>
-              <a:rPr lang="en-US" dirty="0"/>
-              <a:t>Write the data definition and template for S-expressions</a:t>
-            </a:r>
-          </a:p>
-          <a:p>
-            <a:pPr lvl="1"/>
-            <a:r>
-              <a:rPr lang="en-US" dirty="0"/>
-              <a:t>Write functions on S-expressions using the template</a:t>
-            </a:r>
-          </a:p>
-        </p:txBody>
-      </p:sp>
-      <p:sp>
-        <p:nvSpPr>
-          <p:cNvPr id="4" name="Slide Number Placeholder 3"/>
-          <p:cNvSpPr>
-            <a:spLocks noGrp="1"/>
-          </p:cNvSpPr>
-          <p:nvPr>
-            <p:ph type="sldNum" sz="quarter" idx="12"/>
-          </p:nvPr>
-        </p:nvSpPr>
-        <p:spPr/>
-        <p:txBody>
-          <a:bodyPr/>
-          <a:lstStyle/>
-          <a:p>
-            <a:fld id="{C1D4534E-1B22-4A44-850A-B3E8E9EE687A}" type="slidenum">
-              <a:rPr lang="en-US" smtClean="0"/>
-              <a:t>2</a:t>
-            </a:fld>
-            <a:endParaRPr lang="en-US"/>
-          </a:p>
-        </p:txBody>
-      </p:sp>
-    </p:spTree>
-    <p:extLst>
-      <p:ext uri="{BB962C8B-B14F-4D97-AF65-F5344CB8AC3E}">
-        <p14:creationId xmlns:p14="http://schemas.microsoft.com/office/powerpoint/2010/main" val="2186847188"/>
-      </p:ext>
-    </p:extLst>
-  </p:cSld>
-  <p:clrMapOvr>
-    <a:masterClrMapping/>
-  </p:clrMapOvr>
-</p:sld>
-</file>
-
-<file path=ppt/slides/slide20.xml><?xml version="1.0" encoding="utf-8"?>
-<p:sld xmlns:a="http://schemas.openxmlformats.org/drawingml/2006/main" xmlns:r="http://schemas.openxmlformats.org/officeDocument/2006/relationships" xmlns:p="http://schemas.openxmlformats.org/presentationml/2006/main">
-  <p:cSld>
-    <p:spTree>
-      <p:nvGrpSpPr>
-        <p:cNvPr id="1" name=""/>
-        <p:cNvGrpSpPr/>
-        <p:nvPr/>
-      </p:nvGrpSpPr>
-      <p:grpSpPr>
-        <a:xfrm>
-          <a:off x="0" y="0"/>
-          <a:ext cx="0" cy="0"/>
-          <a:chOff x="0" y="0"/>
-          <a:chExt cx="0" cy="0"/>
-        </a:xfrm>
-      </p:grpSpPr>
-      <p:sp>
-        <p:nvSpPr>
           <p:cNvPr id="6" name="Title 5"/>
           <p:cNvSpPr>
             <a:spLocks noGrp="1"/>
@@ -10838,7 +12404,7 @@
           <a:p>
             <a:fld id="{C1D4534E-1B22-4A44-850A-B3E8E9EE687A}" type="slidenum">
               <a:rPr lang="en-US" smtClean="0"/>
-              <a:t>20</a:t>
+              <a:t>22</a:t>
             </a:fld>
             <a:endParaRPr lang="en-US"/>
           </a:p>
@@ -10948,7 +12514,7 @@
 </p:sld>
 </file>
 
-<file path=ppt/slides/slide21.xml><?xml version="1.0" encoding="utf-8"?>
+<file path=ppt/slides/slide23.xml><?xml version="1.0" encoding="utf-8"?>
 <p:sld xmlns:a="http://schemas.openxmlformats.org/drawingml/2006/main" xmlns:r="http://schemas.openxmlformats.org/officeDocument/2006/relationships" xmlns:p="http://schemas.openxmlformats.org/presentationml/2006/main">
   <p:cSld>
     <p:spTree>
@@ -11181,7 +12747,7 @@
           <a:p>
             <a:fld id="{C1D4534E-1B22-4A44-850A-B3E8E9EE687A}" type="slidenum">
               <a:rPr lang="en-US" smtClean="0"/>
-              <a:t>21</a:t>
+              <a:t>23</a:t>
             </a:fld>
             <a:endParaRPr lang="en-US"/>
           </a:p>
@@ -11200,7 +12766,7 @@
 </p:sld>
 </file>
 
-<file path=ppt/slides/slide22.xml><?xml version="1.0" encoding="utf-8"?>
+<file path=ppt/slides/slide24.xml><?xml version="1.0" encoding="utf-8"?>
 <p:sld xmlns:a="http://schemas.openxmlformats.org/drawingml/2006/main" xmlns:r="http://schemas.openxmlformats.org/officeDocument/2006/relationships" xmlns:p="http://schemas.openxmlformats.org/presentationml/2006/main">
   <p:cSld>
     <p:spTree>
@@ -11595,7 +13161,7 @@
           <a:p>
             <a:fld id="{C1D4534E-1B22-4A44-850A-B3E8E9EE687A}" type="slidenum">
               <a:rPr lang="en-US" smtClean="0"/>
-              <a:t>22</a:t>
+              <a:t>24</a:t>
             </a:fld>
             <a:endParaRPr lang="en-US"/>
           </a:p>
@@ -11966,7 +13532,7 @@
 </p:sld>
 </file>
 
-<file path=ppt/slides/slide23.xml><?xml version="1.0" encoding="utf-8"?>
+<file path=ppt/slides/slide25.xml><?xml version="1.0" encoding="utf-8"?>
 <p:sld xmlns:a="http://schemas.openxmlformats.org/drawingml/2006/main" xmlns:r="http://schemas.openxmlformats.org/officeDocument/2006/relationships" xmlns:p="http://schemas.openxmlformats.org/presentationml/2006/main">
   <p:cSld>
     <p:spTree>
@@ -12201,7 +13767,7 @@
           <a:p>
             <a:fld id="{C1D4534E-1B22-4A44-850A-B3E8E9EE687A}" type="slidenum">
               <a:rPr lang="en-US" smtClean="0"/>
-              <a:t>23</a:t>
+              <a:t>25</a:t>
             </a:fld>
             <a:endParaRPr lang="en-US"/>
           </a:p>
@@ -12301,7 +13867,7 @@
 </p:sld>
 </file>
 
-<file path=ppt/slides/slide24.xml><?xml version="1.0" encoding="utf-8"?>
+<file path=ppt/slides/slide26.xml><?xml version="1.0" encoding="utf-8"?>
 <p:sld xmlns:a="http://schemas.openxmlformats.org/drawingml/2006/main" xmlns:r="http://schemas.openxmlformats.org/officeDocument/2006/relationships" xmlns:p="http://schemas.openxmlformats.org/presentationml/2006/main">
   <p:cSld>
     <p:spTree>
@@ -12696,7 +14262,7 @@
           <a:p>
             <a:fld id="{C1D4534E-1B22-4A44-850A-B3E8E9EE687A}" type="slidenum">
               <a:rPr lang="en-US" smtClean="0"/>
-              <a:t>24</a:t>
+              <a:t>26</a:t>
             </a:fld>
             <a:endParaRPr lang="en-US"/>
           </a:p>
@@ -12905,453 +14471,6 @@
 </p:sld>
 </file>
 
-<file path=ppt/slides/slide25.xml><?xml version="1.0" encoding="utf-8"?>
-<p:sld xmlns:a="http://schemas.openxmlformats.org/drawingml/2006/main" xmlns:r="http://schemas.openxmlformats.org/officeDocument/2006/relationships" xmlns:p="http://schemas.openxmlformats.org/presentationml/2006/main">
-  <p:cSld>
-    <p:spTree>
-      <p:nvGrpSpPr>
-        <p:cNvPr id="1" name=""/>
-        <p:cNvGrpSpPr/>
-        <p:nvPr/>
-      </p:nvGrpSpPr>
-      <p:grpSpPr>
-        <a:xfrm>
-          <a:off x="0" y="0"/>
-          <a:ext cx="0" cy="0"/>
-          <a:chOff x="0" y="0"/>
-          <a:chExt cx="0" cy="0"/>
-        </a:xfrm>
-      </p:grpSpPr>
-      <p:sp>
-        <p:nvSpPr>
-          <p:cNvPr id="2" name="Title 1"/>
-          <p:cNvSpPr>
-            <a:spLocks noGrp="1"/>
-          </p:cNvSpPr>
-          <p:nvPr>
-            <p:ph type="title"/>
-          </p:nvPr>
-        </p:nvSpPr>
-        <p:spPr/>
-        <p:txBody>
-          <a:bodyPr/>
-          <a:lstStyle/>
-          <a:p>
-            <a:r>
-              <a:rPr lang="en-US" dirty="0"/>
-              <a:t>Summary</a:t>
-            </a:r>
-          </a:p>
-        </p:txBody>
-      </p:sp>
-      <p:sp>
-        <p:nvSpPr>
-          <p:cNvPr id="3" name="Content Placeholder 2"/>
-          <p:cNvSpPr>
-            <a:spLocks noGrp="1"/>
-          </p:cNvSpPr>
-          <p:nvPr>
-            <p:ph idx="1"/>
-          </p:nvPr>
-        </p:nvSpPr>
-        <p:spPr/>
-        <p:txBody>
-          <a:bodyPr>
-            <a:normAutofit/>
-          </a:bodyPr>
-          <a:lstStyle/>
-          <a:p>
-            <a:r>
-              <a:rPr lang="en-US" dirty="0"/>
-              <a:t>Nested Lists occur all the time</a:t>
-            </a:r>
-          </a:p>
-          <a:p>
-            <a:r>
-              <a:rPr lang="en-US" dirty="0"/>
-              <a:t>Mutually recursive data definitions</a:t>
-            </a:r>
-          </a:p>
-          <a:p>
-            <a:r>
-              <a:rPr lang="en-US" dirty="0"/>
-              <a:t>Mutual recursion in the data definition leads to mutual recursion in the template</a:t>
-            </a:r>
-          </a:p>
-          <a:p>
-            <a:r>
-              <a:rPr lang="en-US" dirty="0"/>
-              <a:t>Mutual recursion in the template leads to mutual recursion in the code</a:t>
-            </a:r>
-          </a:p>
-        </p:txBody>
-      </p:sp>
-      <p:sp>
-        <p:nvSpPr>
-          <p:cNvPr id="4" name="Slide Number Placeholder 3"/>
-          <p:cNvSpPr>
-            <a:spLocks noGrp="1"/>
-          </p:cNvSpPr>
-          <p:nvPr>
-            <p:ph type="sldNum" sz="quarter" idx="12"/>
-          </p:nvPr>
-        </p:nvSpPr>
-        <p:spPr/>
-        <p:txBody>
-          <a:bodyPr/>
-          <a:lstStyle/>
-          <a:p>
-            <a:fld id="{C1D4534E-1B22-4A44-850A-B3E8E9EE687A}" type="slidenum">
-              <a:rPr lang="en-US" smtClean="0"/>
-              <a:t>25</a:t>
-            </a:fld>
-            <a:endParaRPr lang="en-US"/>
-          </a:p>
-        </p:txBody>
-      </p:sp>
-    </p:spTree>
-    <p:extLst>
-      <p:ext uri="{BB962C8B-B14F-4D97-AF65-F5344CB8AC3E}">
-        <p14:creationId xmlns:p14="http://schemas.microsoft.com/office/powerpoint/2010/main" val="3085036809"/>
-      </p:ext>
-    </p:extLst>
-  </p:cSld>
-  <p:clrMapOvr>
-    <a:masterClrMapping/>
-  </p:clrMapOvr>
-</p:sld>
-</file>
-
-<file path=ppt/slides/slide26.xml><?xml version="1.0" encoding="utf-8"?>
-<p:sld xmlns:a="http://schemas.openxmlformats.org/drawingml/2006/main" xmlns:r="http://schemas.openxmlformats.org/officeDocument/2006/relationships" xmlns:p="http://schemas.openxmlformats.org/presentationml/2006/main">
-  <p:cSld>
-    <p:spTree>
-      <p:nvGrpSpPr>
-        <p:cNvPr id="1" name=""/>
-        <p:cNvGrpSpPr/>
-        <p:nvPr/>
-      </p:nvGrpSpPr>
-      <p:grpSpPr>
-        <a:xfrm>
-          <a:off x="0" y="0"/>
-          <a:ext cx="0" cy="0"/>
-          <a:chOff x="0" y="0"/>
-          <a:chExt cx="0" cy="0"/>
-        </a:xfrm>
-      </p:grpSpPr>
-      <p:sp>
-        <p:nvSpPr>
-          <p:cNvPr id="2" name="Title 1"/>
-          <p:cNvSpPr>
-            <a:spLocks noGrp="1"/>
-          </p:cNvSpPr>
-          <p:nvPr>
-            <p:ph type="title"/>
-          </p:nvPr>
-        </p:nvSpPr>
-        <p:spPr>
-          <a:noFill/>
-        </p:spPr>
-        <p:txBody>
-          <a:bodyPr/>
-          <a:lstStyle/>
-          <a:p>
-            <a:r>
-              <a:rPr lang="en-US" dirty="0"/>
-              <a:t>More Examples</a:t>
-            </a:r>
-          </a:p>
-        </p:txBody>
-      </p:sp>
-      <p:sp>
-        <p:nvSpPr>
-          <p:cNvPr id="3" name="Content Placeholder 2"/>
-          <p:cNvSpPr>
-            <a:spLocks noGrp="1"/>
-          </p:cNvSpPr>
-          <p:nvPr>
-            <p:ph idx="1"/>
-          </p:nvPr>
-        </p:nvSpPr>
-        <p:spPr/>
-        <p:txBody>
-          <a:bodyPr>
-            <a:normAutofit lnSpcReduction="10000"/>
-          </a:bodyPr>
-          <a:lstStyle/>
-          <a:p>
-            <a:pPr>
-              <a:buNone/>
-            </a:pPr>
-            <a:r>
-              <a:rPr lang="en-US" sz="2000" b="1" dirty="0">
-                <a:latin typeface="Consolas" pitchFamily="49" charset="0"/>
-                <a:cs typeface="Consolas" pitchFamily="49" charset="0"/>
-              </a:rPr>
-              <a:t>;; number-of-strings : </a:t>
-            </a:r>
-            <a:r>
-              <a:rPr lang="en-US" sz="2000" b="1" dirty="0" err="1">
-                <a:latin typeface="Consolas" pitchFamily="49" charset="0"/>
-                <a:cs typeface="Consolas" pitchFamily="49" charset="0"/>
-              </a:rPr>
-              <a:t>SoS</a:t>
-            </a:r>
-            <a:r>
-              <a:rPr lang="en-US" sz="2000" b="1" dirty="0">
-                <a:latin typeface="Consolas" pitchFamily="49" charset="0"/>
-                <a:cs typeface="Consolas" pitchFamily="49" charset="0"/>
-              </a:rPr>
-              <a:t> -&gt; Number</a:t>
-            </a:r>
-          </a:p>
-          <a:p>
-            <a:pPr>
-              <a:buNone/>
-            </a:pPr>
-            <a:r>
-              <a:rPr lang="en-US" sz="2000" b="1" dirty="0">
-                <a:latin typeface="Consolas" pitchFamily="49" charset="0"/>
-                <a:cs typeface="Consolas" pitchFamily="49" charset="0"/>
-              </a:rPr>
-              <a:t>;; number-of-strings-in-loss : </a:t>
-            </a:r>
-            <a:r>
-              <a:rPr lang="en-US" sz="2000" b="1" dirty="0" err="1">
-                <a:latin typeface="Consolas" pitchFamily="49" charset="0"/>
-                <a:cs typeface="Consolas" pitchFamily="49" charset="0"/>
-              </a:rPr>
-              <a:t>LoSS</a:t>
-            </a:r>
-            <a:r>
-              <a:rPr lang="en-US" sz="2000" b="1" dirty="0">
-                <a:latin typeface="Consolas" pitchFamily="49" charset="0"/>
-                <a:cs typeface="Consolas" pitchFamily="49" charset="0"/>
-              </a:rPr>
-              <a:t> -&gt; Number</a:t>
-            </a:r>
-          </a:p>
-          <a:p>
-            <a:pPr>
-              <a:buNone/>
-            </a:pPr>
-            <a:r>
-              <a:rPr lang="en-US" sz="2000" b="1" dirty="0">
-                <a:latin typeface="Consolas" pitchFamily="49" charset="0"/>
-                <a:cs typeface="Consolas" pitchFamily="49" charset="0"/>
-              </a:rPr>
-              <a:t>;; returns the number of strings in the given </a:t>
-            </a:r>
-            <a:r>
-              <a:rPr lang="en-US" sz="2000" b="1" dirty="0" err="1">
-                <a:latin typeface="Consolas" pitchFamily="49" charset="0"/>
-                <a:cs typeface="Consolas" pitchFamily="49" charset="0"/>
-              </a:rPr>
-              <a:t>sos</a:t>
-            </a:r>
-            <a:r>
-              <a:rPr lang="en-US" sz="2000" b="1" dirty="0">
-                <a:latin typeface="Consolas" pitchFamily="49" charset="0"/>
-                <a:cs typeface="Consolas" pitchFamily="49" charset="0"/>
-              </a:rPr>
-              <a:t> or loss.</a:t>
-            </a:r>
-          </a:p>
-          <a:p>
-            <a:pPr>
-              <a:buNone/>
-            </a:pPr>
-            <a:endParaRPr lang="en-US" sz="2000" b="1" dirty="0">
-              <a:latin typeface="Consolas" pitchFamily="49" charset="0"/>
-              <a:cs typeface="Consolas" pitchFamily="49" charset="0"/>
-            </a:endParaRPr>
-          </a:p>
-          <a:p>
-            <a:pPr>
-              <a:buNone/>
-            </a:pPr>
-            <a:r>
-              <a:rPr lang="en-US" sz="2000" b="1" dirty="0">
-                <a:latin typeface="Consolas" pitchFamily="49" charset="0"/>
-                <a:cs typeface="Consolas" pitchFamily="49" charset="0"/>
-              </a:rPr>
-              <a:t>;; characters-in : </a:t>
-            </a:r>
-            <a:r>
-              <a:rPr lang="en-US" sz="2000" b="1" dirty="0" err="1">
-                <a:latin typeface="Consolas" pitchFamily="49" charset="0"/>
-                <a:cs typeface="Consolas" pitchFamily="49" charset="0"/>
-              </a:rPr>
-              <a:t>SoS</a:t>
-            </a:r>
-            <a:r>
-              <a:rPr lang="en-US" sz="2000" b="1" dirty="0">
-                <a:latin typeface="Consolas" pitchFamily="49" charset="0"/>
-                <a:cs typeface="Consolas" pitchFamily="49" charset="0"/>
-              </a:rPr>
-              <a:t> -&gt; Number</a:t>
-            </a:r>
-          </a:p>
-          <a:p>
-            <a:pPr>
-              <a:buNone/>
-            </a:pPr>
-            <a:r>
-              <a:rPr lang="en-US" sz="2000" b="1" dirty="0">
-                <a:latin typeface="Consolas" pitchFamily="49" charset="0"/>
-                <a:cs typeface="Consolas" pitchFamily="49" charset="0"/>
-              </a:rPr>
-              <a:t>;; characters-in-loss : </a:t>
-            </a:r>
-            <a:r>
-              <a:rPr lang="en-US" sz="2000" b="1" dirty="0" err="1">
-                <a:latin typeface="Consolas" pitchFamily="49" charset="0"/>
-                <a:cs typeface="Consolas" pitchFamily="49" charset="0"/>
-              </a:rPr>
-              <a:t>LoSS</a:t>
-            </a:r>
-            <a:r>
-              <a:rPr lang="en-US" sz="2000" b="1" dirty="0">
-                <a:latin typeface="Consolas" pitchFamily="49" charset="0"/>
-                <a:cs typeface="Consolas" pitchFamily="49" charset="0"/>
-              </a:rPr>
-              <a:t> -&gt; Number</a:t>
-            </a:r>
-          </a:p>
-          <a:p>
-            <a:pPr>
-              <a:buNone/>
-            </a:pPr>
-            <a:r>
-              <a:rPr lang="en-US" sz="2000" b="1" dirty="0">
-                <a:latin typeface="Consolas" pitchFamily="49" charset="0"/>
-                <a:cs typeface="Consolas" pitchFamily="49" charset="0"/>
-              </a:rPr>
-              <a:t>;; returns the total number of characters in the strings in the given </a:t>
-            </a:r>
-            <a:r>
-              <a:rPr lang="en-US" sz="2000" b="1" dirty="0" err="1">
-                <a:latin typeface="Consolas" pitchFamily="49" charset="0"/>
-                <a:cs typeface="Consolas" pitchFamily="49" charset="0"/>
-              </a:rPr>
-              <a:t>sos</a:t>
-            </a:r>
-            <a:r>
-              <a:rPr lang="en-US" sz="2000" b="1" dirty="0">
-                <a:latin typeface="Consolas" pitchFamily="49" charset="0"/>
-                <a:cs typeface="Consolas" pitchFamily="49" charset="0"/>
-              </a:rPr>
-              <a:t> or loss.</a:t>
-            </a:r>
-          </a:p>
-          <a:p>
-            <a:pPr>
-              <a:buNone/>
-            </a:pPr>
-            <a:endParaRPr lang="en-US" sz="2000" b="1" dirty="0">
-              <a:latin typeface="Consolas" pitchFamily="49" charset="0"/>
-              <a:cs typeface="Consolas" pitchFamily="49" charset="0"/>
-            </a:endParaRPr>
-          </a:p>
-          <a:p>
-            <a:pPr>
-              <a:buNone/>
-            </a:pPr>
-            <a:r>
-              <a:rPr lang="en-US" sz="2000" b="1" dirty="0">
-                <a:latin typeface="Consolas" pitchFamily="49" charset="0"/>
-                <a:cs typeface="Consolas" pitchFamily="49" charset="0"/>
-              </a:rPr>
-              <a:t>;; number-of-sardines : </a:t>
-            </a:r>
-            <a:r>
-              <a:rPr lang="en-US" sz="2000" b="1" dirty="0" err="1">
-                <a:latin typeface="Consolas" pitchFamily="49" charset="0"/>
-                <a:cs typeface="Consolas" pitchFamily="49" charset="0"/>
-              </a:rPr>
-              <a:t>SoSardines</a:t>
-            </a:r>
-            <a:r>
-              <a:rPr lang="en-US" sz="2000" b="1" dirty="0">
-                <a:latin typeface="Consolas" pitchFamily="49" charset="0"/>
-                <a:cs typeface="Consolas" pitchFamily="49" charset="0"/>
-              </a:rPr>
-              <a:t> -&gt; Number</a:t>
-            </a:r>
-          </a:p>
-          <a:p>
-            <a:pPr>
-              <a:buNone/>
-            </a:pPr>
-            <a:r>
-              <a:rPr lang="en-US" sz="2000" b="1" dirty="0">
-                <a:latin typeface="Consolas" pitchFamily="49" charset="0"/>
-                <a:cs typeface="Consolas" pitchFamily="49" charset="0"/>
-              </a:rPr>
-              <a:t>;; returns the total number of sardines in the given </a:t>
-            </a:r>
-            <a:r>
-              <a:rPr lang="en-US" sz="2000" b="1" dirty="0" err="1">
-                <a:latin typeface="Consolas" pitchFamily="49" charset="0"/>
-                <a:cs typeface="Consolas" pitchFamily="49" charset="0"/>
-              </a:rPr>
-              <a:t>SoSardines</a:t>
-            </a:r>
-            <a:r>
-              <a:rPr lang="en-US" sz="2000" b="1" dirty="0">
-                <a:latin typeface="Consolas" pitchFamily="49" charset="0"/>
-                <a:cs typeface="Consolas" pitchFamily="49" charset="0"/>
-              </a:rPr>
-              <a:t>.</a:t>
-            </a:r>
-          </a:p>
-          <a:p>
-            <a:pPr>
-              <a:buNone/>
-            </a:pPr>
-            <a:endParaRPr lang="en-US" sz="2000" b="1" dirty="0">
-              <a:latin typeface="Courier New" pitchFamily="49" charset="0"/>
-              <a:cs typeface="Courier New" pitchFamily="49" charset="0"/>
-            </a:endParaRPr>
-          </a:p>
-        </p:txBody>
-      </p:sp>
-      <p:sp>
-        <p:nvSpPr>
-          <p:cNvPr id="4" name="Slide Number Placeholder 3"/>
-          <p:cNvSpPr>
-            <a:spLocks noGrp="1"/>
-          </p:cNvSpPr>
-          <p:nvPr>
-            <p:ph type="sldNum" sz="quarter" idx="12"/>
-          </p:nvPr>
-        </p:nvSpPr>
-        <p:spPr/>
-        <p:txBody>
-          <a:bodyPr/>
-          <a:lstStyle/>
-          <a:p>
-            <a:fld id="{C1D4534E-1B22-4A44-850A-B3E8E9EE687A}" type="slidenum">
-              <a:rPr lang="en-US" smtClean="0"/>
-              <a:t>26</a:t>
-            </a:fld>
-            <a:endParaRPr lang="en-US"/>
-          </a:p>
-        </p:txBody>
-      </p:sp>
-    </p:spTree>
-    <p:extLst>
-      <p:ext uri="{BB962C8B-B14F-4D97-AF65-F5344CB8AC3E}">
-        <p14:creationId xmlns:p14="http://schemas.microsoft.com/office/powerpoint/2010/main" val="351135100"/>
-      </p:ext>
-    </p:extLst>
-  </p:cSld>
-  <p:clrMapOvr>
-    <a:masterClrMapping/>
-  </p:clrMapOvr>
-</p:sld>
-</file>
-
 <file path=ppt/slides/slide27.xml><?xml version="1.0" encoding="utf-8"?>
 <p:sld xmlns:a="http://schemas.openxmlformats.org/drawingml/2006/main" xmlns:r="http://schemas.openxmlformats.org/officeDocument/2006/relationships" xmlns:p="http://schemas.openxmlformats.org/presentationml/2006/main">
   <p:cSld>
@@ -13410,40 +14529,26 @@
           <a:p>
             <a:r>
               <a:rPr lang="en-US" dirty="0"/>
-              <a:t>You should now be able to:</a:t>
-            </a:r>
-          </a:p>
-          <a:p>
-            <a:pPr lvl="1"/>
+              <a:t>Nested Lists occur all the time</a:t>
+            </a:r>
+          </a:p>
+          <a:p>
             <a:r>
               <a:rPr lang="en-US" dirty="0"/>
-              <a:t>Give examples of S-expressions</a:t>
-            </a:r>
-          </a:p>
-          <a:p>
-            <a:pPr lvl="1"/>
+              <a:t>Mutually recursive data definitions</a:t>
+            </a:r>
+          </a:p>
+          <a:p>
             <a:r>
               <a:rPr lang="en-US" dirty="0"/>
-              <a:t>Give 3 reasons why S-expressions are important</a:t>
-            </a:r>
-          </a:p>
-          <a:p>
-            <a:pPr lvl="1"/>
+              <a:t>Mutual recursion in the data definition leads to mutual recursion in the template</a:t>
+            </a:r>
+          </a:p>
+          <a:p>
             <a:r>
               <a:rPr lang="en-US" dirty="0"/>
-              <a:t>Write the data definition and template for S-expressions</a:t>
-            </a:r>
-          </a:p>
-          <a:p>
-            <a:pPr lvl="1"/>
-            <a:r>
-              <a:rPr lang="en-US" dirty="0"/>
-              <a:t>Write functions on S-expressions using the template</a:t>
-            </a:r>
-          </a:p>
-          <a:p>
-            <a:pPr lvl="1"/>
-            <a:endParaRPr lang="en-US" dirty="0"/>
+              <a:t>Mutual recursion in the template leads to mutual recursion in the code</a:t>
+            </a:r>
           </a:p>
         </p:txBody>
       </p:sp>
@@ -13473,7 +14578,7 @@
     </p:spTree>
     <p:extLst>
       <p:ext uri="{BB962C8B-B14F-4D97-AF65-F5344CB8AC3E}">
-        <p14:creationId xmlns:p14="http://schemas.microsoft.com/office/powerpoint/2010/main" val="2281643218"/>
+        <p14:creationId xmlns:p14="http://schemas.microsoft.com/office/powerpoint/2010/main" val="3085036809"/>
       </p:ext>
     </p:extLst>
   </p:cSld>
@@ -13510,14 +14615,16 @@
             <p:ph type="title"/>
           </p:nvPr>
         </p:nvSpPr>
-        <p:spPr/>
+        <p:spPr>
+          <a:noFill/>
+        </p:spPr>
         <p:txBody>
           <a:bodyPr/>
           <a:lstStyle/>
           <a:p>
             <a:r>
               <a:rPr lang="en-US" dirty="0"/>
-              <a:t>Next Steps</a:t>
+              <a:t>More Examples</a:t>
             </a:r>
           </a:p>
         </p:txBody>
@@ -13534,38 +14641,244 @@
         </p:nvSpPr>
         <p:spPr/>
         <p:txBody>
-          <a:bodyPr/>
-          <a:lstStyle/>
-          <a:p>
-            <a:r>
-              <a:rPr lang="en-US" dirty="0"/>
-              <a:t>Study the files 06-5-sos-derivation.rkt and 06-6-sos-and-loss.rkt in the Examples folder</a:t>
-            </a:r>
-          </a:p>
-          <a:p>
-            <a:r>
-              <a:rPr lang="en-US" dirty="0"/>
-              <a:t>If you have questions about this lesson, ask them on the Discussion Board</a:t>
-            </a:r>
-          </a:p>
-          <a:p>
-            <a:r>
-              <a:rPr lang="en-US" dirty="0"/>
-              <a:t>Do </a:t>
-            </a:r>
-            <a:r>
-              <a:rPr lang="en-US" dirty="0">
-                <a:hlinkClick r:id="rId2" action="ppaction://hlinkfile"/>
-              </a:rPr>
-              <a:t>Guided Practice 6.5</a:t>
-            </a:r>
-            <a:endParaRPr lang="en-US" dirty="0"/>
-          </a:p>
-          <a:p>
-            <a:r>
-              <a:rPr lang="en-US" dirty="0"/>
-              <a:t>Go on to the next lesson</a:t>
-            </a:r>
+          <a:bodyPr>
+            <a:normAutofit lnSpcReduction="10000"/>
+          </a:bodyPr>
+          <a:lstStyle/>
+          <a:p>
+            <a:pPr>
+              <a:buNone/>
+            </a:pPr>
+            <a:r>
+              <a:rPr lang="en-US" sz="2000" b="1" dirty="0">
+                <a:latin typeface="Consolas" pitchFamily="49" charset="0"/>
+                <a:cs typeface="Consolas" pitchFamily="49" charset="0"/>
+              </a:rPr>
+              <a:t>;; number-of-strings : </a:t>
+            </a:r>
+            <a:r>
+              <a:rPr lang="en-US" sz="2000" b="1" dirty="0" err="1">
+                <a:latin typeface="Consolas" pitchFamily="49" charset="0"/>
+                <a:cs typeface="Consolas" pitchFamily="49" charset="0"/>
+              </a:rPr>
+              <a:t>SoS</a:t>
+            </a:r>
+            <a:r>
+              <a:rPr lang="en-US" sz="2000" b="1" dirty="0">
+                <a:latin typeface="Consolas" pitchFamily="49" charset="0"/>
+                <a:cs typeface="Consolas" pitchFamily="49" charset="0"/>
+              </a:rPr>
+              <a:t> -&gt; Number</a:t>
+            </a:r>
+          </a:p>
+          <a:p>
+            <a:pPr>
+              <a:buNone/>
+            </a:pPr>
+            <a:r>
+              <a:rPr lang="en-US" sz="2000" b="1" dirty="0">
+                <a:latin typeface="Consolas" pitchFamily="49" charset="0"/>
+                <a:cs typeface="Consolas" pitchFamily="49" charset="0"/>
+              </a:rPr>
+              <a:t>;; number-of-strings-in-loss : </a:t>
+            </a:r>
+            <a:r>
+              <a:rPr lang="en-US" sz="2000" b="1" dirty="0" err="1">
+                <a:latin typeface="Consolas" pitchFamily="49" charset="0"/>
+                <a:cs typeface="Consolas" pitchFamily="49" charset="0"/>
+              </a:rPr>
+              <a:t>LoSS</a:t>
+            </a:r>
+            <a:r>
+              <a:rPr lang="en-US" sz="2000" b="1" dirty="0">
+                <a:latin typeface="Consolas" pitchFamily="49" charset="0"/>
+                <a:cs typeface="Consolas" pitchFamily="49" charset="0"/>
+              </a:rPr>
+              <a:t> -&gt; Number</a:t>
+            </a:r>
+          </a:p>
+          <a:p>
+            <a:pPr>
+              <a:buNone/>
+            </a:pPr>
+            <a:r>
+              <a:rPr lang="en-US" sz="2000" b="1" dirty="0">
+                <a:latin typeface="Consolas" pitchFamily="49" charset="0"/>
+                <a:cs typeface="Consolas" pitchFamily="49" charset="0"/>
+              </a:rPr>
+              <a:t>;; returns the number of strings in the given </a:t>
+            </a:r>
+            <a:r>
+              <a:rPr lang="en-US" sz="2000" b="1" dirty="0" err="1">
+                <a:latin typeface="Consolas" pitchFamily="49" charset="0"/>
+                <a:cs typeface="Consolas" pitchFamily="49" charset="0"/>
+              </a:rPr>
+              <a:t>sos</a:t>
+            </a:r>
+            <a:r>
+              <a:rPr lang="en-US" sz="2000" b="1" dirty="0">
+                <a:latin typeface="Consolas" pitchFamily="49" charset="0"/>
+                <a:cs typeface="Consolas" pitchFamily="49" charset="0"/>
+              </a:rPr>
+              <a:t> or loss.</a:t>
+            </a:r>
+          </a:p>
+          <a:p>
+            <a:pPr>
+              <a:buNone/>
+            </a:pPr>
+            <a:endParaRPr lang="en-US" sz="2000" b="1" dirty="0">
+              <a:latin typeface="Consolas" pitchFamily="49" charset="0"/>
+              <a:cs typeface="Consolas" pitchFamily="49" charset="0"/>
+            </a:endParaRPr>
+          </a:p>
+          <a:p>
+            <a:pPr>
+              <a:buNone/>
+            </a:pPr>
+            <a:r>
+              <a:rPr lang="en-US" sz="2000" b="1" dirty="0">
+                <a:latin typeface="Consolas" pitchFamily="49" charset="0"/>
+                <a:cs typeface="Consolas" pitchFamily="49" charset="0"/>
+              </a:rPr>
+              <a:t>;; characters-in : </a:t>
+            </a:r>
+            <a:r>
+              <a:rPr lang="en-US" sz="2000" b="1" dirty="0" err="1">
+                <a:latin typeface="Consolas" pitchFamily="49" charset="0"/>
+                <a:cs typeface="Consolas" pitchFamily="49" charset="0"/>
+              </a:rPr>
+              <a:t>SoS</a:t>
+            </a:r>
+            <a:r>
+              <a:rPr lang="en-US" sz="2000" b="1" dirty="0">
+                <a:latin typeface="Consolas" pitchFamily="49" charset="0"/>
+                <a:cs typeface="Consolas" pitchFamily="49" charset="0"/>
+              </a:rPr>
+              <a:t> -&gt; Number</a:t>
+            </a:r>
+          </a:p>
+          <a:p>
+            <a:pPr>
+              <a:buNone/>
+            </a:pPr>
+            <a:r>
+              <a:rPr lang="en-US" sz="2000" b="1" dirty="0">
+                <a:latin typeface="Consolas" pitchFamily="49" charset="0"/>
+                <a:cs typeface="Consolas" pitchFamily="49" charset="0"/>
+              </a:rPr>
+              <a:t>;; characters-in-loss : </a:t>
+            </a:r>
+            <a:r>
+              <a:rPr lang="en-US" sz="2000" b="1" dirty="0" err="1">
+                <a:latin typeface="Consolas" pitchFamily="49" charset="0"/>
+                <a:cs typeface="Consolas" pitchFamily="49" charset="0"/>
+              </a:rPr>
+              <a:t>LoSS</a:t>
+            </a:r>
+            <a:r>
+              <a:rPr lang="en-US" sz="2000" b="1" dirty="0">
+                <a:latin typeface="Consolas" pitchFamily="49" charset="0"/>
+                <a:cs typeface="Consolas" pitchFamily="49" charset="0"/>
+              </a:rPr>
+              <a:t> -&gt; Number</a:t>
+            </a:r>
+          </a:p>
+          <a:p>
+            <a:pPr>
+              <a:buNone/>
+            </a:pPr>
+            <a:r>
+              <a:rPr lang="en-US" sz="2000" b="1" dirty="0">
+                <a:latin typeface="Consolas" pitchFamily="49" charset="0"/>
+                <a:cs typeface="Consolas" pitchFamily="49" charset="0"/>
+              </a:rPr>
+              <a:t>;; returns the total number of characters in the strings in the given </a:t>
+            </a:r>
+            <a:r>
+              <a:rPr lang="en-US" sz="2000" b="1" dirty="0" err="1">
+                <a:latin typeface="Consolas" pitchFamily="49" charset="0"/>
+                <a:cs typeface="Consolas" pitchFamily="49" charset="0"/>
+              </a:rPr>
+              <a:t>sos</a:t>
+            </a:r>
+            <a:r>
+              <a:rPr lang="en-US" sz="2000" b="1" dirty="0">
+                <a:latin typeface="Consolas" pitchFamily="49" charset="0"/>
+                <a:cs typeface="Consolas" pitchFamily="49" charset="0"/>
+              </a:rPr>
+              <a:t> or loss.</a:t>
+            </a:r>
+          </a:p>
+          <a:p>
+            <a:pPr>
+              <a:buNone/>
+            </a:pPr>
+            <a:endParaRPr lang="en-US" sz="2000" b="1" dirty="0">
+              <a:latin typeface="Consolas" pitchFamily="49" charset="0"/>
+              <a:cs typeface="Consolas" pitchFamily="49" charset="0"/>
+            </a:endParaRPr>
+          </a:p>
+          <a:p>
+            <a:pPr>
+              <a:buNone/>
+            </a:pPr>
+            <a:r>
+              <a:rPr lang="en-US" sz="2000" b="1" dirty="0">
+                <a:latin typeface="Consolas" pitchFamily="49" charset="0"/>
+                <a:cs typeface="Consolas" pitchFamily="49" charset="0"/>
+              </a:rPr>
+              <a:t>;; number-of-sardines : </a:t>
+            </a:r>
+            <a:r>
+              <a:rPr lang="en-US" sz="2000" b="1" dirty="0" err="1">
+                <a:latin typeface="Consolas" pitchFamily="49" charset="0"/>
+                <a:cs typeface="Consolas" pitchFamily="49" charset="0"/>
+              </a:rPr>
+              <a:t>SoSardines</a:t>
+            </a:r>
+            <a:r>
+              <a:rPr lang="en-US" sz="2000" b="1" dirty="0">
+                <a:latin typeface="Consolas" pitchFamily="49" charset="0"/>
+                <a:cs typeface="Consolas" pitchFamily="49" charset="0"/>
+              </a:rPr>
+              <a:t> -&gt; Number</a:t>
+            </a:r>
+          </a:p>
+          <a:p>
+            <a:pPr>
+              <a:buNone/>
+            </a:pPr>
+            <a:r>
+              <a:rPr lang="en-US" sz="2000" b="1" dirty="0">
+                <a:latin typeface="Consolas" pitchFamily="49" charset="0"/>
+                <a:cs typeface="Consolas" pitchFamily="49" charset="0"/>
+              </a:rPr>
+              <a:t>;; returns the total number of sardines in the given </a:t>
+            </a:r>
+            <a:r>
+              <a:rPr lang="en-US" sz="2000" b="1" dirty="0" err="1">
+                <a:latin typeface="Consolas" pitchFamily="49" charset="0"/>
+                <a:cs typeface="Consolas" pitchFamily="49" charset="0"/>
+              </a:rPr>
+              <a:t>SoSardines</a:t>
+            </a:r>
+            <a:r>
+              <a:rPr lang="en-US" sz="2000" b="1" dirty="0">
+                <a:latin typeface="Consolas" pitchFamily="49" charset="0"/>
+                <a:cs typeface="Consolas" pitchFamily="49" charset="0"/>
+              </a:rPr>
+              <a:t>.</a:t>
+            </a:r>
+          </a:p>
+          <a:p>
+            <a:pPr>
+              <a:buNone/>
+            </a:pPr>
+            <a:endParaRPr lang="en-US" sz="2000" b="1" dirty="0">
+              <a:latin typeface="Courier New" pitchFamily="49" charset="0"/>
+              <a:cs typeface="Courier New" pitchFamily="49" charset="0"/>
+            </a:endParaRPr>
           </a:p>
         </p:txBody>
       </p:sp>
@@ -13595,7 +14908,138 @@
     </p:spTree>
     <p:extLst>
       <p:ext uri="{BB962C8B-B14F-4D97-AF65-F5344CB8AC3E}">
-        <p14:creationId xmlns:p14="http://schemas.microsoft.com/office/powerpoint/2010/main" val="3025411515"/>
+        <p14:creationId xmlns:p14="http://schemas.microsoft.com/office/powerpoint/2010/main" val="351135100"/>
+      </p:ext>
+    </p:extLst>
+  </p:cSld>
+  <p:clrMapOvr>
+    <a:masterClrMapping/>
+  </p:clrMapOvr>
+</p:sld>
+</file>
+
+<file path=ppt/slides/slide29.xml><?xml version="1.0" encoding="utf-8"?>
+<p:sld xmlns:a="http://schemas.openxmlformats.org/drawingml/2006/main" xmlns:r="http://schemas.openxmlformats.org/officeDocument/2006/relationships" xmlns:p="http://schemas.openxmlformats.org/presentationml/2006/main">
+  <p:cSld>
+    <p:spTree>
+      <p:nvGrpSpPr>
+        <p:cNvPr id="1" name=""/>
+        <p:cNvGrpSpPr/>
+        <p:nvPr/>
+      </p:nvGrpSpPr>
+      <p:grpSpPr>
+        <a:xfrm>
+          <a:off x="0" y="0"/>
+          <a:ext cx="0" cy="0"/>
+          <a:chOff x="0" y="0"/>
+          <a:chExt cx="0" cy="0"/>
+        </a:xfrm>
+      </p:grpSpPr>
+      <p:sp>
+        <p:nvSpPr>
+          <p:cNvPr id="2" name="Title 1"/>
+          <p:cNvSpPr>
+            <a:spLocks noGrp="1"/>
+          </p:cNvSpPr>
+          <p:nvPr>
+            <p:ph type="title"/>
+          </p:nvPr>
+        </p:nvSpPr>
+        <p:spPr/>
+        <p:txBody>
+          <a:bodyPr/>
+          <a:lstStyle/>
+          <a:p>
+            <a:r>
+              <a:rPr lang="en-US" dirty="0"/>
+              <a:t>Summary</a:t>
+            </a:r>
+          </a:p>
+        </p:txBody>
+      </p:sp>
+      <p:sp>
+        <p:nvSpPr>
+          <p:cNvPr id="3" name="Content Placeholder 2"/>
+          <p:cNvSpPr>
+            <a:spLocks noGrp="1"/>
+          </p:cNvSpPr>
+          <p:nvPr>
+            <p:ph idx="1"/>
+          </p:nvPr>
+        </p:nvSpPr>
+        <p:spPr/>
+        <p:txBody>
+          <a:bodyPr>
+            <a:normAutofit/>
+          </a:bodyPr>
+          <a:lstStyle/>
+          <a:p>
+            <a:r>
+              <a:rPr lang="en-US" dirty="0"/>
+              <a:t>You should now be able to:</a:t>
+            </a:r>
+          </a:p>
+          <a:p>
+            <a:pPr lvl="1"/>
+            <a:r>
+              <a:rPr lang="en-US" dirty="0"/>
+              <a:t>Give examples of S-expressions</a:t>
+            </a:r>
+          </a:p>
+          <a:p>
+            <a:pPr lvl="1"/>
+            <a:r>
+              <a:rPr lang="en-US" dirty="0"/>
+              <a:t>Give 3 reasons why S-expressions are important</a:t>
+            </a:r>
+          </a:p>
+          <a:p>
+            <a:pPr lvl="1"/>
+            <a:r>
+              <a:rPr lang="en-US" dirty="0"/>
+              <a:t>Write the data definition and template for S-expressions</a:t>
+            </a:r>
+          </a:p>
+          <a:p>
+            <a:pPr lvl="1"/>
+            <a:r>
+              <a:rPr lang="en-US" dirty="0"/>
+              <a:t>Write functions on S-expressions using the template</a:t>
+            </a:r>
+          </a:p>
+          <a:p>
+            <a:pPr lvl="1"/>
+            <a:endParaRPr lang="en-US" dirty="0"/>
+          </a:p>
+        </p:txBody>
+      </p:sp>
+      <p:sp>
+        <p:nvSpPr>
+          <p:cNvPr id="4" name="Slide Number Placeholder 3"/>
+          <p:cNvSpPr>
+            <a:spLocks noGrp="1"/>
+          </p:cNvSpPr>
+          <p:nvPr>
+            <p:ph type="sldNum" sz="quarter" idx="12"/>
+          </p:nvPr>
+        </p:nvSpPr>
+        <p:spPr/>
+        <p:txBody>
+          <a:bodyPr/>
+          <a:lstStyle/>
+          <a:p>
+            <a:fld id="{C1D4534E-1B22-4A44-850A-B3E8E9EE687A}" type="slidenum">
+              <a:rPr lang="en-US" smtClean="0"/>
+              <a:t>29</a:t>
+            </a:fld>
+            <a:endParaRPr lang="en-US"/>
+          </a:p>
+        </p:txBody>
+      </p:sp>
+    </p:spTree>
+    <p:extLst>
+      <p:ext uri="{BB962C8B-B14F-4D97-AF65-F5344CB8AC3E}">
+        <p14:creationId xmlns:p14="http://schemas.microsoft.com/office/powerpoint/2010/main" val="2281643218"/>
       </p:ext>
     </p:extLst>
   </p:cSld>
@@ -13708,6 +15152,128 @@
     <p:extLst>
       <p:ext uri="{BB962C8B-B14F-4D97-AF65-F5344CB8AC3E}">
         <p14:creationId xmlns:p14="http://schemas.microsoft.com/office/powerpoint/2010/main" val="1646032405"/>
+      </p:ext>
+    </p:extLst>
+  </p:cSld>
+  <p:clrMapOvr>
+    <a:masterClrMapping/>
+  </p:clrMapOvr>
+</p:sld>
+</file>
+
+<file path=ppt/slides/slide30.xml><?xml version="1.0" encoding="utf-8"?>
+<p:sld xmlns:a="http://schemas.openxmlformats.org/drawingml/2006/main" xmlns:r="http://schemas.openxmlformats.org/officeDocument/2006/relationships" xmlns:p="http://schemas.openxmlformats.org/presentationml/2006/main">
+  <p:cSld>
+    <p:spTree>
+      <p:nvGrpSpPr>
+        <p:cNvPr id="1" name=""/>
+        <p:cNvGrpSpPr/>
+        <p:nvPr/>
+      </p:nvGrpSpPr>
+      <p:grpSpPr>
+        <a:xfrm>
+          <a:off x="0" y="0"/>
+          <a:ext cx="0" cy="0"/>
+          <a:chOff x="0" y="0"/>
+          <a:chExt cx="0" cy="0"/>
+        </a:xfrm>
+      </p:grpSpPr>
+      <p:sp>
+        <p:nvSpPr>
+          <p:cNvPr id="2" name="Title 1"/>
+          <p:cNvSpPr>
+            <a:spLocks noGrp="1"/>
+          </p:cNvSpPr>
+          <p:nvPr>
+            <p:ph type="title"/>
+          </p:nvPr>
+        </p:nvSpPr>
+        <p:spPr/>
+        <p:txBody>
+          <a:bodyPr/>
+          <a:lstStyle/>
+          <a:p>
+            <a:r>
+              <a:rPr lang="en-US" dirty="0"/>
+              <a:t>Next Steps</a:t>
+            </a:r>
+          </a:p>
+        </p:txBody>
+      </p:sp>
+      <p:sp>
+        <p:nvSpPr>
+          <p:cNvPr id="3" name="Content Placeholder 2"/>
+          <p:cNvSpPr>
+            <a:spLocks noGrp="1"/>
+          </p:cNvSpPr>
+          <p:nvPr>
+            <p:ph idx="1"/>
+          </p:nvPr>
+        </p:nvSpPr>
+        <p:spPr/>
+        <p:txBody>
+          <a:bodyPr/>
+          <a:lstStyle/>
+          <a:p>
+            <a:r>
+              <a:rPr lang="en-US" dirty="0"/>
+              <a:t>Study the files 06-5-sos-derivation.rkt and 06-6-sos-and-loss.rkt in the Examples folder</a:t>
+            </a:r>
+          </a:p>
+          <a:p>
+            <a:r>
+              <a:rPr lang="en-US" dirty="0"/>
+              <a:t>If you have questions about this lesson, ask them on the Discussion Board</a:t>
+            </a:r>
+          </a:p>
+          <a:p>
+            <a:r>
+              <a:rPr lang="en-US" dirty="0"/>
+              <a:t>Do </a:t>
+            </a:r>
+            <a:r>
+              <a:rPr lang="en-US" dirty="0">
+                <a:hlinkClick r:id="rId2" action="ppaction://hlinkfile"/>
+              </a:rPr>
+              <a:t>Guided Practice 6.5</a:t>
+            </a:r>
+            <a:endParaRPr lang="en-US" dirty="0"/>
+          </a:p>
+          <a:p>
+            <a:r>
+              <a:rPr lang="en-US" dirty="0"/>
+              <a:t>Go on to the next lesson</a:t>
+            </a:r>
+          </a:p>
+        </p:txBody>
+      </p:sp>
+      <p:sp>
+        <p:nvSpPr>
+          <p:cNvPr id="4" name="Slide Number Placeholder 3"/>
+          <p:cNvSpPr>
+            <a:spLocks noGrp="1"/>
+          </p:cNvSpPr>
+          <p:nvPr>
+            <p:ph type="sldNum" sz="quarter" idx="12"/>
+          </p:nvPr>
+        </p:nvSpPr>
+        <p:spPr/>
+        <p:txBody>
+          <a:bodyPr/>
+          <a:lstStyle/>
+          <a:p>
+            <a:fld id="{C1D4534E-1B22-4A44-850A-B3E8E9EE687A}" type="slidenum">
+              <a:rPr lang="en-US" smtClean="0"/>
+              <a:t>30</a:t>
+            </a:fld>
+            <a:endParaRPr lang="en-US"/>
+          </a:p>
+        </p:txBody>
+      </p:sp>
+    </p:spTree>
+    <p:extLst>
+      <p:ext uri="{BB962C8B-B14F-4D97-AF65-F5344CB8AC3E}">
+        <p14:creationId xmlns:p14="http://schemas.microsoft.com/office/powerpoint/2010/main" val="3025411515"/>
       </p:ext>
     </p:extLst>
   </p:cSld>
@@ -15636,7 +17202,7 @@
       </p:grpSpPr>
       <p:sp>
         <p:nvSpPr>
-          <p:cNvPr id="2" name="Title 1"/>
+          <p:cNvPr id="5" name="Title 4"/>
           <p:cNvSpPr>
             <a:spLocks noGrp="1"/>
           </p:cNvSpPr>
@@ -15651,14 +17217,14 @@
           <a:p>
             <a:r>
               <a:rPr lang="en-US" dirty="0"/>
-              <a:t>Data Structures</a:t>
-            </a:r>
-          </a:p>
-        </p:txBody>
-      </p:sp>
-      <p:sp>
-        <p:nvSpPr>
-          <p:cNvPr id="3" name="Content Placeholder 2"/>
+              <a:t>Elaborating the Data Definition (1)</a:t>
+            </a:r>
+          </a:p>
+        </p:txBody>
+      </p:sp>
+      <p:sp>
+        <p:nvSpPr>
+          <p:cNvPr id="7" name="Content Placeholder 6"/>
           <p:cNvSpPr>
             <a:spLocks noGrp="1"/>
           </p:cNvSpPr>
@@ -15668,105 +17234,126 @@
         </p:nvSpPr>
         <p:spPr/>
         <p:txBody>
-          <a:bodyPr>
-            <a:normAutofit/>
-          </a:bodyPr>
-          <a:lstStyle/>
-          <a:p>
-            <a:pPr>
+          <a:bodyPr/>
+          <a:lstStyle/>
+          <a:p>
+            <a:r>
+              <a:rPr lang="en-US" dirty="0"/>
+              <a:t>Why is </a:t>
+            </a:r>
+            <a:r>
+              <a:rPr lang="en-US" b="1" dirty="0"/>
+              <a:t>(("</a:t>
+            </a:r>
+            <a:r>
+              <a:rPr lang="en-US" b="1" dirty="0" err="1"/>
+              <a:t>alice</a:t>
+            </a:r>
+            <a:r>
+              <a:rPr lang="en-US" b="1" dirty="0"/>
+              <a:t>" "bob") "</a:t>
+            </a:r>
+            <a:r>
+              <a:rPr lang="en-US" b="1" dirty="0" err="1"/>
+              <a:t>carole</a:t>
+            </a:r>
+            <a:r>
+              <a:rPr lang="en-US" b="1" dirty="0"/>
+              <a:t>") </a:t>
+            </a:r>
+            <a:r>
+              <a:rPr lang="en-US" dirty="0"/>
+              <a:t>an </a:t>
+            </a:r>
+            <a:r>
+              <a:rPr lang="en-US" dirty="0" err="1"/>
+              <a:t>SoS</a:t>
+            </a:r>
+            <a:r>
+              <a:rPr lang="en-US" dirty="0"/>
+              <a:t> ? </a:t>
+            </a:r>
+          </a:p>
+          <a:p>
+            <a:r>
+              <a:rPr lang="en-US" dirty="0"/>
+              <a:t>To understand this, let’s write this out in cons notation:</a:t>
+            </a:r>
+          </a:p>
+          <a:p>
+            <a:endParaRPr lang="en-US" dirty="0"/>
+          </a:p>
+          <a:p>
+            <a:pPr marL="0" indent="0">
+              <a:spcBef>
+                <a:spcPts val="0"/>
+              </a:spcBef>
               <a:buNone/>
             </a:pPr>
             <a:r>
-              <a:rPr lang="en-US" b="1" dirty="0">
-                <a:latin typeface="Consolas" pitchFamily="49" charset="0"/>
-                <a:cs typeface="Consolas" pitchFamily="49" charset="0"/>
-              </a:rPr>
-              <a:t>"</a:t>
-            </a:r>
-            <a:r>
-              <a:rPr lang="en-US" b="1" dirty="0" err="1">
-                <a:latin typeface="Consolas" pitchFamily="49" charset="0"/>
-                <a:cs typeface="Consolas" pitchFamily="49" charset="0"/>
+              <a:rPr lang="en-US" sz="2800" b="1" dirty="0">
+                <a:latin typeface="Consolas" panose="020B0609020204030204" pitchFamily="49" charset="0"/>
+              </a:rPr>
+              <a:t>(cons</a:t>
+            </a:r>
+          </a:p>
+          <a:p>
+            <a:pPr marL="0" indent="0">
+              <a:spcBef>
+                <a:spcPts val="0"/>
+              </a:spcBef>
+              <a:buNone/>
+            </a:pPr>
+            <a:r>
+              <a:rPr lang="en-US" sz="2800" b="1" dirty="0">
+                <a:latin typeface="Consolas" panose="020B0609020204030204" pitchFamily="49" charset="0"/>
+              </a:rPr>
+              <a:t> (cons "</a:t>
+            </a:r>
+            <a:r>
+              <a:rPr lang="en-US" sz="2800" b="1" dirty="0" err="1">
+                <a:latin typeface="Consolas" panose="020B0609020204030204" pitchFamily="49" charset="0"/>
               </a:rPr>
               <a:t>alice</a:t>
             </a:r>
             <a:r>
-              <a:rPr lang="en-US" b="1" dirty="0">
-                <a:latin typeface="Consolas" pitchFamily="49" charset="0"/>
-                <a:cs typeface="Consolas" pitchFamily="49" charset="0"/>
-              </a:rPr>
-              <a:t>"</a:t>
-            </a:r>
-          </a:p>
-          <a:p>
-            <a:pPr>
+              <a:rPr lang="en-US" sz="2800" b="1" dirty="0">
+                <a:latin typeface="Consolas" panose="020B0609020204030204" pitchFamily="49" charset="0"/>
+              </a:rPr>
+              <a:t>" (cons "bob" empty))</a:t>
+            </a:r>
+          </a:p>
+          <a:p>
+            <a:pPr marL="0" indent="0">
+              <a:spcBef>
+                <a:spcPts val="0"/>
+              </a:spcBef>
               <a:buNone/>
             </a:pPr>
             <a:r>
-              <a:rPr lang="en-US" b="1" dirty="0">
-                <a:latin typeface="Consolas" pitchFamily="49" charset="0"/>
-                <a:cs typeface="Consolas" pitchFamily="49" charset="0"/>
-              </a:rPr>
-              <a:t>"bob"</a:t>
-            </a:r>
-          </a:p>
-          <a:p>
-            <a:pPr>
-              <a:buNone/>
-            </a:pPr>
-            <a:r>
-              <a:rPr lang="en-US" b="1" dirty="0">
-                <a:latin typeface="Consolas" pitchFamily="49" charset="0"/>
-                <a:cs typeface="Consolas" pitchFamily="49" charset="0"/>
-              </a:rPr>
-              <a:t>"</a:t>
-            </a:r>
-            <a:r>
-              <a:rPr lang="en-US" b="1" dirty="0" err="1">
-                <a:latin typeface="Consolas" pitchFamily="49" charset="0"/>
-                <a:cs typeface="Consolas" pitchFamily="49" charset="0"/>
+              <a:rPr lang="en-US" sz="2800" b="1" dirty="0">
+                <a:latin typeface="Consolas" panose="020B0609020204030204" pitchFamily="49" charset="0"/>
+              </a:rPr>
+              <a:t> (cons "</a:t>
+            </a:r>
+            <a:r>
+              <a:rPr lang="en-US" sz="2800" b="1" dirty="0" err="1">
+                <a:latin typeface="Consolas" panose="020B0609020204030204" pitchFamily="49" charset="0"/>
               </a:rPr>
               <a:t>carole</a:t>
             </a:r>
             <a:r>
-              <a:rPr lang="en-US" b="1" dirty="0">
-                <a:latin typeface="Consolas" pitchFamily="49" charset="0"/>
-                <a:cs typeface="Consolas" pitchFamily="49" charset="0"/>
-              </a:rPr>
-              <a:t>"</a:t>
-            </a:r>
-          </a:p>
-          <a:p>
-            <a:pPr>
-              <a:buNone/>
-            </a:pPr>
-            <a:r>
-              <a:rPr lang="en-US" b="1" dirty="0">
-                <a:latin typeface="Consolas" pitchFamily="49" charset="0"/>
-                <a:cs typeface="Consolas" pitchFamily="49" charset="0"/>
-              </a:rPr>
-              <a:t>("</a:t>
-            </a:r>
-            <a:r>
-              <a:rPr lang="en-US" b="1" dirty="0" err="1">
-                <a:latin typeface="Consolas" pitchFamily="49" charset="0"/>
-                <a:cs typeface="Consolas" pitchFamily="49" charset="0"/>
-              </a:rPr>
-              <a:t>alice</a:t>
-            </a:r>
-            <a:r>
-              <a:rPr lang="en-US" b="1" dirty="0">
-                <a:latin typeface="Consolas" pitchFamily="49" charset="0"/>
-                <a:cs typeface="Consolas" pitchFamily="49" charset="0"/>
-              </a:rPr>
-              <a:t>" "bob")</a:t>
-            </a:r>
-          </a:p>
-        </p:txBody>
-      </p:sp>
-      <p:sp>
-        <p:nvSpPr>
-          <p:cNvPr id="18" name="Slide Number Placeholder 17"/>
+              <a:rPr lang="en-US" sz="2800" b="1" dirty="0">
+                <a:latin typeface="Consolas" panose="020B0609020204030204" pitchFamily="49" charset="0"/>
+              </a:rPr>
+              <a:t>" empty))</a:t>
+            </a:r>
+          </a:p>
+        </p:txBody>
+      </p:sp>
+      <p:sp>
+        <p:nvSpPr>
+          <p:cNvPr id="4" name="Slide Number Placeholder 3"/>
           <p:cNvSpPr>
             <a:spLocks noGrp="1"/>
           </p:cNvSpPr>
@@ -15779,7 +17366,7 @@
           <a:bodyPr/>
           <a:lstStyle/>
           <a:p>
-            <a:fld id="{C1D4534E-1B22-4A44-850A-B3E8E9EE687A}" type="slidenum">
+            <a:fld id="{2AF3B5EA-18B6-4040-9F78-6052AF49C681}" type="slidenum">
               <a:rPr lang="en-US" smtClean="0"/>
               <a:t>9</a:t>
             </a:fld>
@@ -15787,501 +17374,10 @@
           </a:p>
         </p:txBody>
       </p:sp>
-      <p:grpSp>
-        <p:nvGrpSpPr>
-          <p:cNvPr id="4" name="Group 4"/>
-          <p:cNvGrpSpPr>
-            <a:grpSpLocks/>
-          </p:cNvGrpSpPr>
-          <p:nvPr/>
-        </p:nvGrpSpPr>
-        <p:grpSpPr bwMode="auto">
-          <a:xfrm>
-            <a:off x="3619500" y="4578351"/>
-            <a:ext cx="2933700" cy="1071563"/>
-            <a:chOff x="2493" y="1488"/>
-            <a:chExt cx="1152" cy="675"/>
-          </a:xfrm>
-        </p:grpSpPr>
-        <p:grpSp>
-          <p:nvGrpSpPr>
-            <p:cNvPr id="5" name="Group 5"/>
-            <p:cNvGrpSpPr>
-              <a:grpSpLocks/>
-            </p:cNvGrpSpPr>
-            <p:nvPr/>
-          </p:nvGrpSpPr>
-          <p:grpSpPr bwMode="auto">
-            <a:xfrm>
-              <a:off x="2493" y="1488"/>
-              <a:ext cx="480" cy="192"/>
-              <a:chOff x="1392" y="1536"/>
-              <a:chExt cx="480" cy="192"/>
-            </a:xfrm>
-          </p:grpSpPr>
-          <p:sp>
-            <p:nvSpPr>
-              <p:cNvPr id="15" name="Rectangle 6"/>
-              <p:cNvSpPr>
-                <a:spLocks noChangeArrowheads="1"/>
-              </p:cNvSpPr>
-              <p:nvPr/>
-            </p:nvSpPr>
-            <p:spPr bwMode="auto">
-              <a:xfrm>
-                <a:off x="1392" y="1536"/>
-                <a:ext cx="240" cy="192"/>
-              </a:xfrm>
-              <a:prstGeom prst="rect">
-                <a:avLst/>
-              </a:prstGeom>
-              <a:noFill/>
-              <a:ln w="9525">
-                <a:solidFill>
-                  <a:schemeClr val="tx1"/>
-                </a:solidFill>
-                <a:miter lim="800000"/>
-                <a:headEnd/>
-                <a:tailEnd/>
-              </a:ln>
-              <a:effectLst/>
-            </p:spPr>
-            <p:txBody>
-              <a:bodyPr wrap="none" anchor="ctr"/>
-              <a:lstStyle/>
-              <a:p>
-                <a:endParaRPr lang="en-US"/>
-              </a:p>
-            </p:txBody>
-          </p:sp>
-          <p:sp>
-            <p:nvSpPr>
-              <p:cNvPr id="16" name="Rectangle 7"/>
-              <p:cNvSpPr>
-                <a:spLocks noChangeArrowheads="1"/>
-              </p:cNvSpPr>
-              <p:nvPr/>
-            </p:nvSpPr>
-            <p:spPr bwMode="auto">
-              <a:xfrm>
-                <a:off x="1632" y="1536"/>
-                <a:ext cx="240" cy="192"/>
-              </a:xfrm>
-              <a:prstGeom prst="rect">
-                <a:avLst/>
-              </a:prstGeom>
-              <a:noFill/>
-              <a:ln w="9525">
-                <a:solidFill>
-                  <a:schemeClr val="tx1"/>
-                </a:solidFill>
-                <a:miter lim="800000"/>
-                <a:headEnd/>
-                <a:tailEnd/>
-              </a:ln>
-              <a:effectLst/>
-            </p:spPr>
-            <p:txBody>
-              <a:bodyPr wrap="none" anchor="ctr"/>
-              <a:lstStyle/>
-              <a:p>
-                <a:endParaRPr lang="en-US"/>
-              </a:p>
-            </p:txBody>
-          </p:sp>
-        </p:grpSp>
-        <p:grpSp>
-          <p:nvGrpSpPr>
-            <p:cNvPr id="6" name="Group 8"/>
-            <p:cNvGrpSpPr>
-              <a:grpSpLocks/>
-            </p:cNvGrpSpPr>
-            <p:nvPr/>
-          </p:nvGrpSpPr>
-          <p:grpSpPr bwMode="auto">
-            <a:xfrm>
-              <a:off x="3165" y="1488"/>
-              <a:ext cx="480" cy="192"/>
-              <a:chOff x="1392" y="1536"/>
-              <a:chExt cx="480" cy="192"/>
-            </a:xfrm>
-          </p:grpSpPr>
-          <p:sp>
-            <p:nvSpPr>
-              <p:cNvPr id="13" name="Rectangle 9"/>
-              <p:cNvSpPr>
-                <a:spLocks noChangeArrowheads="1"/>
-              </p:cNvSpPr>
-              <p:nvPr/>
-            </p:nvSpPr>
-            <p:spPr bwMode="auto">
-              <a:xfrm>
-                <a:off x="1392" y="1536"/>
-                <a:ext cx="240" cy="192"/>
-              </a:xfrm>
-              <a:prstGeom prst="rect">
-                <a:avLst/>
-              </a:prstGeom>
-              <a:noFill/>
-              <a:ln w="9525">
-                <a:solidFill>
-                  <a:schemeClr val="tx1"/>
-                </a:solidFill>
-                <a:miter lim="800000"/>
-                <a:headEnd/>
-                <a:tailEnd/>
-              </a:ln>
-              <a:effectLst/>
-            </p:spPr>
-            <p:txBody>
-              <a:bodyPr wrap="none" anchor="ctr"/>
-              <a:lstStyle/>
-              <a:p>
-                <a:endParaRPr lang="en-US"/>
-              </a:p>
-            </p:txBody>
-          </p:sp>
-          <p:sp>
-            <p:nvSpPr>
-              <p:cNvPr id="14" name="Rectangle 10"/>
-              <p:cNvSpPr>
-                <a:spLocks noChangeArrowheads="1"/>
-              </p:cNvSpPr>
-              <p:nvPr/>
-            </p:nvSpPr>
-            <p:spPr bwMode="auto">
-              <a:xfrm>
-                <a:off x="1632" y="1536"/>
-                <a:ext cx="240" cy="192"/>
-              </a:xfrm>
-              <a:prstGeom prst="rect">
-                <a:avLst/>
-              </a:prstGeom>
-              <a:noFill/>
-              <a:ln w="9525">
-                <a:solidFill>
-                  <a:schemeClr val="tx1"/>
-                </a:solidFill>
-                <a:miter lim="800000"/>
-                <a:headEnd/>
-                <a:tailEnd/>
-              </a:ln>
-              <a:effectLst/>
-            </p:spPr>
-            <p:txBody>
-              <a:bodyPr wrap="none" anchor="ctr"/>
-              <a:lstStyle/>
-              <a:p>
-                <a:endParaRPr lang="en-US"/>
-              </a:p>
-            </p:txBody>
-          </p:sp>
-        </p:grpSp>
-        <p:sp>
-          <p:nvSpPr>
-            <p:cNvPr id="7" name="Line 11"/>
-            <p:cNvSpPr>
-              <a:spLocks noChangeShapeType="1"/>
-            </p:cNvSpPr>
-            <p:nvPr/>
-          </p:nvSpPr>
-          <p:spPr bwMode="auto">
-            <a:xfrm>
-              <a:off x="2829" y="1584"/>
-              <a:ext cx="336" cy="0"/>
-            </a:xfrm>
-            <a:prstGeom prst="line">
-              <a:avLst/>
-            </a:prstGeom>
-            <a:noFill/>
-            <a:ln w="9525">
-              <a:solidFill>
-                <a:schemeClr val="tx1"/>
-              </a:solidFill>
-              <a:round/>
-              <a:headEnd/>
-              <a:tailEnd type="triangle" w="med" len="med"/>
-            </a:ln>
-            <a:effectLst/>
-          </p:spPr>
-          <p:txBody>
-            <a:bodyPr wrap="none" anchor="ctr"/>
-            <a:lstStyle/>
-            <a:p>
-              <a:endParaRPr lang="en-US"/>
-            </a:p>
-          </p:txBody>
-        </p:sp>
-        <p:sp>
-          <p:nvSpPr>
-            <p:cNvPr id="8" name="Line 12"/>
-            <p:cNvSpPr>
-              <a:spLocks noChangeShapeType="1"/>
-            </p:cNvSpPr>
-            <p:nvPr/>
-          </p:nvSpPr>
-          <p:spPr bwMode="auto">
-            <a:xfrm>
-              <a:off x="3405" y="1488"/>
-              <a:ext cx="240" cy="192"/>
-            </a:xfrm>
-            <a:prstGeom prst="line">
-              <a:avLst/>
-            </a:prstGeom>
-            <a:noFill/>
-            <a:ln w="9525">
-              <a:solidFill>
-                <a:schemeClr val="tx1"/>
-              </a:solidFill>
-              <a:round/>
-              <a:headEnd/>
-              <a:tailEnd/>
-            </a:ln>
-            <a:effectLst/>
-          </p:spPr>
-          <p:txBody>
-            <a:bodyPr wrap="none" anchor="ctr"/>
-            <a:lstStyle/>
-            <a:p>
-              <a:endParaRPr lang="en-US"/>
-            </a:p>
-          </p:txBody>
-        </p:sp>
-        <p:sp>
-          <p:nvSpPr>
-            <p:cNvPr id="9" name="Line 13"/>
-            <p:cNvSpPr>
-              <a:spLocks noChangeShapeType="1"/>
-            </p:cNvSpPr>
-            <p:nvPr/>
-          </p:nvSpPr>
-          <p:spPr bwMode="auto">
-            <a:xfrm>
-              <a:off x="2589" y="1584"/>
-              <a:ext cx="0" cy="336"/>
-            </a:xfrm>
-            <a:prstGeom prst="line">
-              <a:avLst/>
-            </a:prstGeom>
-            <a:noFill/>
-            <a:ln w="9525">
-              <a:solidFill>
-                <a:schemeClr val="tx1"/>
-              </a:solidFill>
-              <a:round/>
-              <a:headEnd/>
-              <a:tailEnd type="triangle" w="med" len="med"/>
-            </a:ln>
-            <a:effectLst/>
-          </p:spPr>
-          <p:txBody>
-            <a:bodyPr wrap="none" anchor="ctr"/>
-            <a:lstStyle/>
-            <a:p>
-              <a:endParaRPr lang="en-US"/>
-            </a:p>
-          </p:txBody>
-        </p:sp>
-        <p:sp>
-          <p:nvSpPr>
-            <p:cNvPr id="10" name="Line 14"/>
-            <p:cNvSpPr>
-              <a:spLocks noChangeShapeType="1"/>
-            </p:cNvSpPr>
-            <p:nvPr/>
-          </p:nvSpPr>
-          <p:spPr bwMode="auto">
-            <a:xfrm>
-              <a:off x="3261" y="1584"/>
-              <a:ext cx="0" cy="336"/>
-            </a:xfrm>
-            <a:prstGeom prst="line">
-              <a:avLst/>
-            </a:prstGeom>
-            <a:noFill/>
-            <a:ln w="9525">
-              <a:solidFill>
-                <a:schemeClr val="tx1"/>
-              </a:solidFill>
-              <a:round/>
-              <a:headEnd/>
-              <a:tailEnd type="triangle" w="med" len="med"/>
-            </a:ln>
-            <a:effectLst/>
-          </p:spPr>
-          <p:txBody>
-            <a:bodyPr wrap="none" anchor="ctr"/>
-            <a:lstStyle/>
-            <a:p>
-              <a:endParaRPr lang="en-US"/>
-            </a:p>
-          </p:txBody>
-        </p:sp>
-        <p:sp>
-          <p:nvSpPr>
-            <p:cNvPr id="11" name="Text Box 15"/>
-            <p:cNvSpPr txBox="1">
-              <a:spLocks noChangeArrowheads="1"/>
-            </p:cNvSpPr>
-            <p:nvPr/>
-          </p:nvSpPr>
-          <p:spPr bwMode="auto">
-            <a:xfrm>
-              <a:off x="2501" y="1872"/>
-              <a:ext cx="540" cy="291"/>
-            </a:xfrm>
-            <a:prstGeom prst="rect">
-              <a:avLst/>
-            </a:prstGeom>
-            <a:noFill/>
-            <a:ln w="9525">
-              <a:noFill/>
-              <a:miter lim="800000"/>
-              <a:headEnd/>
-              <a:tailEnd/>
-            </a:ln>
-            <a:effectLst/>
-          </p:spPr>
-          <p:txBody>
-            <a:bodyPr wrap="none">
-              <a:spAutoFit/>
-            </a:bodyPr>
-            <a:lstStyle/>
-            <a:p>
-              <a:r>
-                <a:rPr lang="en-US" sz="2400" b="1" dirty="0">
-                  <a:latin typeface="Consolas" pitchFamily="49" charset="0"/>
-                  <a:cs typeface="Consolas" pitchFamily="49" charset="0"/>
-                </a:rPr>
-                <a:t>"</a:t>
-              </a:r>
-              <a:r>
-                <a:rPr lang="en-US" sz="2400" b="1" dirty="0" err="1">
-                  <a:latin typeface="Consolas" pitchFamily="49" charset="0"/>
-                  <a:cs typeface="Consolas" pitchFamily="49" charset="0"/>
-                </a:rPr>
-                <a:t>alice</a:t>
-              </a:r>
-              <a:r>
-                <a:rPr lang="en-US" sz="2400" b="1" dirty="0">
-                  <a:latin typeface="Consolas" pitchFamily="49" charset="0"/>
-                  <a:cs typeface="Consolas" pitchFamily="49" charset="0"/>
-                </a:rPr>
-                <a:t>"</a:t>
-              </a:r>
-              <a:endParaRPr lang="en-US" sz="2400" b="1" i="0" dirty="0">
-                <a:latin typeface="Consolas" pitchFamily="49" charset="0"/>
-                <a:cs typeface="Consolas" pitchFamily="49" charset="0"/>
-              </a:endParaRPr>
-            </a:p>
-          </p:txBody>
-        </p:sp>
-        <p:sp>
-          <p:nvSpPr>
-            <p:cNvPr id="12" name="Text Box 16"/>
-            <p:cNvSpPr txBox="1">
-              <a:spLocks noChangeArrowheads="1"/>
-            </p:cNvSpPr>
-            <p:nvPr/>
-          </p:nvSpPr>
-          <p:spPr bwMode="auto">
-            <a:xfrm>
-              <a:off x="3161" y="1872"/>
-              <a:ext cx="406" cy="291"/>
-            </a:xfrm>
-            <a:prstGeom prst="rect">
-              <a:avLst/>
-            </a:prstGeom>
-            <a:noFill/>
-            <a:ln w="9525">
-              <a:noFill/>
-              <a:miter lim="800000"/>
-              <a:headEnd/>
-              <a:tailEnd/>
-            </a:ln>
-            <a:effectLst/>
-          </p:spPr>
-          <p:txBody>
-            <a:bodyPr wrap="none">
-              <a:spAutoFit/>
-            </a:bodyPr>
-            <a:lstStyle/>
-            <a:p>
-              <a:r>
-                <a:rPr lang="en-US" sz="2400" b="1" i="0" dirty="0">
-                  <a:latin typeface="Consolas" pitchFamily="49" charset="0"/>
-                  <a:cs typeface="Consolas" pitchFamily="49" charset="0"/>
-                </a:rPr>
-                <a:t>"bob"</a:t>
-              </a:r>
-            </a:p>
-          </p:txBody>
-        </p:sp>
-      </p:grpSp>
-      <p:sp>
-        <p:nvSpPr>
-          <p:cNvPr id="17" name="Rectangle 16"/>
-          <p:cNvSpPr/>
-          <p:nvPr/>
-        </p:nvSpPr>
-        <p:spPr>
-          <a:xfrm>
-            <a:off x="5410200" y="1676400"/>
-            <a:ext cx="3581400" cy="914400"/>
-          </a:xfrm>
-          <a:prstGeom prst="rect">
-            <a:avLst/>
-          </a:prstGeom>
-          <a:solidFill>
-            <a:schemeClr val="accent3">
-              <a:lumMod val="40000"/>
-              <a:lumOff val="60000"/>
-            </a:schemeClr>
-          </a:solidFill>
-          <a:ln/>
-        </p:spPr>
-        <p:style>
-          <a:lnRef idx="2">
-            <a:schemeClr val="accent1"/>
-          </a:lnRef>
-          <a:fillRef idx="1">
-            <a:schemeClr val="lt1"/>
-          </a:fillRef>
-          <a:effectRef idx="0">
-            <a:schemeClr val="accent1"/>
-          </a:effectRef>
-          <a:fontRef idx="minor">
-            <a:schemeClr val="dk1"/>
-          </a:fontRef>
-        </p:style>
-        <p:txBody>
-          <a:bodyPr rot="0" spcFirstLastPara="0" vertOverflow="overflow" horzOverflow="overflow" vert="horz" wrap="square" lIns="91440" tIns="45720" rIns="91440" bIns="45720" numCol="1" spcCol="0" rtlCol="0" fromWordArt="0" anchor="ctr" anchorCtr="0" forceAA="0" compatLnSpc="1">
-            <a:prstTxWarp prst="textNoShape">
-              <a:avLst/>
-            </a:prstTxWarp>
-            <a:noAutofit/>
-          </a:bodyPr>
-          <a:lstStyle/>
-          <a:p>
-            <a:pPr>
-              <a:defRPr/>
-            </a:pPr>
-            <a:r>
-              <a:rPr lang="en-US" dirty="0">
-                <a:solidFill>
-                  <a:schemeClr val="tx1"/>
-                </a:solidFill>
-              </a:rPr>
-              <a:t>A list of S-expressions is implemented as a singly-linked list.  Here is an example.</a:t>
-            </a:r>
-            <a:endParaRPr lang="en-US" dirty="0"/>
-          </a:p>
-        </p:txBody>
-      </p:sp>
     </p:spTree>
     <p:extLst>
       <p:ext uri="{BB962C8B-B14F-4D97-AF65-F5344CB8AC3E}">
-        <p14:creationId xmlns:p14="http://schemas.microsoft.com/office/powerpoint/2010/main" val="3808444269"/>
+        <p14:creationId xmlns:p14="http://schemas.microsoft.com/office/powerpoint/2010/main" val="3951734049"/>
       </p:ext>
     </p:extLst>
   </p:cSld>

</xml_diff>

<commit_message>
working on Lesson 6.4
</commit_message>
<xml_diff>
--- a/Slides/Lesson 6.4 Lists of Lists.pptx
+++ b/Slides/Lesson 6.4 Lists of Lists.pptx
@@ -5,7 +5,7 @@
     <p:sldMasterId id="2147483660" r:id="rId1"/>
   </p:sldMasterIdLst>
   <p:notesMasterIdLst>
-    <p:notesMasterId r:id="rId32"/>
+    <p:notesMasterId r:id="rId30"/>
   </p:notesMasterIdLst>
   <p:sldIdLst>
     <p:sldId id="256" r:id="rId2"/>
@@ -16,33 +16,31 @@
     <p:sldId id="259" r:id="rId7"/>
     <p:sldId id="260" r:id="rId8"/>
     <p:sldId id="261" r:id="rId9"/>
-    <p:sldId id="286" r:id="rId10"/>
-    <p:sldId id="287" r:id="rId11"/>
-    <p:sldId id="262" r:id="rId12"/>
-    <p:sldId id="263" r:id="rId13"/>
-    <p:sldId id="264" r:id="rId14"/>
-    <p:sldId id="282" r:id="rId15"/>
-    <p:sldId id="266" r:id="rId16"/>
-    <p:sldId id="267" r:id="rId17"/>
-    <p:sldId id="268" r:id="rId18"/>
-    <p:sldId id="269" r:id="rId19"/>
-    <p:sldId id="270" r:id="rId20"/>
-    <p:sldId id="284" r:id="rId21"/>
-    <p:sldId id="285" r:id="rId22"/>
-    <p:sldId id="271" r:id="rId23"/>
-    <p:sldId id="272" r:id="rId24"/>
-    <p:sldId id="273" r:id="rId25"/>
-    <p:sldId id="274" r:id="rId26"/>
-    <p:sldId id="275" r:id="rId27"/>
-    <p:sldId id="276" r:id="rId28"/>
-    <p:sldId id="277" r:id="rId29"/>
-    <p:sldId id="278" r:id="rId30"/>
-    <p:sldId id="279" r:id="rId31"/>
+    <p:sldId id="262" r:id="rId10"/>
+    <p:sldId id="263" r:id="rId11"/>
+    <p:sldId id="264" r:id="rId12"/>
+    <p:sldId id="282" r:id="rId13"/>
+    <p:sldId id="266" r:id="rId14"/>
+    <p:sldId id="267" r:id="rId15"/>
+    <p:sldId id="268" r:id="rId16"/>
+    <p:sldId id="269" r:id="rId17"/>
+    <p:sldId id="270" r:id="rId18"/>
+    <p:sldId id="284" r:id="rId19"/>
+    <p:sldId id="285" r:id="rId20"/>
+    <p:sldId id="271" r:id="rId21"/>
+    <p:sldId id="272" r:id="rId22"/>
+    <p:sldId id="273" r:id="rId23"/>
+    <p:sldId id="274" r:id="rId24"/>
+    <p:sldId id="275" r:id="rId25"/>
+    <p:sldId id="276" r:id="rId26"/>
+    <p:sldId id="277" r:id="rId27"/>
+    <p:sldId id="278" r:id="rId28"/>
+    <p:sldId id="279" r:id="rId29"/>
   </p:sldIdLst>
   <p:sldSz cx="9144000" cy="6858000" type="screen4x3"/>
   <p:notesSz cx="6858000" cy="9144000"/>
   <p:custDataLst>
-    <p:tags r:id="rId33"/>
+    <p:tags r:id="rId31"/>
   </p:custDataLst>
   <p:defaultTextStyle>
     <a:defPPr>
@@ -240,7 +238,7 @@
           <a:p>
             <a:fld id="{1AC50D25-69DA-4251-A3B1-10895C6A89D6}" type="datetimeFigureOut">
               <a:rPr lang="en-US" smtClean="0"/>
-              <a:t>9/6/2016</a:t>
+              <a:t>9/7/2016</a:t>
             </a:fld>
             <a:endParaRPr lang="en-US"/>
           </a:p>
@@ -790,7 +788,7 @@
             <a:fld id="{00E1DFD8-B619-4FFF-B366-BDCC98D08110}" type="slidenum">
               <a:rPr lang="en-US" smtClean="0"/>
               <a:pPr/>
-              <a:t>27</a:t>
+              <a:t>25</a:t>
             </a:fld>
             <a:endParaRPr lang="en-US"/>
           </a:p>
@@ -988,7 +986,7 @@
           <a:p>
             <a:fld id="{2F1F79F5-7BEC-496A-AFC7-876E38F64D71}" type="datetime1">
               <a:rPr lang="en-US" smtClean="0"/>
-              <a:t>9/6/2016</a:t>
+              <a:t>9/7/2016</a:t>
             </a:fld>
             <a:endParaRPr lang="en-US"/>
           </a:p>
@@ -1083,7 +1081,7 @@
           <a:p>
             <a:fld id="{0A05703A-7669-4FEA-9056-25299B4D29D4}" type="datetime1">
               <a:rPr lang="en-US" smtClean="0"/>
-              <a:t>9/6/2016</a:t>
+              <a:t>9/7/2016</a:t>
             </a:fld>
             <a:endParaRPr lang="en-US"/>
           </a:p>
@@ -1358,7 +1356,7 @@
           <a:p>
             <a:fld id="{6E5077B5-BB57-49DB-88CA-226A139E5C01}" type="datetime1">
               <a:rPr lang="en-US" smtClean="0"/>
-              <a:t>9/6/2016</a:t>
+              <a:t>9/7/2016</a:t>
             </a:fld>
             <a:endParaRPr lang="en-US"/>
           </a:p>
@@ -1610,7 +1608,7 @@
           <a:p>
             <a:fld id="{C48D9447-CBD6-49A1-89FD-8512A8CF8999}" type="datetime1">
               <a:rPr lang="en-US" smtClean="0"/>
-              <a:t>9/6/2016</a:t>
+              <a:t>9/7/2016</a:t>
             </a:fld>
             <a:endParaRPr lang="en-US"/>
           </a:p>
@@ -1778,7 +1776,7 @@
           <a:p>
             <a:fld id="{A3639A2A-823D-48B7-9ACE-7FAF42870BA9}" type="datetime1">
               <a:rPr lang="en-US" smtClean="0"/>
-              <a:t>9/6/2016</a:t>
+              <a:t>9/7/2016</a:t>
             </a:fld>
             <a:endParaRPr lang="en-US"/>
           </a:p>
@@ -1956,7 +1954,7 @@
           <a:p>
             <a:fld id="{ED1B6996-82E9-463C-972C-7B56056E426C}" type="datetime1">
               <a:rPr lang="en-US" smtClean="0"/>
-              <a:t>9/6/2016</a:t>
+              <a:t>9/7/2016</a:t>
             </a:fld>
             <a:endParaRPr lang="en-US"/>
           </a:p>
@@ -2130,7 +2128,7 @@
           <a:p>
             <a:fld id="{E22ED4DA-448D-4BB1-B935-CC112220207B}" type="datetime1">
               <a:rPr lang="en-US" smtClean="0"/>
-              <a:t>9/6/2016</a:t>
+              <a:t>9/7/2016</a:t>
             </a:fld>
             <a:endParaRPr lang="en-US"/>
           </a:p>
@@ -2303,7 +2301,7 @@
           <a:p>
             <a:fld id="{E22ED4DA-448D-4BB1-B935-CC112220207B}" type="datetime1">
               <a:rPr lang="en-US" smtClean="0"/>
-              <a:t>9/6/2016</a:t>
+              <a:t>9/7/2016</a:t>
             </a:fld>
             <a:endParaRPr lang="en-US"/>
           </a:p>
@@ -2563,7 +2561,7 @@
           <a:p>
             <a:fld id="{FF5D65A6-AB94-4435-B0B7-3743215FA46C}" type="datetime1">
               <a:rPr lang="en-US" smtClean="0"/>
-              <a:t>9/6/2016</a:t>
+              <a:t>9/7/2016</a:t>
             </a:fld>
             <a:endParaRPr lang="en-US"/>
           </a:p>
@@ -2739,7 +2737,7 @@
           <a:p>
             <a:fld id="{FF5D65A6-AB94-4435-B0B7-3743215FA46C}" type="datetime1">
               <a:rPr lang="en-US" smtClean="0"/>
-              <a:t>9/6/2016</a:t>
+              <a:t>9/7/2016</a:t>
             </a:fld>
             <a:endParaRPr lang="en-US"/>
           </a:p>
@@ -3033,7 +3031,7 @@
           <a:p>
             <a:fld id="{7C193DC4-6EF0-48C9-B29C-616106A645E1}" type="datetime1">
               <a:rPr lang="en-US" smtClean="0"/>
-              <a:t>9/6/2016</a:t>
+              <a:t>9/7/2016</a:t>
             </a:fld>
             <a:endParaRPr lang="en-US"/>
           </a:p>
@@ -3318,7 +3316,7 @@
           <a:p>
             <a:fld id="{5D1846AD-9252-4647-9435-4C2AC365653A}" type="datetime1">
               <a:rPr lang="en-US" smtClean="0"/>
-              <a:t>9/6/2016</a:t>
+              <a:t>9/7/2016</a:t>
             </a:fld>
             <a:endParaRPr lang="en-US"/>
           </a:p>
@@ -3737,7 +3735,7 @@
           <a:p>
             <a:fld id="{CE56DC10-3561-4063-A6AF-C1CC7A41040A}" type="datetime1">
               <a:rPr lang="en-US" smtClean="0"/>
-              <a:t>9/6/2016</a:t>
+              <a:t>9/7/2016</a:t>
             </a:fld>
             <a:endParaRPr lang="en-US"/>
           </a:p>
@@ -3854,7 +3852,7 @@
           <a:p>
             <a:fld id="{2F7B77F5-1464-4F6B-92A8-64FC8A508293}" type="datetime1">
               <a:rPr lang="en-US" smtClean="0"/>
-              <a:t>9/6/2016</a:t>
+              <a:t>9/7/2016</a:t>
             </a:fld>
             <a:endParaRPr lang="en-US"/>
           </a:p>
@@ -4077,7 +4075,7 @@
           <a:p>
             <a:fld id="{02B3F677-983B-48DB-ADFD-63FE6CBC7FB2}" type="datetime1">
               <a:rPr lang="en-US" smtClean="0"/>
-              <a:t>9/6/2016</a:t>
+              <a:t>9/7/2016</a:t>
             </a:fld>
             <a:endParaRPr lang="en-US"/>
           </a:p>
@@ -4702,1570 +4700,6 @@
           <a:p>
             <a:r>
               <a:rPr lang="en-US" dirty="0"/>
-              <a:t>Elaborating the Data Definition (2)</a:t>
-            </a:r>
-          </a:p>
-        </p:txBody>
-      </p:sp>
-      <p:sp>
-        <p:nvSpPr>
-          <p:cNvPr id="5" name="Content Placeholder 4"/>
-          <p:cNvSpPr>
-            <a:spLocks noGrp="1"/>
-          </p:cNvSpPr>
-          <p:nvPr>
-            <p:ph idx="1"/>
-          </p:nvPr>
-        </p:nvSpPr>
-        <p:spPr/>
-        <p:txBody>
-          <a:bodyPr>
-            <a:normAutofit fontScale="32500" lnSpcReduction="20000"/>
-          </a:bodyPr>
-          <a:lstStyle/>
-          <a:p>
-            <a:r>
-              <a:rPr lang="en-US" dirty="0" err="1"/>
-              <a:t>SoS</a:t>
-            </a:r>
-            <a:endParaRPr lang="en-US" dirty="0"/>
-          </a:p>
-          <a:p>
-            <a:r>
-              <a:rPr lang="en-US" dirty="0">
-                <a:solidFill>
-                  <a:srgbClr val="FF0000"/>
-                </a:solidFill>
-              </a:rPr>
-              <a:t>-&gt;</a:t>
-            </a:r>
-            <a:r>
-              <a:rPr lang="en-US" dirty="0"/>
-              <a:t> </a:t>
-            </a:r>
-            <a:r>
-              <a:rPr lang="en-US" dirty="0" err="1"/>
-              <a:t>LoSS</a:t>
-            </a:r>
-            <a:endParaRPr lang="en-US" dirty="0"/>
-          </a:p>
-          <a:p>
-            <a:r>
-              <a:rPr lang="en-US" dirty="0"/>
-              <a:t>-&gt; (cons </a:t>
-            </a:r>
-            <a:r>
-              <a:rPr lang="en-US" dirty="0" err="1"/>
-              <a:t>SoS</a:t>
-            </a:r>
-            <a:r>
-              <a:rPr lang="en-US" dirty="0"/>
-              <a:t> </a:t>
-            </a:r>
-            <a:r>
-              <a:rPr lang="en-US" dirty="0" err="1"/>
-              <a:t>LoSS</a:t>
-            </a:r>
-            <a:r>
-              <a:rPr lang="en-US" dirty="0"/>
-              <a:t>)</a:t>
-            </a:r>
-          </a:p>
-          <a:p>
-            <a:r>
-              <a:rPr lang="en-US" dirty="0">
-                <a:solidFill>
-                  <a:srgbClr val="FF0000"/>
-                </a:solidFill>
-              </a:rPr>
-              <a:t>-&gt;</a:t>
-            </a:r>
-            <a:r>
-              <a:rPr lang="en-US" dirty="0"/>
-              <a:t> (cons </a:t>
-            </a:r>
-            <a:r>
-              <a:rPr lang="en-US" dirty="0" err="1"/>
-              <a:t>LoSS</a:t>
-            </a:r>
-            <a:r>
-              <a:rPr lang="en-US" dirty="0"/>
-              <a:t> </a:t>
-            </a:r>
-            <a:r>
-              <a:rPr lang="en-US" dirty="0" err="1"/>
-              <a:t>LoSS</a:t>
-            </a:r>
-            <a:r>
-              <a:rPr lang="en-US" dirty="0"/>
-              <a:t>)</a:t>
-            </a:r>
-          </a:p>
-          <a:p>
-            <a:r>
-              <a:rPr lang="en-US" dirty="0"/>
-              <a:t>-&gt; (cons (cons </a:t>
-            </a:r>
-            <a:r>
-              <a:rPr lang="en-US" dirty="0" err="1"/>
-              <a:t>SoS</a:t>
-            </a:r>
-            <a:r>
-              <a:rPr lang="en-US" dirty="0"/>
-              <a:t> </a:t>
-            </a:r>
-            <a:r>
-              <a:rPr lang="en-US" dirty="0" err="1"/>
-              <a:t>LoSS</a:t>
-            </a:r>
-            <a:r>
-              <a:rPr lang="en-US" dirty="0"/>
-              <a:t>)</a:t>
-            </a:r>
-          </a:p>
-          <a:p>
-            <a:r>
-              <a:rPr lang="en-US" dirty="0"/>
-              <a:t>         </a:t>
-            </a:r>
-            <a:r>
-              <a:rPr lang="en-US" dirty="0" err="1"/>
-              <a:t>LoSS</a:t>
-            </a:r>
-            <a:r>
-              <a:rPr lang="en-US" dirty="0"/>
-              <a:t>)</a:t>
-            </a:r>
-          </a:p>
-          <a:p>
-            <a:r>
-              <a:rPr lang="en-US" dirty="0">
-                <a:solidFill>
-                  <a:srgbClr val="FF0000"/>
-                </a:solidFill>
-              </a:rPr>
-              <a:t>-&gt;</a:t>
-            </a:r>
-            <a:r>
-              <a:rPr lang="en-US" dirty="0"/>
-              <a:t> (cons (cons </a:t>
-            </a:r>
-            <a:r>
-              <a:rPr lang="en-US" dirty="0" err="1"/>
-              <a:t>LoSS</a:t>
-            </a:r>
-            <a:r>
-              <a:rPr lang="en-US" dirty="0"/>
-              <a:t> </a:t>
-            </a:r>
-            <a:r>
-              <a:rPr lang="en-US" dirty="0" err="1"/>
-              <a:t>LoSS</a:t>
-            </a:r>
-            <a:r>
-              <a:rPr lang="en-US" dirty="0"/>
-              <a:t>)</a:t>
-            </a:r>
-          </a:p>
-          <a:p>
-            <a:r>
-              <a:rPr lang="en-US" dirty="0"/>
-              <a:t>         </a:t>
-            </a:r>
-            <a:r>
-              <a:rPr lang="en-US" dirty="0" err="1"/>
-              <a:t>LoSS</a:t>
-            </a:r>
-            <a:r>
-              <a:rPr lang="en-US" dirty="0"/>
-              <a:t>)</a:t>
-            </a:r>
-          </a:p>
-          <a:p>
-            <a:r>
-              <a:rPr lang="en-US" dirty="0">
-                <a:solidFill>
-                  <a:srgbClr val="FF0000"/>
-                </a:solidFill>
-              </a:rPr>
-              <a:t>-&gt; </a:t>
-            </a:r>
-            <a:r>
-              <a:rPr lang="en-US" dirty="0"/>
-              <a:t>(cons (cons String </a:t>
-            </a:r>
-            <a:r>
-              <a:rPr lang="en-US" dirty="0" err="1"/>
-              <a:t>LoSS</a:t>
-            </a:r>
-            <a:r>
-              <a:rPr lang="en-US" dirty="0"/>
-              <a:t>)</a:t>
-            </a:r>
-          </a:p>
-          <a:p>
-            <a:r>
-              <a:rPr lang="en-US" dirty="0"/>
-              <a:t>         </a:t>
-            </a:r>
-            <a:r>
-              <a:rPr lang="en-US" dirty="0" err="1"/>
-              <a:t>LoSS</a:t>
-            </a:r>
-            <a:r>
-              <a:rPr lang="en-US" dirty="0"/>
-              <a:t>)</a:t>
-            </a:r>
-          </a:p>
-          <a:p>
-            <a:r>
-              <a:rPr lang="en-US" dirty="0">
-                <a:solidFill>
-                  <a:srgbClr val="FF0000"/>
-                </a:solidFill>
-              </a:rPr>
-              <a:t>-&gt;</a:t>
-            </a:r>
-            <a:r>
-              <a:rPr lang="en-US" dirty="0"/>
-              <a:t> (cons (cons "</a:t>
-            </a:r>
-            <a:r>
-              <a:rPr lang="en-US" dirty="0" err="1"/>
-              <a:t>alice</a:t>
-            </a:r>
-            <a:r>
-              <a:rPr lang="en-US" dirty="0"/>
-              <a:t>" </a:t>
-            </a:r>
-            <a:r>
-              <a:rPr lang="en-US" dirty="0" err="1"/>
-              <a:t>LoSS</a:t>
-            </a:r>
-            <a:r>
-              <a:rPr lang="en-US" dirty="0"/>
-              <a:t>)</a:t>
-            </a:r>
-          </a:p>
-          <a:p>
-            <a:r>
-              <a:rPr lang="en-US" dirty="0"/>
-              <a:t>         </a:t>
-            </a:r>
-            <a:r>
-              <a:rPr lang="en-US" dirty="0" err="1"/>
-              <a:t>LoSS</a:t>
-            </a:r>
-            <a:r>
-              <a:rPr lang="en-US" dirty="0"/>
-              <a:t>)</a:t>
-            </a:r>
-          </a:p>
-          <a:p>
-            <a:r>
-              <a:rPr lang="en-US" dirty="0"/>
-              <a:t>-&gt; (cons (cons "</a:t>
-            </a:r>
-            <a:r>
-              <a:rPr lang="en-US" dirty="0" err="1"/>
-              <a:t>alice</a:t>
-            </a:r>
-            <a:r>
-              <a:rPr lang="en-US" dirty="0"/>
-              <a:t>" (cons </a:t>
-            </a:r>
-            <a:r>
-              <a:rPr lang="en-US" dirty="0" err="1"/>
-              <a:t>SoS</a:t>
-            </a:r>
-            <a:r>
-              <a:rPr lang="en-US" dirty="0"/>
-              <a:t> </a:t>
-            </a:r>
-            <a:r>
-              <a:rPr lang="en-US" dirty="0" err="1"/>
-              <a:t>LoSS</a:t>
-            </a:r>
-            <a:r>
-              <a:rPr lang="en-US" dirty="0"/>
-              <a:t>))</a:t>
-            </a:r>
-          </a:p>
-          <a:p>
-            <a:r>
-              <a:rPr lang="en-US" dirty="0"/>
-              <a:t>         </a:t>
-            </a:r>
-            <a:r>
-              <a:rPr lang="en-US" dirty="0" err="1"/>
-              <a:t>LoSS</a:t>
-            </a:r>
-            <a:r>
-              <a:rPr lang="en-US" dirty="0"/>
-              <a:t>)</a:t>
-            </a:r>
-          </a:p>
-          <a:p>
-            <a:r>
-              <a:rPr lang="en-US" dirty="0">
-                <a:solidFill>
-                  <a:srgbClr val="FF0000"/>
-                </a:solidFill>
-              </a:rPr>
-              <a:t>-&gt;</a:t>
-            </a:r>
-            <a:r>
-              <a:rPr lang="en-US" dirty="0"/>
-              <a:t> (cons (cons "</a:t>
-            </a:r>
-            <a:r>
-              <a:rPr lang="en-US" dirty="0" err="1"/>
-              <a:t>alice</a:t>
-            </a:r>
-            <a:r>
-              <a:rPr lang="en-US" dirty="0"/>
-              <a:t>" (cons String </a:t>
-            </a:r>
-            <a:r>
-              <a:rPr lang="en-US" dirty="0" err="1"/>
-              <a:t>LoSS</a:t>
-            </a:r>
-            <a:r>
-              <a:rPr lang="en-US" dirty="0"/>
-              <a:t>))</a:t>
-            </a:r>
-          </a:p>
-          <a:p>
-            <a:r>
-              <a:rPr lang="en-US" dirty="0"/>
-              <a:t>         </a:t>
-            </a:r>
-            <a:r>
-              <a:rPr lang="en-US" dirty="0" err="1"/>
-              <a:t>LoSS</a:t>
-            </a:r>
-            <a:r>
-              <a:rPr lang="en-US" dirty="0"/>
-              <a:t>)</a:t>
-            </a:r>
-          </a:p>
-          <a:p>
-            <a:r>
-              <a:rPr lang="en-US" dirty="0">
-                <a:solidFill>
-                  <a:srgbClr val="FF0000"/>
-                </a:solidFill>
-              </a:rPr>
-              <a:t>-&gt;</a:t>
-            </a:r>
-            <a:r>
-              <a:rPr lang="en-US" dirty="0"/>
-              <a:t> (cons (cons "</a:t>
-            </a:r>
-            <a:r>
-              <a:rPr lang="en-US" dirty="0" err="1"/>
-              <a:t>alice</a:t>
-            </a:r>
-            <a:r>
-              <a:rPr lang="en-US" dirty="0"/>
-              <a:t>" (cons "bob" </a:t>
-            </a:r>
-            <a:r>
-              <a:rPr lang="en-US" dirty="0" err="1"/>
-              <a:t>LoSS</a:t>
-            </a:r>
-            <a:r>
-              <a:rPr lang="en-US" dirty="0"/>
-              <a:t>))</a:t>
-            </a:r>
-          </a:p>
-          <a:p>
-            <a:r>
-              <a:rPr lang="en-US" dirty="0"/>
-              <a:t>         </a:t>
-            </a:r>
-            <a:r>
-              <a:rPr lang="en-US" dirty="0" err="1"/>
-              <a:t>LoSS</a:t>
-            </a:r>
-            <a:r>
-              <a:rPr lang="en-US" dirty="0"/>
-              <a:t>)</a:t>
-            </a:r>
-          </a:p>
-          <a:p>
-            <a:r>
-              <a:rPr lang="en-US" dirty="0">
-                <a:solidFill>
-                  <a:srgbClr val="FF0000"/>
-                </a:solidFill>
-              </a:rPr>
-              <a:t>-&gt;</a:t>
-            </a:r>
-            <a:r>
-              <a:rPr lang="en-US" dirty="0"/>
-              <a:t> (cons (cons "</a:t>
-            </a:r>
-            <a:r>
-              <a:rPr lang="en-US" dirty="0" err="1"/>
-              <a:t>alice</a:t>
-            </a:r>
-            <a:r>
-              <a:rPr lang="en-US" dirty="0"/>
-              <a:t>" (cons "bob" empty))</a:t>
-            </a:r>
-          </a:p>
-          <a:p>
-            <a:r>
-              <a:rPr lang="en-US" dirty="0"/>
-              <a:t>         </a:t>
-            </a:r>
-            <a:r>
-              <a:rPr lang="en-US" dirty="0" err="1"/>
-              <a:t>LoSS</a:t>
-            </a:r>
-            <a:r>
-              <a:rPr lang="en-US" dirty="0"/>
-              <a:t>)</a:t>
-            </a:r>
-          </a:p>
-          <a:p>
-            <a:r>
-              <a:rPr lang="en-US" dirty="0"/>
-              <a:t>-&gt; (cons (cons "</a:t>
-            </a:r>
-            <a:r>
-              <a:rPr lang="en-US" dirty="0" err="1"/>
-              <a:t>alice</a:t>
-            </a:r>
-            <a:r>
-              <a:rPr lang="en-US" dirty="0"/>
-              <a:t>" (cons "bob" empty))</a:t>
-            </a:r>
-          </a:p>
-          <a:p>
-            <a:r>
-              <a:rPr lang="en-US" dirty="0"/>
-              <a:t>         (cons </a:t>
-            </a:r>
-            <a:r>
-              <a:rPr lang="en-US" dirty="0" err="1"/>
-              <a:t>SoS</a:t>
-            </a:r>
-            <a:r>
-              <a:rPr lang="en-US" dirty="0"/>
-              <a:t> </a:t>
-            </a:r>
-            <a:r>
-              <a:rPr lang="en-US" dirty="0" err="1"/>
-              <a:t>LoSS</a:t>
-            </a:r>
-            <a:r>
-              <a:rPr lang="en-US" dirty="0"/>
-              <a:t>))</a:t>
-            </a:r>
-          </a:p>
-          <a:p>
-            <a:r>
-              <a:rPr lang="en-US" dirty="0">
-                <a:solidFill>
-                  <a:srgbClr val="FF0000"/>
-                </a:solidFill>
-              </a:rPr>
-              <a:t>-&gt;</a:t>
-            </a:r>
-            <a:r>
-              <a:rPr lang="en-US" dirty="0"/>
-              <a:t> (cons (cons "</a:t>
-            </a:r>
-            <a:r>
-              <a:rPr lang="en-US" dirty="0" err="1"/>
-              <a:t>alice</a:t>
-            </a:r>
-            <a:r>
-              <a:rPr lang="en-US" dirty="0"/>
-              <a:t>" (cons "bob" empty))</a:t>
-            </a:r>
-          </a:p>
-          <a:p>
-            <a:r>
-              <a:rPr lang="en-US" dirty="0"/>
-              <a:t>         (cons String </a:t>
-            </a:r>
-            <a:r>
-              <a:rPr lang="en-US" dirty="0" err="1"/>
-              <a:t>LoSS</a:t>
-            </a:r>
-            <a:r>
-              <a:rPr lang="en-US" dirty="0"/>
-              <a:t>))</a:t>
-            </a:r>
-          </a:p>
-          <a:p>
-            <a:r>
-              <a:rPr lang="en-US" dirty="0">
-                <a:solidFill>
-                  <a:srgbClr val="FF0000"/>
-                </a:solidFill>
-              </a:rPr>
-              <a:t>-&gt;</a:t>
-            </a:r>
-            <a:r>
-              <a:rPr lang="en-US" dirty="0"/>
-              <a:t> (cons (cons "</a:t>
-            </a:r>
-            <a:r>
-              <a:rPr lang="en-US" dirty="0" err="1"/>
-              <a:t>alice</a:t>
-            </a:r>
-            <a:r>
-              <a:rPr lang="en-US" dirty="0"/>
-              <a:t>" (cons "bob" empty))</a:t>
-            </a:r>
-          </a:p>
-          <a:p>
-            <a:r>
-              <a:rPr lang="en-US" dirty="0"/>
-              <a:t>         (cons "</a:t>
-            </a:r>
-            <a:r>
-              <a:rPr lang="en-US" dirty="0" err="1"/>
-              <a:t>carole</a:t>
-            </a:r>
-            <a:r>
-              <a:rPr lang="en-US" dirty="0"/>
-              <a:t>" </a:t>
-            </a:r>
-            <a:r>
-              <a:rPr lang="en-US" dirty="0" err="1"/>
-              <a:t>LoSS</a:t>
-            </a:r>
-            <a:r>
-              <a:rPr lang="en-US" dirty="0"/>
-              <a:t>))</a:t>
-            </a:r>
-          </a:p>
-          <a:p>
-            <a:r>
-              <a:rPr lang="en-US" dirty="0">
-                <a:solidFill>
-                  <a:srgbClr val="FF0000"/>
-                </a:solidFill>
-              </a:rPr>
-              <a:t>-&gt;</a:t>
-            </a:r>
-            <a:r>
-              <a:rPr lang="en-US" dirty="0"/>
-              <a:t> (cons (cons "</a:t>
-            </a:r>
-            <a:r>
-              <a:rPr lang="en-US" dirty="0" err="1"/>
-              <a:t>alice</a:t>
-            </a:r>
-            <a:r>
-              <a:rPr lang="en-US" dirty="0"/>
-              <a:t>" (cons "bob" empty))</a:t>
-            </a:r>
-          </a:p>
-          <a:p>
-            <a:r>
-              <a:rPr lang="en-US" dirty="0"/>
-              <a:t>         (cons "</a:t>
-            </a:r>
-            <a:r>
-              <a:rPr lang="en-US" dirty="0" err="1"/>
-              <a:t>carole</a:t>
-            </a:r>
-            <a:r>
-              <a:rPr lang="en-US" dirty="0"/>
-              <a:t>" empty))</a:t>
-            </a:r>
-          </a:p>
-        </p:txBody>
-      </p:sp>
-      <p:sp>
-        <p:nvSpPr>
-          <p:cNvPr id="4" name="Slide Number Placeholder 3"/>
-          <p:cNvSpPr>
-            <a:spLocks noGrp="1"/>
-          </p:cNvSpPr>
-          <p:nvPr>
-            <p:ph type="sldNum" sz="quarter" idx="12"/>
-          </p:nvPr>
-        </p:nvSpPr>
-        <p:spPr/>
-        <p:txBody>
-          <a:bodyPr/>
-          <a:lstStyle/>
-          <a:p>
-            <a:fld id="{2AF3B5EA-18B6-4040-9F78-6052AF49C681}" type="slidenum">
-              <a:rPr lang="en-US" smtClean="0"/>
-              <a:t>10</a:t>
-            </a:fld>
-            <a:endParaRPr lang="en-US"/>
-          </a:p>
-        </p:txBody>
-      </p:sp>
-      <p:sp>
-        <p:nvSpPr>
-          <p:cNvPr id="6" name="Rectangle 5"/>
-          <p:cNvSpPr/>
-          <p:nvPr/>
-        </p:nvSpPr>
-        <p:spPr>
-          <a:xfrm>
-            <a:off x="838200" y="6051550"/>
-            <a:ext cx="1295400" cy="609600"/>
-          </a:xfrm>
-          <a:prstGeom prst="rect">
-            <a:avLst/>
-          </a:prstGeom>
-          <a:solidFill>
-            <a:schemeClr val="accent3">
-              <a:lumMod val="40000"/>
-              <a:lumOff val="60000"/>
-            </a:schemeClr>
-          </a:solidFill>
-          <a:ln/>
-        </p:spPr>
-        <p:style>
-          <a:lnRef idx="2">
-            <a:schemeClr val="accent1"/>
-          </a:lnRef>
-          <a:fillRef idx="1">
-            <a:schemeClr val="lt1"/>
-          </a:fillRef>
-          <a:effectRef idx="0">
-            <a:schemeClr val="accent1"/>
-          </a:effectRef>
-          <a:fontRef idx="minor">
-            <a:schemeClr val="dk1"/>
-          </a:fontRef>
-        </p:style>
-        <p:txBody>
-          <a:bodyPr rot="0" spcFirstLastPara="0" vertOverflow="overflow" horzOverflow="overflow" vert="horz" wrap="square" lIns="91440" tIns="45720" rIns="91440" bIns="45720" numCol="1" spcCol="0" rtlCol="0" fromWordArt="0" anchor="ctr" anchorCtr="0" forceAA="0" compatLnSpc="1">
-            <a:prstTxWarp prst="textNoShape">
-              <a:avLst/>
-            </a:prstTxWarp>
-            <a:noAutofit/>
-          </a:bodyPr>
-          <a:lstStyle/>
-          <a:p>
-            <a:pPr algn="ctr"/>
-            <a:r>
-              <a:rPr lang="en-US" dirty="0">
-                <a:solidFill>
-                  <a:schemeClr val="tx1"/>
-                </a:solidFill>
-              </a:rPr>
-              <a:t>15 steps!</a:t>
-            </a:r>
-          </a:p>
-        </p:txBody>
-      </p:sp>
-      <p:sp>
-        <p:nvSpPr>
-          <p:cNvPr id="7" name="Rectangle 6"/>
-          <p:cNvSpPr/>
-          <p:nvPr/>
-        </p:nvSpPr>
-        <p:spPr>
-          <a:xfrm>
-            <a:off x="4572000" y="1828799"/>
-            <a:ext cx="3581400" cy="4832351"/>
-          </a:xfrm>
-          <a:prstGeom prst="rect">
-            <a:avLst/>
-          </a:prstGeom>
-          <a:solidFill>
-            <a:schemeClr val="accent3">
-              <a:lumMod val="40000"/>
-              <a:lumOff val="60000"/>
-            </a:schemeClr>
-          </a:solidFill>
-          <a:ln/>
-        </p:spPr>
-        <p:style>
-          <a:lnRef idx="2">
-            <a:schemeClr val="accent1"/>
-          </a:lnRef>
-          <a:fillRef idx="1">
-            <a:schemeClr val="lt1"/>
-          </a:fillRef>
-          <a:effectRef idx="0">
-            <a:schemeClr val="accent1"/>
-          </a:effectRef>
-          <a:fontRef idx="minor">
-            <a:schemeClr val="dk1"/>
-          </a:fontRef>
-        </p:style>
-        <p:txBody>
-          <a:bodyPr rot="0" spcFirstLastPara="0" vertOverflow="overflow" horzOverflow="overflow" vert="horz" wrap="square" lIns="91440" tIns="45720" rIns="91440" bIns="45720" numCol="1" spcCol="0" rtlCol="0" fromWordArt="0" anchor="t" anchorCtr="0" forceAA="0" compatLnSpc="1">
-            <a:prstTxWarp prst="textNoShape">
-              <a:avLst/>
-            </a:prstTxWarp>
-            <a:noAutofit/>
-          </a:bodyPr>
-          <a:lstStyle/>
-          <a:p>
-            <a:r>
-              <a:rPr lang="en-US" dirty="0">
-                <a:solidFill>
-                  <a:schemeClr val="tx1"/>
-                </a:solidFill>
-              </a:rPr>
-              <a:t>A data definition is like a grammar.  Here we’ve written out the derivation of our cons-expression in the grammar.</a:t>
-            </a:r>
-          </a:p>
-          <a:p>
-            <a:endParaRPr lang="en-US" dirty="0">
-              <a:solidFill>
-                <a:schemeClr val="tx1"/>
-              </a:solidFill>
-            </a:endParaRPr>
-          </a:p>
-          <a:p>
-            <a:r>
-              <a:rPr lang="en-US" dirty="0">
-                <a:solidFill>
-                  <a:schemeClr val="tx1"/>
-                </a:solidFill>
-              </a:rPr>
-              <a:t>This may seem like overkill now, but </a:t>
-            </a:r>
-          </a:p>
-          <a:p>
-            <a:r>
-              <a:rPr lang="en-US" dirty="0">
-                <a:solidFill>
-                  <a:schemeClr val="tx1"/>
-                </a:solidFill>
-              </a:rPr>
-              <a:t>we will need this level of detail when we think about halting measures for functions on S-expressions.</a:t>
-            </a:r>
-          </a:p>
-          <a:p>
-            <a:endParaRPr lang="en-US" dirty="0">
-              <a:solidFill>
-                <a:schemeClr val="tx1"/>
-              </a:solidFill>
-            </a:endParaRPr>
-          </a:p>
-          <a:p>
-            <a:r>
-              <a:rPr lang="en-US" dirty="0">
-                <a:solidFill>
-                  <a:schemeClr val="tx1"/>
-                </a:solidFill>
-              </a:rPr>
-              <a:t>Note that many of the steps (the ones marked in red) don’t make the expression any bigger.  These correspond to “chain productions” in the grammar, like </a:t>
-            </a:r>
-            <a:r>
-              <a:rPr lang="en-US" b="1" dirty="0" err="1">
-                <a:solidFill>
-                  <a:schemeClr val="tx1"/>
-                </a:solidFill>
-              </a:rPr>
-              <a:t>SoS</a:t>
-            </a:r>
-            <a:r>
-              <a:rPr lang="en-US" b="1" dirty="0">
-                <a:solidFill>
-                  <a:schemeClr val="tx1"/>
-                </a:solidFill>
-              </a:rPr>
-              <a:t> </a:t>
-            </a:r>
-            <a:r>
-              <a:rPr lang="en-US" b="1" dirty="0">
-                <a:solidFill>
-                  <a:schemeClr val="tx1"/>
-                </a:solidFill>
-                <a:sym typeface="Wingdings" panose="05000000000000000000" pitchFamily="2" charset="2"/>
-              </a:rPr>
-              <a:t> </a:t>
-            </a:r>
-            <a:r>
-              <a:rPr lang="en-US" b="1" dirty="0" err="1">
-                <a:solidFill>
-                  <a:schemeClr val="tx1"/>
-                </a:solidFill>
-                <a:sym typeface="Wingdings" panose="05000000000000000000" pitchFamily="2" charset="2"/>
-              </a:rPr>
-              <a:t>LoSS</a:t>
-            </a:r>
-            <a:r>
-              <a:rPr lang="en-US" b="1" dirty="0">
-                <a:solidFill>
-                  <a:schemeClr val="tx1"/>
-                </a:solidFill>
-                <a:sym typeface="Wingdings" panose="05000000000000000000" pitchFamily="2" charset="2"/>
-              </a:rPr>
-              <a:t> </a:t>
-            </a:r>
-            <a:r>
-              <a:rPr lang="en-US" dirty="0">
-                <a:solidFill>
-                  <a:schemeClr val="tx1"/>
-                </a:solidFill>
-                <a:sym typeface="Wingdings" panose="05000000000000000000" pitchFamily="2" charset="2"/>
-              </a:rPr>
-              <a:t>or </a:t>
-            </a:r>
-            <a:r>
-              <a:rPr lang="en-US" b="1" dirty="0" err="1">
-                <a:solidFill>
-                  <a:schemeClr val="tx1"/>
-                </a:solidFill>
-                <a:sym typeface="Wingdings" panose="05000000000000000000" pitchFamily="2" charset="2"/>
-              </a:rPr>
-              <a:t>SoS</a:t>
-            </a:r>
-            <a:r>
-              <a:rPr lang="en-US" b="1" dirty="0">
-                <a:solidFill>
-                  <a:schemeClr val="tx1"/>
-                </a:solidFill>
-                <a:sym typeface="Wingdings" panose="05000000000000000000" pitchFamily="2" charset="2"/>
-              </a:rPr>
-              <a:t>  String</a:t>
-            </a:r>
-            <a:endParaRPr lang="en-US" b="1" dirty="0">
-              <a:solidFill>
-                <a:schemeClr val="tx1"/>
-              </a:solidFill>
-            </a:endParaRPr>
-          </a:p>
-          <a:p>
-            <a:endParaRPr lang="en-US" dirty="0">
-              <a:solidFill>
-                <a:schemeClr val="tx1"/>
-              </a:solidFill>
-            </a:endParaRPr>
-          </a:p>
-        </p:txBody>
-      </p:sp>
-    </p:spTree>
-    <p:extLst>
-      <p:ext uri="{BB962C8B-B14F-4D97-AF65-F5344CB8AC3E}">
-        <p14:creationId xmlns:p14="http://schemas.microsoft.com/office/powerpoint/2010/main" val="239584471"/>
-      </p:ext>
-    </p:extLst>
-  </p:cSld>
-  <p:clrMapOvr>
-    <a:masterClrMapping/>
-  </p:clrMapOvr>
-</p:sld>
-</file>
-
-<file path=ppt/slides/slide11.xml><?xml version="1.0" encoding="utf-8"?>
-<p:sld xmlns:a="http://schemas.openxmlformats.org/drawingml/2006/main" xmlns:r="http://schemas.openxmlformats.org/officeDocument/2006/relationships" xmlns:p="http://schemas.openxmlformats.org/presentationml/2006/main">
-  <p:cSld>
-    <p:spTree>
-      <p:nvGrpSpPr>
-        <p:cNvPr id="1" name=""/>
-        <p:cNvGrpSpPr/>
-        <p:nvPr/>
-      </p:nvGrpSpPr>
-      <p:grpSpPr>
-        <a:xfrm>
-          <a:off x="0" y="0"/>
-          <a:ext cx="0" cy="0"/>
-          <a:chOff x="0" y="0"/>
-          <a:chExt cx="0" cy="0"/>
-        </a:xfrm>
-      </p:grpSpPr>
-      <p:sp>
-        <p:nvSpPr>
-          <p:cNvPr id="2" name="Title 1"/>
-          <p:cNvSpPr>
-            <a:spLocks noGrp="1"/>
-          </p:cNvSpPr>
-          <p:nvPr>
-            <p:ph type="title"/>
-          </p:nvPr>
-        </p:nvSpPr>
-        <p:spPr/>
-        <p:txBody>
-          <a:bodyPr/>
-          <a:lstStyle/>
-          <a:p>
-            <a:r>
-              <a:rPr lang="en-US" dirty="0"/>
-              <a:t>Data Structures</a:t>
-            </a:r>
-          </a:p>
-        </p:txBody>
-      </p:sp>
-      <p:sp>
-        <p:nvSpPr>
-          <p:cNvPr id="3" name="Content Placeholder 2"/>
-          <p:cNvSpPr>
-            <a:spLocks noGrp="1"/>
-          </p:cNvSpPr>
-          <p:nvPr>
-            <p:ph idx="1"/>
-          </p:nvPr>
-        </p:nvSpPr>
-        <p:spPr/>
-        <p:txBody>
-          <a:bodyPr>
-            <a:normAutofit/>
-          </a:bodyPr>
-          <a:lstStyle/>
-          <a:p>
-            <a:pPr>
-              <a:buNone/>
-            </a:pPr>
-            <a:r>
-              <a:rPr lang="en-US" b="1" dirty="0">
-                <a:latin typeface="Consolas" pitchFamily="49" charset="0"/>
-                <a:cs typeface="Consolas" pitchFamily="49" charset="0"/>
-              </a:rPr>
-              <a:t>"</a:t>
-            </a:r>
-            <a:r>
-              <a:rPr lang="en-US" b="1" dirty="0" err="1">
-                <a:latin typeface="Consolas" pitchFamily="49" charset="0"/>
-                <a:cs typeface="Consolas" pitchFamily="49" charset="0"/>
-              </a:rPr>
-              <a:t>alice</a:t>
-            </a:r>
-            <a:r>
-              <a:rPr lang="en-US" b="1" dirty="0">
-                <a:latin typeface="Consolas" pitchFamily="49" charset="0"/>
-                <a:cs typeface="Consolas" pitchFamily="49" charset="0"/>
-              </a:rPr>
-              <a:t>"</a:t>
-            </a:r>
-          </a:p>
-          <a:p>
-            <a:pPr>
-              <a:buNone/>
-            </a:pPr>
-            <a:r>
-              <a:rPr lang="en-US" b="1" dirty="0">
-                <a:latin typeface="Consolas" pitchFamily="49" charset="0"/>
-                <a:cs typeface="Consolas" pitchFamily="49" charset="0"/>
-              </a:rPr>
-              <a:t>"bob"</a:t>
-            </a:r>
-          </a:p>
-          <a:p>
-            <a:pPr>
-              <a:buNone/>
-            </a:pPr>
-            <a:r>
-              <a:rPr lang="en-US" b="1" dirty="0">
-                <a:latin typeface="Consolas" pitchFamily="49" charset="0"/>
-                <a:cs typeface="Consolas" pitchFamily="49" charset="0"/>
-              </a:rPr>
-              <a:t>"</a:t>
-            </a:r>
-            <a:r>
-              <a:rPr lang="en-US" b="1" dirty="0" err="1">
-                <a:latin typeface="Consolas" pitchFamily="49" charset="0"/>
-                <a:cs typeface="Consolas" pitchFamily="49" charset="0"/>
-              </a:rPr>
-              <a:t>carole</a:t>
-            </a:r>
-            <a:r>
-              <a:rPr lang="en-US" b="1" dirty="0">
-                <a:latin typeface="Consolas" pitchFamily="49" charset="0"/>
-                <a:cs typeface="Consolas" pitchFamily="49" charset="0"/>
-              </a:rPr>
-              <a:t>"</a:t>
-            </a:r>
-          </a:p>
-          <a:p>
-            <a:pPr>
-              <a:buNone/>
-            </a:pPr>
-            <a:r>
-              <a:rPr lang="en-US" b="1" dirty="0">
-                <a:latin typeface="Consolas" pitchFamily="49" charset="0"/>
-                <a:cs typeface="Consolas" pitchFamily="49" charset="0"/>
-              </a:rPr>
-              <a:t>("</a:t>
-            </a:r>
-            <a:r>
-              <a:rPr lang="en-US" b="1" dirty="0" err="1">
-                <a:latin typeface="Consolas" pitchFamily="49" charset="0"/>
-                <a:cs typeface="Consolas" pitchFamily="49" charset="0"/>
-              </a:rPr>
-              <a:t>alice</a:t>
-            </a:r>
-            <a:r>
-              <a:rPr lang="en-US" b="1" dirty="0">
-                <a:latin typeface="Consolas" pitchFamily="49" charset="0"/>
-                <a:cs typeface="Consolas" pitchFamily="49" charset="0"/>
-              </a:rPr>
-              <a:t>" "bob")</a:t>
-            </a:r>
-          </a:p>
-        </p:txBody>
-      </p:sp>
-      <p:sp>
-        <p:nvSpPr>
-          <p:cNvPr id="18" name="Slide Number Placeholder 17"/>
-          <p:cNvSpPr>
-            <a:spLocks noGrp="1"/>
-          </p:cNvSpPr>
-          <p:nvPr>
-            <p:ph type="sldNum" sz="quarter" idx="12"/>
-          </p:nvPr>
-        </p:nvSpPr>
-        <p:spPr/>
-        <p:txBody>
-          <a:bodyPr/>
-          <a:lstStyle/>
-          <a:p>
-            <a:fld id="{C1D4534E-1B22-4A44-850A-B3E8E9EE687A}" type="slidenum">
-              <a:rPr lang="en-US" smtClean="0"/>
-              <a:t>11</a:t>
-            </a:fld>
-            <a:endParaRPr lang="en-US"/>
-          </a:p>
-        </p:txBody>
-      </p:sp>
-      <p:grpSp>
-        <p:nvGrpSpPr>
-          <p:cNvPr id="4" name="Group 4"/>
-          <p:cNvGrpSpPr>
-            <a:grpSpLocks/>
-          </p:cNvGrpSpPr>
-          <p:nvPr/>
-        </p:nvGrpSpPr>
-        <p:grpSpPr bwMode="auto">
-          <a:xfrm>
-            <a:off x="3619500" y="4578351"/>
-            <a:ext cx="2933700" cy="1071563"/>
-            <a:chOff x="2493" y="1488"/>
-            <a:chExt cx="1152" cy="675"/>
-          </a:xfrm>
-        </p:grpSpPr>
-        <p:grpSp>
-          <p:nvGrpSpPr>
-            <p:cNvPr id="5" name="Group 5"/>
-            <p:cNvGrpSpPr>
-              <a:grpSpLocks/>
-            </p:cNvGrpSpPr>
-            <p:nvPr/>
-          </p:nvGrpSpPr>
-          <p:grpSpPr bwMode="auto">
-            <a:xfrm>
-              <a:off x="2493" y="1488"/>
-              <a:ext cx="480" cy="192"/>
-              <a:chOff x="1392" y="1536"/>
-              <a:chExt cx="480" cy="192"/>
-            </a:xfrm>
-          </p:grpSpPr>
-          <p:sp>
-            <p:nvSpPr>
-              <p:cNvPr id="15" name="Rectangle 6"/>
-              <p:cNvSpPr>
-                <a:spLocks noChangeArrowheads="1"/>
-              </p:cNvSpPr>
-              <p:nvPr/>
-            </p:nvSpPr>
-            <p:spPr bwMode="auto">
-              <a:xfrm>
-                <a:off x="1392" y="1536"/>
-                <a:ext cx="240" cy="192"/>
-              </a:xfrm>
-              <a:prstGeom prst="rect">
-                <a:avLst/>
-              </a:prstGeom>
-              <a:noFill/>
-              <a:ln w="9525">
-                <a:solidFill>
-                  <a:schemeClr val="tx1"/>
-                </a:solidFill>
-                <a:miter lim="800000"/>
-                <a:headEnd/>
-                <a:tailEnd/>
-              </a:ln>
-              <a:effectLst/>
-            </p:spPr>
-            <p:txBody>
-              <a:bodyPr wrap="none" anchor="ctr"/>
-              <a:lstStyle/>
-              <a:p>
-                <a:endParaRPr lang="en-US"/>
-              </a:p>
-            </p:txBody>
-          </p:sp>
-          <p:sp>
-            <p:nvSpPr>
-              <p:cNvPr id="16" name="Rectangle 7"/>
-              <p:cNvSpPr>
-                <a:spLocks noChangeArrowheads="1"/>
-              </p:cNvSpPr>
-              <p:nvPr/>
-            </p:nvSpPr>
-            <p:spPr bwMode="auto">
-              <a:xfrm>
-                <a:off x="1632" y="1536"/>
-                <a:ext cx="240" cy="192"/>
-              </a:xfrm>
-              <a:prstGeom prst="rect">
-                <a:avLst/>
-              </a:prstGeom>
-              <a:noFill/>
-              <a:ln w="9525">
-                <a:solidFill>
-                  <a:schemeClr val="tx1"/>
-                </a:solidFill>
-                <a:miter lim="800000"/>
-                <a:headEnd/>
-                <a:tailEnd/>
-              </a:ln>
-              <a:effectLst/>
-            </p:spPr>
-            <p:txBody>
-              <a:bodyPr wrap="none" anchor="ctr"/>
-              <a:lstStyle/>
-              <a:p>
-                <a:endParaRPr lang="en-US"/>
-              </a:p>
-            </p:txBody>
-          </p:sp>
-        </p:grpSp>
-        <p:grpSp>
-          <p:nvGrpSpPr>
-            <p:cNvPr id="6" name="Group 8"/>
-            <p:cNvGrpSpPr>
-              <a:grpSpLocks/>
-            </p:cNvGrpSpPr>
-            <p:nvPr/>
-          </p:nvGrpSpPr>
-          <p:grpSpPr bwMode="auto">
-            <a:xfrm>
-              <a:off x="3165" y="1488"/>
-              <a:ext cx="480" cy="192"/>
-              <a:chOff x="1392" y="1536"/>
-              <a:chExt cx="480" cy="192"/>
-            </a:xfrm>
-          </p:grpSpPr>
-          <p:sp>
-            <p:nvSpPr>
-              <p:cNvPr id="13" name="Rectangle 9"/>
-              <p:cNvSpPr>
-                <a:spLocks noChangeArrowheads="1"/>
-              </p:cNvSpPr>
-              <p:nvPr/>
-            </p:nvSpPr>
-            <p:spPr bwMode="auto">
-              <a:xfrm>
-                <a:off x="1392" y="1536"/>
-                <a:ext cx="240" cy="192"/>
-              </a:xfrm>
-              <a:prstGeom prst="rect">
-                <a:avLst/>
-              </a:prstGeom>
-              <a:noFill/>
-              <a:ln w="9525">
-                <a:solidFill>
-                  <a:schemeClr val="tx1"/>
-                </a:solidFill>
-                <a:miter lim="800000"/>
-                <a:headEnd/>
-                <a:tailEnd/>
-              </a:ln>
-              <a:effectLst/>
-            </p:spPr>
-            <p:txBody>
-              <a:bodyPr wrap="none" anchor="ctr"/>
-              <a:lstStyle/>
-              <a:p>
-                <a:endParaRPr lang="en-US"/>
-              </a:p>
-            </p:txBody>
-          </p:sp>
-          <p:sp>
-            <p:nvSpPr>
-              <p:cNvPr id="14" name="Rectangle 10"/>
-              <p:cNvSpPr>
-                <a:spLocks noChangeArrowheads="1"/>
-              </p:cNvSpPr>
-              <p:nvPr/>
-            </p:nvSpPr>
-            <p:spPr bwMode="auto">
-              <a:xfrm>
-                <a:off x="1632" y="1536"/>
-                <a:ext cx="240" cy="192"/>
-              </a:xfrm>
-              <a:prstGeom prst="rect">
-                <a:avLst/>
-              </a:prstGeom>
-              <a:noFill/>
-              <a:ln w="9525">
-                <a:solidFill>
-                  <a:schemeClr val="tx1"/>
-                </a:solidFill>
-                <a:miter lim="800000"/>
-                <a:headEnd/>
-                <a:tailEnd/>
-              </a:ln>
-              <a:effectLst/>
-            </p:spPr>
-            <p:txBody>
-              <a:bodyPr wrap="none" anchor="ctr"/>
-              <a:lstStyle/>
-              <a:p>
-                <a:endParaRPr lang="en-US"/>
-              </a:p>
-            </p:txBody>
-          </p:sp>
-        </p:grpSp>
-        <p:sp>
-          <p:nvSpPr>
-            <p:cNvPr id="7" name="Line 11"/>
-            <p:cNvSpPr>
-              <a:spLocks noChangeShapeType="1"/>
-            </p:cNvSpPr>
-            <p:nvPr/>
-          </p:nvSpPr>
-          <p:spPr bwMode="auto">
-            <a:xfrm>
-              <a:off x="2829" y="1584"/>
-              <a:ext cx="336" cy="0"/>
-            </a:xfrm>
-            <a:prstGeom prst="line">
-              <a:avLst/>
-            </a:prstGeom>
-            <a:noFill/>
-            <a:ln w="9525">
-              <a:solidFill>
-                <a:schemeClr val="tx1"/>
-              </a:solidFill>
-              <a:round/>
-              <a:headEnd/>
-              <a:tailEnd type="triangle" w="med" len="med"/>
-            </a:ln>
-            <a:effectLst/>
-          </p:spPr>
-          <p:txBody>
-            <a:bodyPr wrap="none" anchor="ctr"/>
-            <a:lstStyle/>
-            <a:p>
-              <a:endParaRPr lang="en-US"/>
-            </a:p>
-          </p:txBody>
-        </p:sp>
-        <p:sp>
-          <p:nvSpPr>
-            <p:cNvPr id="8" name="Line 12"/>
-            <p:cNvSpPr>
-              <a:spLocks noChangeShapeType="1"/>
-            </p:cNvSpPr>
-            <p:nvPr/>
-          </p:nvSpPr>
-          <p:spPr bwMode="auto">
-            <a:xfrm>
-              <a:off x="3405" y="1488"/>
-              <a:ext cx="240" cy="192"/>
-            </a:xfrm>
-            <a:prstGeom prst="line">
-              <a:avLst/>
-            </a:prstGeom>
-            <a:noFill/>
-            <a:ln w="9525">
-              <a:solidFill>
-                <a:schemeClr val="tx1"/>
-              </a:solidFill>
-              <a:round/>
-              <a:headEnd/>
-              <a:tailEnd/>
-            </a:ln>
-            <a:effectLst/>
-          </p:spPr>
-          <p:txBody>
-            <a:bodyPr wrap="none" anchor="ctr"/>
-            <a:lstStyle/>
-            <a:p>
-              <a:endParaRPr lang="en-US"/>
-            </a:p>
-          </p:txBody>
-        </p:sp>
-        <p:sp>
-          <p:nvSpPr>
-            <p:cNvPr id="9" name="Line 13"/>
-            <p:cNvSpPr>
-              <a:spLocks noChangeShapeType="1"/>
-            </p:cNvSpPr>
-            <p:nvPr/>
-          </p:nvSpPr>
-          <p:spPr bwMode="auto">
-            <a:xfrm>
-              <a:off x="2589" y="1584"/>
-              <a:ext cx="0" cy="336"/>
-            </a:xfrm>
-            <a:prstGeom prst="line">
-              <a:avLst/>
-            </a:prstGeom>
-            <a:noFill/>
-            <a:ln w="9525">
-              <a:solidFill>
-                <a:schemeClr val="tx1"/>
-              </a:solidFill>
-              <a:round/>
-              <a:headEnd/>
-              <a:tailEnd type="triangle" w="med" len="med"/>
-            </a:ln>
-            <a:effectLst/>
-          </p:spPr>
-          <p:txBody>
-            <a:bodyPr wrap="none" anchor="ctr"/>
-            <a:lstStyle/>
-            <a:p>
-              <a:endParaRPr lang="en-US"/>
-            </a:p>
-          </p:txBody>
-        </p:sp>
-        <p:sp>
-          <p:nvSpPr>
-            <p:cNvPr id="10" name="Line 14"/>
-            <p:cNvSpPr>
-              <a:spLocks noChangeShapeType="1"/>
-            </p:cNvSpPr>
-            <p:nvPr/>
-          </p:nvSpPr>
-          <p:spPr bwMode="auto">
-            <a:xfrm>
-              <a:off x="3261" y="1584"/>
-              <a:ext cx="0" cy="336"/>
-            </a:xfrm>
-            <a:prstGeom prst="line">
-              <a:avLst/>
-            </a:prstGeom>
-            <a:noFill/>
-            <a:ln w="9525">
-              <a:solidFill>
-                <a:schemeClr val="tx1"/>
-              </a:solidFill>
-              <a:round/>
-              <a:headEnd/>
-              <a:tailEnd type="triangle" w="med" len="med"/>
-            </a:ln>
-            <a:effectLst/>
-          </p:spPr>
-          <p:txBody>
-            <a:bodyPr wrap="none" anchor="ctr"/>
-            <a:lstStyle/>
-            <a:p>
-              <a:endParaRPr lang="en-US"/>
-            </a:p>
-          </p:txBody>
-        </p:sp>
-        <p:sp>
-          <p:nvSpPr>
-            <p:cNvPr id="11" name="Text Box 15"/>
-            <p:cNvSpPr txBox="1">
-              <a:spLocks noChangeArrowheads="1"/>
-            </p:cNvSpPr>
-            <p:nvPr/>
-          </p:nvSpPr>
-          <p:spPr bwMode="auto">
-            <a:xfrm>
-              <a:off x="2501" y="1872"/>
-              <a:ext cx="540" cy="291"/>
-            </a:xfrm>
-            <a:prstGeom prst="rect">
-              <a:avLst/>
-            </a:prstGeom>
-            <a:noFill/>
-            <a:ln w="9525">
-              <a:noFill/>
-              <a:miter lim="800000"/>
-              <a:headEnd/>
-              <a:tailEnd/>
-            </a:ln>
-            <a:effectLst/>
-          </p:spPr>
-          <p:txBody>
-            <a:bodyPr wrap="none">
-              <a:spAutoFit/>
-            </a:bodyPr>
-            <a:lstStyle/>
-            <a:p>
-              <a:r>
-                <a:rPr lang="en-US" sz="2400" b="1" dirty="0">
-                  <a:latin typeface="Consolas" pitchFamily="49" charset="0"/>
-                  <a:cs typeface="Consolas" pitchFamily="49" charset="0"/>
-                </a:rPr>
-                <a:t>"</a:t>
-              </a:r>
-              <a:r>
-                <a:rPr lang="en-US" sz="2400" b="1" dirty="0" err="1">
-                  <a:latin typeface="Consolas" pitchFamily="49" charset="0"/>
-                  <a:cs typeface="Consolas" pitchFamily="49" charset="0"/>
-                </a:rPr>
-                <a:t>alice</a:t>
-              </a:r>
-              <a:r>
-                <a:rPr lang="en-US" sz="2400" b="1" dirty="0">
-                  <a:latin typeface="Consolas" pitchFamily="49" charset="0"/>
-                  <a:cs typeface="Consolas" pitchFamily="49" charset="0"/>
-                </a:rPr>
-                <a:t>"</a:t>
-              </a:r>
-              <a:endParaRPr lang="en-US" sz="2400" b="1" i="0" dirty="0">
-                <a:latin typeface="Consolas" pitchFamily="49" charset="0"/>
-                <a:cs typeface="Consolas" pitchFamily="49" charset="0"/>
-              </a:endParaRPr>
-            </a:p>
-          </p:txBody>
-        </p:sp>
-        <p:sp>
-          <p:nvSpPr>
-            <p:cNvPr id="12" name="Text Box 16"/>
-            <p:cNvSpPr txBox="1">
-              <a:spLocks noChangeArrowheads="1"/>
-            </p:cNvSpPr>
-            <p:nvPr/>
-          </p:nvSpPr>
-          <p:spPr bwMode="auto">
-            <a:xfrm>
-              <a:off x="3161" y="1872"/>
-              <a:ext cx="406" cy="291"/>
-            </a:xfrm>
-            <a:prstGeom prst="rect">
-              <a:avLst/>
-            </a:prstGeom>
-            <a:noFill/>
-            <a:ln w="9525">
-              <a:noFill/>
-              <a:miter lim="800000"/>
-              <a:headEnd/>
-              <a:tailEnd/>
-            </a:ln>
-            <a:effectLst/>
-          </p:spPr>
-          <p:txBody>
-            <a:bodyPr wrap="none">
-              <a:spAutoFit/>
-            </a:bodyPr>
-            <a:lstStyle/>
-            <a:p>
-              <a:r>
-                <a:rPr lang="en-US" sz="2400" b="1" i="0" dirty="0">
-                  <a:latin typeface="Consolas" pitchFamily="49" charset="0"/>
-                  <a:cs typeface="Consolas" pitchFamily="49" charset="0"/>
-                </a:rPr>
-                <a:t>"bob"</a:t>
-              </a:r>
-            </a:p>
-          </p:txBody>
-        </p:sp>
-      </p:grpSp>
-      <p:sp>
-        <p:nvSpPr>
-          <p:cNvPr id="17" name="Rectangle 16"/>
-          <p:cNvSpPr/>
-          <p:nvPr/>
-        </p:nvSpPr>
-        <p:spPr>
-          <a:xfrm>
-            <a:off x="5410200" y="1676400"/>
-            <a:ext cx="3581400" cy="914400"/>
-          </a:xfrm>
-          <a:prstGeom prst="rect">
-            <a:avLst/>
-          </a:prstGeom>
-          <a:solidFill>
-            <a:schemeClr val="accent3">
-              <a:lumMod val="40000"/>
-              <a:lumOff val="60000"/>
-            </a:schemeClr>
-          </a:solidFill>
-          <a:ln/>
-        </p:spPr>
-        <p:style>
-          <a:lnRef idx="2">
-            <a:schemeClr val="accent1"/>
-          </a:lnRef>
-          <a:fillRef idx="1">
-            <a:schemeClr val="lt1"/>
-          </a:fillRef>
-          <a:effectRef idx="0">
-            <a:schemeClr val="accent1"/>
-          </a:effectRef>
-          <a:fontRef idx="minor">
-            <a:schemeClr val="dk1"/>
-          </a:fontRef>
-        </p:style>
-        <p:txBody>
-          <a:bodyPr rot="0" spcFirstLastPara="0" vertOverflow="overflow" horzOverflow="overflow" vert="horz" wrap="square" lIns="91440" tIns="45720" rIns="91440" bIns="45720" numCol="1" spcCol="0" rtlCol="0" fromWordArt="0" anchor="ctr" anchorCtr="0" forceAA="0" compatLnSpc="1">
-            <a:prstTxWarp prst="textNoShape">
-              <a:avLst/>
-            </a:prstTxWarp>
-            <a:noAutofit/>
-          </a:bodyPr>
-          <a:lstStyle/>
-          <a:p>
-            <a:pPr>
-              <a:defRPr/>
-            </a:pPr>
-            <a:r>
-              <a:rPr lang="en-US" dirty="0">
-                <a:solidFill>
-                  <a:schemeClr val="tx1"/>
-                </a:solidFill>
-              </a:rPr>
-              <a:t>A list of S-expressions is implemented as a singly-linked list.  Here is an example.</a:t>
-            </a:r>
-            <a:endParaRPr lang="en-US" dirty="0"/>
-          </a:p>
-        </p:txBody>
-      </p:sp>
-    </p:spTree>
-    <p:extLst>
-      <p:ext uri="{BB962C8B-B14F-4D97-AF65-F5344CB8AC3E}">
-        <p14:creationId xmlns:p14="http://schemas.microsoft.com/office/powerpoint/2010/main" val="3808444269"/>
-      </p:ext>
-    </p:extLst>
-  </p:cSld>
-  <p:clrMapOvr>
-    <a:masterClrMapping/>
-  </p:clrMapOvr>
-</p:sld>
-</file>
-
-<file path=ppt/slides/slide12.xml><?xml version="1.0" encoding="utf-8"?>
-<p:sld xmlns:a="http://schemas.openxmlformats.org/drawingml/2006/main" xmlns:r="http://schemas.openxmlformats.org/officeDocument/2006/relationships" xmlns:p="http://schemas.openxmlformats.org/presentationml/2006/main">
-  <p:cSld>
-    <p:spTree>
-      <p:nvGrpSpPr>
-        <p:cNvPr id="1" name=""/>
-        <p:cNvGrpSpPr/>
-        <p:nvPr/>
-      </p:nvGrpSpPr>
-      <p:grpSpPr>
-        <a:xfrm>
-          <a:off x="0" y="0"/>
-          <a:ext cx="0" cy="0"/>
-          <a:chOff x="0" y="0"/>
-          <a:chExt cx="0" cy="0"/>
-        </a:xfrm>
-      </p:grpSpPr>
-      <p:sp>
-        <p:nvSpPr>
-          <p:cNvPr id="2" name="Title 1"/>
-          <p:cNvSpPr>
-            <a:spLocks noGrp="1"/>
-          </p:cNvSpPr>
-          <p:nvPr>
-            <p:ph type="title"/>
-          </p:nvPr>
-        </p:nvSpPr>
-        <p:spPr/>
-        <p:txBody>
-          <a:bodyPr/>
-          <a:lstStyle/>
-          <a:p>
-            <a:r>
-              <a:rPr lang="en-US" dirty="0"/>
               <a:t>Data Structures</a:t>
             </a:r>
           </a:p>
@@ -6373,7 +4807,7 @@
           <a:p>
             <a:fld id="{C1D4534E-1B22-4A44-850A-B3E8E9EE687A}" type="slidenum">
               <a:rPr lang="en-US" smtClean="0"/>
-              <a:t>12</a:t>
+              <a:t>10</a:t>
             </a:fld>
             <a:endParaRPr lang="en-US"/>
           </a:p>
@@ -7342,7 +5776,7 @@
 </p:sld>
 </file>
 
-<file path=ppt/slides/slide13.xml><?xml version="1.0" encoding="utf-8"?>
+<file path=ppt/slides/slide11.xml><?xml version="1.0" encoding="utf-8"?>
 <p:sld xmlns:a="http://schemas.openxmlformats.org/drawingml/2006/main" xmlns:r="http://schemas.openxmlformats.org/officeDocument/2006/relationships" xmlns:p="http://schemas.openxmlformats.org/presentationml/2006/main">
   <p:cSld>
     <p:spTree>
@@ -7512,7 +5946,7 @@
           <a:p>
             <a:fld id="{C1D4534E-1B22-4A44-850A-B3E8E9EE687A}" type="slidenum">
               <a:rPr lang="en-US" smtClean="0"/>
-              <a:t>13</a:t>
+              <a:t>11</a:t>
             </a:fld>
             <a:endParaRPr lang="en-US"/>
           </a:p>
@@ -9015,7 +7449,7 @@
 </p:sld>
 </file>
 
-<file path=ppt/slides/slide14.xml><?xml version="1.0" encoding="utf-8"?>
+<file path=ppt/slides/slide12.xml><?xml version="1.0" encoding="utf-8"?>
 <p:sld xmlns:a="http://schemas.openxmlformats.org/drawingml/2006/main" xmlns:r="http://schemas.openxmlformats.org/officeDocument/2006/relationships" xmlns:p="http://schemas.openxmlformats.org/presentationml/2006/main">
   <p:cSld>
     <p:spTree>
@@ -9384,7 +7818,7 @@
           <a:p>
             <a:fld id="{C1D4534E-1B22-4A44-850A-B3E8E9EE687A}" type="slidenum">
               <a:rPr lang="en-US" smtClean="0"/>
-              <a:t>14</a:t>
+              <a:t>12</a:t>
             </a:fld>
             <a:endParaRPr lang="en-US"/>
           </a:p>
@@ -9460,7 +7894,7 @@
 </p:sld>
 </file>
 
-<file path=ppt/slides/slide15.xml><?xml version="1.0" encoding="utf-8"?>
+<file path=ppt/slides/slide13.xml><?xml version="1.0" encoding="utf-8"?>
 <p:sld xmlns:a="http://schemas.openxmlformats.org/drawingml/2006/main" xmlns:r="http://schemas.openxmlformats.org/officeDocument/2006/relationships" xmlns:p="http://schemas.openxmlformats.org/presentationml/2006/main">
   <p:cSld>
     <p:spTree>
@@ -9880,7 +8314,7 @@
           <a:p>
             <a:fld id="{C1D4534E-1B22-4A44-850A-B3E8E9EE687A}" type="slidenum">
               <a:rPr lang="en-US" smtClean="0"/>
-              <a:t>15</a:t>
+              <a:t>13</a:t>
             </a:fld>
             <a:endParaRPr lang="en-US"/>
           </a:p>
@@ -10309,7 +8743,7 @@
 </p:sld>
 </file>
 
-<file path=ppt/slides/slide16.xml><?xml version="1.0" encoding="utf-8"?>
+<file path=ppt/slides/slide14.xml><?xml version="1.0" encoding="utf-8"?>
 <p:sld xmlns:a="http://schemas.openxmlformats.org/drawingml/2006/main" xmlns:r="http://schemas.openxmlformats.org/officeDocument/2006/relationships" xmlns:p="http://schemas.openxmlformats.org/presentationml/2006/main">
   <p:cSld>
     <p:spTree>
@@ -10452,7 +8886,7 @@
           <a:p>
             <a:fld id="{C1D4534E-1B22-4A44-850A-B3E8E9EE687A}" type="slidenum">
               <a:rPr lang="en-US" smtClean="0"/>
-              <a:t>16</a:t>
+              <a:t>14</a:t>
             </a:fld>
             <a:endParaRPr lang="en-US"/>
           </a:p>
@@ -10635,7 +9069,7 @@
 </p:sld>
 </file>
 
-<file path=ppt/slides/slide17.xml><?xml version="1.0" encoding="utf-8"?>
+<file path=ppt/slides/slide15.xml><?xml version="1.0" encoding="utf-8"?>
 <p:sld xmlns:a="http://schemas.openxmlformats.org/drawingml/2006/main" xmlns:r="http://schemas.openxmlformats.org/officeDocument/2006/relationships" xmlns:p="http://schemas.openxmlformats.org/presentationml/2006/main">
   <p:cSld>
     <p:spTree>
@@ -10745,7 +9179,7 @@
           <a:p>
             <a:fld id="{C1D4534E-1B22-4A44-850A-B3E8E9EE687A}" type="slidenum">
               <a:rPr lang="en-US" smtClean="0"/>
-              <a:t>17</a:t>
+              <a:t>15</a:t>
             </a:fld>
             <a:endParaRPr lang="en-US"/>
           </a:p>
@@ -10764,7 +9198,7 @@
 </p:sld>
 </file>
 
-<file path=ppt/slides/slide18.xml><?xml version="1.0" encoding="utf-8"?>
+<file path=ppt/slides/slide16.xml><?xml version="1.0" encoding="utf-8"?>
 <p:sld xmlns:a="http://schemas.openxmlformats.org/drawingml/2006/main" xmlns:r="http://schemas.openxmlformats.org/officeDocument/2006/relationships" xmlns:p="http://schemas.openxmlformats.org/presentationml/2006/main">
   <p:cSld>
     <p:spTree>
@@ -10956,7 +9390,7 @@
           <a:p>
             <a:fld id="{C1D4534E-1B22-4A44-850A-B3E8E9EE687A}" type="slidenum">
               <a:rPr lang="en-US" smtClean="0"/>
-              <a:t>18</a:t>
+              <a:t>16</a:t>
             </a:fld>
             <a:endParaRPr lang="en-US"/>
           </a:p>
@@ -11095,7 +9529,7 @@
 </p:sld>
 </file>
 
-<file path=ppt/slides/slide19.xml><?xml version="1.0" encoding="utf-8"?>
+<file path=ppt/slides/slide17.xml><?xml version="1.0" encoding="utf-8"?>
 <p:sld xmlns:a="http://schemas.openxmlformats.org/drawingml/2006/main" xmlns:r="http://schemas.openxmlformats.org/officeDocument/2006/relationships" xmlns:p="http://schemas.openxmlformats.org/presentationml/2006/main">
   <p:cSld>
     <p:spTree>
@@ -11674,7 +10108,7 @@
           <a:p>
             <a:fld id="{C1D4534E-1B22-4A44-850A-B3E8E9EE687A}" type="slidenum">
               <a:rPr lang="en-US" smtClean="0"/>
-              <a:t>19</a:t>
+              <a:t>17</a:t>
             </a:fld>
             <a:endParaRPr lang="en-US"/>
           </a:p>
@@ -11693,125 +10127,7 @@
 </p:sld>
 </file>
 
-<file path=ppt/slides/slide2.xml><?xml version="1.0" encoding="utf-8"?>
-<p:sld xmlns:a="http://schemas.openxmlformats.org/drawingml/2006/main" xmlns:r="http://schemas.openxmlformats.org/officeDocument/2006/relationships" xmlns:p="http://schemas.openxmlformats.org/presentationml/2006/main">
-  <p:cSld>
-    <p:spTree>
-      <p:nvGrpSpPr>
-        <p:cNvPr id="1" name=""/>
-        <p:cNvGrpSpPr/>
-        <p:nvPr/>
-      </p:nvGrpSpPr>
-      <p:grpSpPr>
-        <a:xfrm>
-          <a:off x="0" y="0"/>
-          <a:ext cx="0" cy="0"/>
-          <a:chOff x="0" y="0"/>
-          <a:chExt cx="0" cy="0"/>
-        </a:xfrm>
-      </p:grpSpPr>
-      <p:sp>
-        <p:nvSpPr>
-          <p:cNvPr id="2" name="Title 1"/>
-          <p:cNvSpPr>
-            <a:spLocks noGrp="1"/>
-          </p:cNvSpPr>
-          <p:nvPr>
-            <p:ph type="title"/>
-          </p:nvPr>
-        </p:nvSpPr>
-        <p:spPr/>
-        <p:txBody>
-          <a:bodyPr/>
-          <a:lstStyle/>
-          <a:p>
-            <a:r>
-              <a:rPr lang="en-US" dirty="0"/>
-              <a:t>Learning Outcomes</a:t>
-            </a:r>
-          </a:p>
-        </p:txBody>
-      </p:sp>
-      <p:sp>
-        <p:nvSpPr>
-          <p:cNvPr id="3" name="Content Placeholder 2"/>
-          <p:cNvSpPr>
-            <a:spLocks noGrp="1"/>
-          </p:cNvSpPr>
-          <p:nvPr>
-            <p:ph idx="1"/>
-          </p:nvPr>
-        </p:nvSpPr>
-        <p:spPr/>
-        <p:txBody>
-          <a:bodyPr/>
-          <a:lstStyle/>
-          <a:p>
-            <a:r>
-              <a:rPr lang="en-US" dirty="0"/>
-              <a:t>At the end of this lesson, the student should be able to</a:t>
-            </a:r>
-          </a:p>
-          <a:p>
-            <a:pPr lvl="1"/>
-            <a:r>
-              <a:rPr lang="en-US" dirty="0"/>
-              <a:t>Give examples of S-expressions</a:t>
-            </a:r>
-          </a:p>
-          <a:p>
-            <a:pPr lvl="1"/>
-            <a:r>
-              <a:rPr lang="en-US" dirty="0"/>
-              <a:t>Write the data definition and template for S-expressions</a:t>
-            </a:r>
-          </a:p>
-          <a:p>
-            <a:pPr lvl="1"/>
-            <a:r>
-              <a:rPr lang="en-US" dirty="0"/>
-              <a:t>Write functions on S-expressions using the template</a:t>
-            </a:r>
-          </a:p>
-        </p:txBody>
-      </p:sp>
-      <p:sp>
-        <p:nvSpPr>
-          <p:cNvPr id="4" name="Slide Number Placeholder 3"/>
-          <p:cNvSpPr>
-            <a:spLocks noGrp="1"/>
-          </p:cNvSpPr>
-          <p:nvPr>
-            <p:ph type="sldNum" sz="quarter" idx="12"/>
-          </p:nvPr>
-        </p:nvSpPr>
-        <p:spPr/>
-        <p:txBody>
-          <a:bodyPr/>
-          <a:lstStyle/>
-          <a:p>
-            <a:fld id="{C1D4534E-1B22-4A44-850A-B3E8E9EE687A}" type="slidenum">
-              <a:rPr lang="en-US" smtClean="0"/>
-              <a:t>2</a:t>
-            </a:fld>
-            <a:endParaRPr lang="en-US"/>
-          </a:p>
-        </p:txBody>
-      </p:sp>
-    </p:spTree>
-    <p:extLst>
-      <p:ext uri="{BB962C8B-B14F-4D97-AF65-F5344CB8AC3E}">
-        <p14:creationId xmlns:p14="http://schemas.microsoft.com/office/powerpoint/2010/main" val="2186847188"/>
-      </p:ext>
-    </p:extLst>
-  </p:cSld>
-  <p:clrMapOvr>
-    <a:masterClrMapping/>
-  </p:clrMapOvr>
-</p:sld>
-</file>
-
-<file path=ppt/slides/slide20.xml><?xml version="1.0" encoding="utf-8"?>
+<file path=ppt/slides/slide18.xml><?xml version="1.0" encoding="utf-8"?>
 <p:sld xmlns:a="http://schemas.openxmlformats.org/drawingml/2006/main" xmlns:r="http://schemas.openxmlformats.org/officeDocument/2006/relationships" xmlns:p="http://schemas.openxmlformats.org/presentationml/2006/main">
   <p:cSld>
     <p:spTree>
@@ -11903,7 +10219,7 @@
           <a:p>
             <a:fld id="{C1D4534E-1B22-4A44-850A-B3E8E9EE687A}" type="slidenum">
               <a:rPr lang="en-US" smtClean="0"/>
-              <a:t>20</a:t>
+              <a:t>18</a:t>
             </a:fld>
             <a:endParaRPr lang="en-US"/>
           </a:p>
@@ -12002,7 +10318,7 @@
 </p:sld>
 </file>
 
-<file path=ppt/slides/slide21.xml><?xml version="1.0" encoding="utf-8"?>
+<file path=ppt/slides/slide19.xml><?xml version="1.0" encoding="utf-8"?>
 <p:sld xmlns:a="http://schemas.openxmlformats.org/drawingml/2006/main" xmlns:r="http://schemas.openxmlformats.org/officeDocument/2006/relationships" xmlns:p="http://schemas.openxmlformats.org/presentationml/2006/main">
   <p:cSld>
     <p:spTree>
@@ -12094,7 +10410,7 @@
           <a:p>
             <a:fld id="{C1D4534E-1B22-4A44-850A-B3E8E9EE687A}" type="slidenum">
               <a:rPr lang="en-US" smtClean="0"/>
-              <a:t>21</a:t>
+              <a:t>19</a:t>
             </a:fld>
             <a:endParaRPr lang="en-US"/>
           </a:p>
@@ -12284,7 +10600,7 @@
 </p:sld>
 </file>
 
-<file path=ppt/slides/slide22.xml><?xml version="1.0" encoding="utf-8"?>
+<file path=ppt/slides/slide2.xml><?xml version="1.0" encoding="utf-8"?>
 <p:sld xmlns:a="http://schemas.openxmlformats.org/drawingml/2006/main" xmlns:r="http://schemas.openxmlformats.org/officeDocument/2006/relationships" xmlns:p="http://schemas.openxmlformats.org/presentationml/2006/main">
   <p:cSld>
     <p:spTree>
@@ -12303,6 +10619,124 @@
       </p:grpSpPr>
       <p:sp>
         <p:nvSpPr>
+          <p:cNvPr id="2" name="Title 1"/>
+          <p:cNvSpPr>
+            <a:spLocks noGrp="1"/>
+          </p:cNvSpPr>
+          <p:nvPr>
+            <p:ph type="title"/>
+          </p:nvPr>
+        </p:nvSpPr>
+        <p:spPr/>
+        <p:txBody>
+          <a:bodyPr/>
+          <a:lstStyle/>
+          <a:p>
+            <a:r>
+              <a:rPr lang="en-US" dirty="0"/>
+              <a:t>Learning Outcomes</a:t>
+            </a:r>
+          </a:p>
+        </p:txBody>
+      </p:sp>
+      <p:sp>
+        <p:nvSpPr>
+          <p:cNvPr id="3" name="Content Placeholder 2"/>
+          <p:cNvSpPr>
+            <a:spLocks noGrp="1"/>
+          </p:cNvSpPr>
+          <p:nvPr>
+            <p:ph idx="1"/>
+          </p:nvPr>
+        </p:nvSpPr>
+        <p:spPr/>
+        <p:txBody>
+          <a:bodyPr/>
+          <a:lstStyle/>
+          <a:p>
+            <a:r>
+              <a:rPr lang="en-US" dirty="0"/>
+              <a:t>At the end of this lesson, the student should be able to</a:t>
+            </a:r>
+          </a:p>
+          <a:p>
+            <a:pPr lvl="1"/>
+            <a:r>
+              <a:rPr lang="en-US" dirty="0"/>
+              <a:t>Give examples of S-expressions</a:t>
+            </a:r>
+          </a:p>
+          <a:p>
+            <a:pPr lvl="1"/>
+            <a:r>
+              <a:rPr lang="en-US" dirty="0"/>
+              <a:t>Write the data definition and template for S-expressions</a:t>
+            </a:r>
+          </a:p>
+          <a:p>
+            <a:pPr lvl="1"/>
+            <a:r>
+              <a:rPr lang="en-US" dirty="0"/>
+              <a:t>Write functions on S-expressions using the template</a:t>
+            </a:r>
+          </a:p>
+        </p:txBody>
+      </p:sp>
+      <p:sp>
+        <p:nvSpPr>
+          <p:cNvPr id="4" name="Slide Number Placeholder 3"/>
+          <p:cNvSpPr>
+            <a:spLocks noGrp="1"/>
+          </p:cNvSpPr>
+          <p:nvPr>
+            <p:ph type="sldNum" sz="quarter" idx="12"/>
+          </p:nvPr>
+        </p:nvSpPr>
+        <p:spPr/>
+        <p:txBody>
+          <a:bodyPr/>
+          <a:lstStyle/>
+          <a:p>
+            <a:fld id="{C1D4534E-1B22-4A44-850A-B3E8E9EE687A}" type="slidenum">
+              <a:rPr lang="en-US" smtClean="0"/>
+              <a:t>2</a:t>
+            </a:fld>
+            <a:endParaRPr lang="en-US"/>
+          </a:p>
+        </p:txBody>
+      </p:sp>
+    </p:spTree>
+    <p:extLst>
+      <p:ext uri="{BB962C8B-B14F-4D97-AF65-F5344CB8AC3E}">
+        <p14:creationId xmlns:p14="http://schemas.microsoft.com/office/powerpoint/2010/main" val="2186847188"/>
+      </p:ext>
+    </p:extLst>
+  </p:cSld>
+  <p:clrMapOvr>
+    <a:masterClrMapping/>
+  </p:clrMapOvr>
+</p:sld>
+</file>
+
+<file path=ppt/slides/slide20.xml><?xml version="1.0" encoding="utf-8"?>
+<p:sld xmlns:a="http://schemas.openxmlformats.org/drawingml/2006/main" xmlns:r="http://schemas.openxmlformats.org/officeDocument/2006/relationships" xmlns:p="http://schemas.openxmlformats.org/presentationml/2006/main">
+  <p:cSld>
+    <p:spTree>
+      <p:nvGrpSpPr>
+        <p:cNvPr id="1" name=""/>
+        <p:cNvGrpSpPr/>
+        <p:nvPr/>
+      </p:nvGrpSpPr>
+      <p:grpSpPr>
+        <a:xfrm>
+          <a:off x="0" y="0"/>
+          <a:ext cx="0" cy="0"/>
+          <a:chOff x="0" y="0"/>
+          <a:chExt cx="0" cy="0"/>
+        </a:xfrm>
+      </p:grpSpPr>
+      <p:sp>
+        <p:nvSpPr>
           <p:cNvPr id="6" name="Title 5"/>
           <p:cNvSpPr>
             <a:spLocks noGrp="1"/>
@@ -12404,7 +10838,7 @@
           <a:p>
             <a:fld id="{C1D4534E-1B22-4A44-850A-B3E8E9EE687A}" type="slidenum">
               <a:rPr lang="en-US" smtClean="0"/>
-              <a:t>22</a:t>
+              <a:t>20</a:t>
             </a:fld>
             <a:endParaRPr lang="en-US"/>
           </a:p>
@@ -12514,7 +10948,7 @@
 </p:sld>
 </file>
 
-<file path=ppt/slides/slide23.xml><?xml version="1.0" encoding="utf-8"?>
+<file path=ppt/slides/slide21.xml><?xml version="1.0" encoding="utf-8"?>
 <p:sld xmlns:a="http://schemas.openxmlformats.org/drawingml/2006/main" xmlns:r="http://schemas.openxmlformats.org/officeDocument/2006/relationships" xmlns:p="http://schemas.openxmlformats.org/presentationml/2006/main">
   <p:cSld>
     <p:spTree>
@@ -12747,7 +11181,7 @@
           <a:p>
             <a:fld id="{C1D4534E-1B22-4A44-850A-B3E8E9EE687A}" type="slidenum">
               <a:rPr lang="en-US" smtClean="0"/>
-              <a:t>23</a:t>
+              <a:t>21</a:t>
             </a:fld>
             <a:endParaRPr lang="en-US"/>
           </a:p>
@@ -12766,7 +11200,7 @@
 </p:sld>
 </file>
 
-<file path=ppt/slides/slide24.xml><?xml version="1.0" encoding="utf-8"?>
+<file path=ppt/slides/slide22.xml><?xml version="1.0" encoding="utf-8"?>
 <p:sld xmlns:a="http://schemas.openxmlformats.org/drawingml/2006/main" xmlns:r="http://schemas.openxmlformats.org/officeDocument/2006/relationships" xmlns:p="http://schemas.openxmlformats.org/presentationml/2006/main">
   <p:cSld>
     <p:spTree>
@@ -13161,7 +11595,7 @@
           <a:p>
             <a:fld id="{C1D4534E-1B22-4A44-850A-B3E8E9EE687A}" type="slidenum">
               <a:rPr lang="en-US" smtClean="0"/>
-              <a:t>24</a:t>
+              <a:t>22</a:t>
             </a:fld>
             <a:endParaRPr lang="en-US"/>
           </a:p>
@@ -13532,7 +11966,7 @@
 </p:sld>
 </file>
 
-<file path=ppt/slides/slide25.xml><?xml version="1.0" encoding="utf-8"?>
+<file path=ppt/slides/slide23.xml><?xml version="1.0" encoding="utf-8"?>
 <p:sld xmlns:a="http://schemas.openxmlformats.org/drawingml/2006/main" xmlns:r="http://schemas.openxmlformats.org/officeDocument/2006/relationships" xmlns:p="http://schemas.openxmlformats.org/presentationml/2006/main">
   <p:cSld>
     <p:spTree>
@@ -13767,7 +12201,7 @@
           <a:p>
             <a:fld id="{C1D4534E-1B22-4A44-850A-B3E8E9EE687A}" type="slidenum">
               <a:rPr lang="en-US" smtClean="0"/>
-              <a:t>25</a:t>
+              <a:t>23</a:t>
             </a:fld>
             <a:endParaRPr lang="en-US"/>
           </a:p>
@@ -13867,7 +12301,7 @@
 </p:sld>
 </file>
 
-<file path=ppt/slides/slide26.xml><?xml version="1.0" encoding="utf-8"?>
+<file path=ppt/slides/slide24.xml><?xml version="1.0" encoding="utf-8"?>
 <p:sld xmlns:a="http://schemas.openxmlformats.org/drawingml/2006/main" xmlns:r="http://schemas.openxmlformats.org/officeDocument/2006/relationships" xmlns:p="http://schemas.openxmlformats.org/presentationml/2006/main">
   <p:cSld>
     <p:spTree>
@@ -14262,7 +12696,7 @@
           <a:p>
             <a:fld id="{C1D4534E-1B22-4A44-850A-B3E8E9EE687A}" type="slidenum">
               <a:rPr lang="en-US" smtClean="0"/>
-              <a:t>26</a:t>
+              <a:t>24</a:t>
             </a:fld>
             <a:endParaRPr lang="en-US"/>
           </a:p>
@@ -14471,6 +12905,453 @@
 </p:sld>
 </file>
 
+<file path=ppt/slides/slide25.xml><?xml version="1.0" encoding="utf-8"?>
+<p:sld xmlns:a="http://schemas.openxmlformats.org/drawingml/2006/main" xmlns:r="http://schemas.openxmlformats.org/officeDocument/2006/relationships" xmlns:p="http://schemas.openxmlformats.org/presentationml/2006/main">
+  <p:cSld>
+    <p:spTree>
+      <p:nvGrpSpPr>
+        <p:cNvPr id="1" name=""/>
+        <p:cNvGrpSpPr/>
+        <p:nvPr/>
+      </p:nvGrpSpPr>
+      <p:grpSpPr>
+        <a:xfrm>
+          <a:off x="0" y="0"/>
+          <a:ext cx="0" cy="0"/>
+          <a:chOff x="0" y="0"/>
+          <a:chExt cx="0" cy="0"/>
+        </a:xfrm>
+      </p:grpSpPr>
+      <p:sp>
+        <p:nvSpPr>
+          <p:cNvPr id="2" name="Title 1"/>
+          <p:cNvSpPr>
+            <a:spLocks noGrp="1"/>
+          </p:cNvSpPr>
+          <p:nvPr>
+            <p:ph type="title"/>
+          </p:nvPr>
+        </p:nvSpPr>
+        <p:spPr/>
+        <p:txBody>
+          <a:bodyPr/>
+          <a:lstStyle/>
+          <a:p>
+            <a:r>
+              <a:rPr lang="en-US" dirty="0"/>
+              <a:t>Summary</a:t>
+            </a:r>
+          </a:p>
+        </p:txBody>
+      </p:sp>
+      <p:sp>
+        <p:nvSpPr>
+          <p:cNvPr id="3" name="Content Placeholder 2"/>
+          <p:cNvSpPr>
+            <a:spLocks noGrp="1"/>
+          </p:cNvSpPr>
+          <p:nvPr>
+            <p:ph idx="1"/>
+          </p:nvPr>
+        </p:nvSpPr>
+        <p:spPr/>
+        <p:txBody>
+          <a:bodyPr>
+            <a:normAutofit/>
+          </a:bodyPr>
+          <a:lstStyle/>
+          <a:p>
+            <a:r>
+              <a:rPr lang="en-US" dirty="0"/>
+              <a:t>Nested Lists occur all the time</a:t>
+            </a:r>
+          </a:p>
+          <a:p>
+            <a:r>
+              <a:rPr lang="en-US" dirty="0"/>
+              <a:t>Mutually recursive data definitions</a:t>
+            </a:r>
+          </a:p>
+          <a:p>
+            <a:r>
+              <a:rPr lang="en-US" dirty="0"/>
+              <a:t>Mutual recursion in the data definition leads to mutual recursion in the template</a:t>
+            </a:r>
+          </a:p>
+          <a:p>
+            <a:r>
+              <a:rPr lang="en-US" dirty="0"/>
+              <a:t>Mutual recursion in the template leads to mutual recursion in the code</a:t>
+            </a:r>
+          </a:p>
+        </p:txBody>
+      </p:sp>
+      <p:sp>
+        <p:nvSpPr>
+          <p:cNvPr id="4" name="Slide Number Placeholder 3"/>
+          <p:cNvSpPr>
+            <a:spLocks noGrp="1"/>
+          </p:cNvSpPr>
+          <p:nvPr>
+            <p:ph type="sldNum" sz="quarter" idx="12"/>
+          </p:nvPr>
+        </p:nvSpPr>
+        <p:spPr/>
+        <p:txBody>
+          <a:bodyPr/>
+          <a:lstStyle/>
+          <a:p>
+            <a:fld id="{C1D4534E-1B22-4A44-850A-B3E8E9EE687A}" type="slidenum">
+              <a:rPr lang="en-US" smtClean="0"/>
+              <a:t>25</a:t>
+            </a:fld>
+            <a:endParaRPr lang="en-US"/>
+          </a:p>
+        </p:txBody>
+      </p:sp>
+    </p:spTree>
+    <p:extLst>
+      <p:ext uri="{BB962C8B-B14F-4D97-AF65-F5344CB8AC3E}">
+        <p14:creationId xmlns:p14="http://schemas.microsoft.com/office/powerpoint/2010/main" val="3085036809"/>
+      </p:ext>
+    </p:extLst>
+  </p:cSld>
+  <p:clrMapOvr>
+    <a:masterClrMapping/>
+  </p:clrMapOvr>
+</p:sld>
+</file>
+
+<file path=ppt/slides/slide26.xml><?xml version="1.0" encoding="utf-8"?>
+<p:sld xmlns:a="http://schemas.openxmlformats.org/drawingml/2006/main" xmlns:r="http://schemas.openxmlformats.org/officeDocument/2006/relationships" xmlns:p="http://schemas.openxmlformats.org/presentationml/2006/main">
+  <p:cSld>
+    <p:spTree>
+      <p:nvGrpSpPr>
+        <p:cNvPr id="1" name=""/>
+        <p:cNvGrpSpPr/>
+        <p:nvPr/>
+      </p:nvGrpSpPr>
+      <p:grpSpPr>
+        <a:xfrm>
+          <a:off x="0" y="0"/>
+          <a:ext cx="0" cy="0"/>
+          <a:chOff x="0" y="0"/>
+          <a:chExt cx="0" cy="0"/>
+        </a:xfrm>
+      </p:grpSpPr>
+      <p:sp>
+        <p:nvSpPr>
+          <p:cNvPr id="2" name="Title 1"/>
+          <p:cNvSpPr>
+            <a:spLocks noGrp="1"/>
+          </p:cNvSpPr>
+          <p:nvPr>
+            <p:ph type="title"/>
+          </p:nvPr>
+        </p:nvSpPr>
+        <p:spPr>
+          <a:noFill/>
+        </p:spPr>
+        <p:txBody>
+          <a:bodyPr/>
+          <a:lstStyle/>
+          <a:p>
+            <a:r>
+              <a:rPr lang="en-US" dirty="0"/>
+              <a:t>More Examples</a:t>
+            </a:r>
+          </a:p>
+        </p:txBody>
+      </p:sp>
+      <p:sp>
+        <p:nvSpPr>
+          <p:cNvPr id="3" name="Content Placeholder 2"/>
+          <p:cNvSpPr>
+            <a:spLocks noGrp="1"/>
+          </p:cNvSpPr>
+          <p:nvPr>
+            <p:ph idx="1"/>
+          </p:nvPr>
+        </p:nvSpPr>
+        <p:spPr/>
+        <p:txBody>
+          <a:bodyPr>
+            <a:normAutofit lnSpcReduction="10000"/>
+          </a:bodyPr>
+          <a:lstStyle/>
+          <a:p>
+            <a:pPr>
+              <a:buNone/>
+            </a:pPr>
+            <a:r>
+              <a:rPr lang="en-US" sz="2000" b="1" dirty="0">
+                <a:latin typeface="Consolas" pitchFamily="49" charset="0"/>
+                <a:cs typeface="Consolas" pitchFamily="49" charset="0"/>
+              </a:rPr>
+              <a:t>;; number-of-strings : </a:t>
+            </a:r>
+            <a:r>
+              <a:rPr lang="en-US" sz="2000" b="1" dirty="0" err="1">
+                <a:latin typeface="Consolas" pitchFamily="49" charset="0"/>
+                <a:cs typeface="Consolas" pitchFamily="49" charset="0"/>
+              </a:rPr>
+              <a:t>SoS</a:t>
+            </a:r>
+            <a:r>
+              <a:rPr lang="en-US" sz="2000" b="1" dirty="0">
+                <a:latin typeface="Consolas" pitchFamily="49" charset="0"/>
+                <a:cs typeface="Consolas" pitchFamily="49" charset="0"/>
+              </a:rPr>
+              <a:t> -&gt; Number</a:t>
+            </a:r>
+          </a:p>
+          <a:p>
+            <a:pPr>
+              <a:buNone/>
+            </a:pPr>
+            <a:r>
+              <a:rPr lang="en-US" sz="2000" b="1" dirty="0">
+                <a:latin typeface="Consolas" pitchFamily="49" charset="0"/>
+                <a:cs typeface="Consolas" pitchFamily="49" charset="0"/>
+              </a:rPr>
+              <a:t>;; number-of-strings-in-loss : </a:t>
+            </a:r>
+            <a:r>
+              <a:rPr lang="en-US" sz="2000" b="1" dirty="0" err="1">
+                <a:latin typeface="Consolas" pitchFamily="49" charset="0"/>
+                <a:cs typeface="Consolas" pitchFamily="49" charset="0"/>
+              </a:rPr>
+              <a:t>LoSS</a:t>
+            </a:r>
+            <a:r>
+              <a:rPr lang="en-US" sz="2000" b="1" dirty="0">
+                <a:latin typeface="Consolas" pitchFamily="49" charset="0"/>
+                <a:cs typeface="Consolas" pitchFamily="49" charset="0"/>
+              </a:rPr>
+              <a:t> -&gt; Number</a:t>
+            </a:r>
+          </a:p>
+          <a:p>
+            <a:pPr>
+              <a:buNone/>
+            </a:pPr>
+            <a:r>
+              <a:rPr lang="en-US" sz="2000" b="1" dirty="0">
+                <a:latin typeface="Consolas" pitchFamily="49" charset="0"/>
+                <a:cs typeface="Consolas" pitchFamily="49" charset="0"/>
+              </a:rPr>
+              <a:t>;; returns the number of strings in the given </a:t>
+            </a:r>
+            <a:r>
+              <a:rPr lang="en-US" sz="2000" b="1" dirty="0" err="1">
+                <a:latin typeface="Consolas" pitchFamily="49" charset="0"/>
+                <a:cs typeface="Consolas" pitchFamily="49" charset="0"/>
+              </a:rPr>
+              <a:t>sos</a:t>
+            </a:r>
+            <a:r>
+              <a:rPr lang="en-US" sz="2000" b="1" dirty="0">
+                <a:latin typeface="Consolas" pitchFamily="49" charset="0"/>
+                <a:cs typeface="Consolas" pitchFamily="49" charset="0"/>
+              </a:rPr>
+              <a:t> or loss.</a:t>
+            </a:r>
+          </a:p>
+          <a:p>
+            <a:pPr>
+              <a:buNone/>
+            </a:pPr>
+            <a:endParaRPr lang="en-US" sz="2000" b="1" dirty="0">
+              <a:latin typeface="Consolas" pitchFamily="49" charset="0"/>
+              <a:cs typeface="Consolas" pitchFamily="49" charset="0"/>
+            </a:endParaRPr>
+          </a:p>
+          <a:p>
+            <a:pPr>
+              <a:buNone/>
+            </a:pPr>
+            <a:r>
+              <a:rPr lang="en-US" sz="2000" b="1" dirty="0">
+                <a:latin typeface="Consolas" pitchFamily="49" charset="0"/>
+                <a:cs typeface="Consolas" pitchFamily="49" charset="0"/>
+              </a:rPr>
+              <a:t>;; characters-in : </a:t>
+            </a:r>
+            <a:r>
+              <a:rPr lang="en-US" sz="2000" b="1" dirty="0" err="1">
+                <a:latin typeface="Consolas" pitchFamily="49" charset="0"/>
+                <a:cs typeface="Consolas" pitchFamily="49" charset="0"/>
+              </a:rPr>
+              <a:t>SoS</a:t>
+            </a:r>
+            <a:r>
+              <a:rPr lang="en-US" sz="2000" b="1" dirty="0">
+                <a:latin typeface="Consolas" pitchFamily="49" charset="0"/>
+                <a:cs typeface="Consolas" pitchFamily="49" charset="0"/>
+              </a:rPr>
+              <a:t> -&gt; Number</a:t>
+            </a:r>
+          </a:p>
+          <a:p>
+            <a:pPr>
+              <a:buNone/>
+            </a:pPr>
+            <a:r>
+              <a:rPr lang="en-US" sz="2000" b="1" dirty="0">
+                <a:latin typeface="Consolas" pitchFamily="49" charset="0"/>
+                <a:cs typeface="Consolas" pitchFamily="49" charset="0"/>
+              </a:rPr>
+              <a:t>;; characters-in-loss : </a:t>
+            </a:r>
+            <a:r>
+              <a:rPr lang="en-US" sz="2000" b="1" dirty="0" err="1">
+                <a:latin typeface="Consolas" pitchFamily="49" charset="0"/>
+                <a:cs typeface="Consolas" pitchFamily="49" charset="0"/>
+              </a:rPr>
+              <a:t>LoSS</a:t>
+            </a:r>
+            <a:r>
+              <a:rPr lang="en-US" sz="2000" b="1" dirty="0">
+                <a:latin typeface="Consolas" pitchFamily="49" charset="0"/>
+                <a:cs typeface="Consolas" pitchFamily="49" charset="0"/>
+              </a:rPr>
+              <a:t> -&gt; Number</a:t>
+            </a:r>
+          </a:p>
+          <a:p>
+            <a:pPr>
+              <a:buNone/>
+            </a:pPr>
+            <a:r>
+              <a:rPr lang="en-US" sz="2000" b="1" dirty="0">
+                <a:latin typeface="Consolas" pitchFamily="49" charset="0"/>
+                <a:cs typeface="Consolas" pitchFamily="49" charset="0"/>
+              </a:rPr>
+              <a:t>;; returns the total number of characters in the strings in the given </a:t>
+            </a:r>
+            <a:r>
+              <a:rPr lang="en-US" sz="2000" b="1" dirty="0" err="1">
+                <a:latin typeface="Consolas" pitchFamily="49" charset="0"/>
+                <a:cs typeface="Consolas" pitchFamily="49" charset="0"/>
+              </a:rPr>
+              <a:t>sos</a:t>
+            </a:r>
+            <a:r>
+              <a:rPr lang="en-US" sz="2000" b="1" dirty="0">
+                <a:latin typeface="Consolas" pitchFamily="49" charset="0"/>
+                <a:cs typeface="Consolas" pitchFamily="49" charset="0"/>
+              </a:rPr>
+              <a:t> or loss.</a:t>
+            </a:r>
+          </a:p>
+          <a:p>
+            <a:pPr>
+              <a:buNone/>
+            </a:pPr>
+            <a:endParaRPr lang="en-US" sz="2000" b="1" dirty="0">
+              <a:latin typeface="Consolas" pitchFamily="49" charset="0"/>
+              <a:cs typeface="Consolas" pitchFamily="49" charset="0"/>
+            </a:endParaRPr>
+          </a:p>
+          <a:p>
+            <a:pPr>
+              <a:buNone/>
+            </a:pPr>
+            <a:r>
+              <a:rPr lang="en-US" sz="2000" b="1" dirty="0">
+                <a:latin typeface="Consolas" pitchFamily="49" charset="0"/>
+                <a:cs typeface="Consolas" pitchFamily="49" charset="0"/>
+              </a:rPr>
+              <a:t>;; number-of-sardines : </a:t>
+            </a:r>
+            <a:r>
+              <a:rPr lang="en-US" sz="2000" b="1" dirty="0" err="1">
+                <a:latin typeface="Consolas" pitchFamily="49" charset="0"/>
+                <a:cs typeface="Consolas" pitchFamily="49" charset="0"/>
+              </a:rPr>
+              <a:t>SoSardines</a:t>
+            </a:r>
+            <a:r>
+              <a:rPr lang="en-US" sz="2000" b="1" dirty="0">
+                <a:latin typeface="Consolas" pitchFamily="49" charset="0"/>
+                <a:cs typeface="Consolas" pitchFamily="49" charset="0"/>
+              </a:rPr>
+              <a:t> -&gt; Number</a:t>
+            </a:r>
+          </a:p>
+          <a:p>
+            <a:pPr>
+              <a:buNone/>
+            </a:pPr>
+            <a:r>
+              <a:rPr lang="en-US" sz="2000" b="1" dirty="0">
+                <a:latin typeface="Consolas" pitchFamily="49" charset="0"/>
+                <a:cs typeface="Consolas" pitchFamily="49" charset="0"/>
+              </a:rPr>
+              <a:t>;; returns the total number of sardines in the given </a:t>
+            </a:r>
+            <a:r>
+              <a:rPr lang="en-US" sz="2000" b="1" dirty="0" err="1">
+                <a:latin typeface="Consolas" pitchFamily="49" charset="0"/>
+                <a:cs typeface="Consolas" pitchFamily="49" charset="0"/>
+              </a:rPr>
+              <a:t>SoSardines</a:t>
+            </a:r>
+            <a:r>
+              <a:rPr lang="en-US" sz="2000" b="1" dirty="0">
+                <a:latin typeface="Consolas" pitchFamily="49" charset="0"/>
+                <a:cs typeface="Consolas" pitchFamily="49" charset="0"/>
+              </a:rPr>
+              <a:t>.</a:t>
+            </a:r>
+          </a:p>
+          <a:p>
+            <a:pPr>
+              <a:buNone/>
+            </a:pPr>
+            <a:endParaRPr lang="en-US" sz="2000" b="1" dirty="0">
+              <a:latin typeface="Courier New" pitchFamily="49" charset="0"/>
+              <a:cs typeface="Courier New" pitchFamily="49" charset="0"/>
+            </a:endParaRPr>
+          </a:p>
+        </p:txBody>
+      </p:sp>
+      <p:sp>
+        <p:nvSpPr>
+          <p:cNvPr id="4" name="Slide Number Placeholder 3"/>
+          <p:cNvSpPr>
+            <a:spLocks noGrp="1"/>
+          </p:cNvSpPr>
+          <p:nvPr>
+            <p:ph type="sldNum" sz="quarter" idx="12"/>
+          </p:nvPr>
+        </p:nvSpPr>
+        <p:spPr/>
+        <p:txBody>
+          <a:bodyPr/>
+          <a:lstStyle/>
+          <a:p>
+            <a:fld id="{C1D4534E-1B22-4A44-850A-B3E8E9EE687A}" type="slidenum">
+              <a:rPr lang="en-US" smtClean="0"/>
+              <a:t>26</a:t>
+            </a:fld>
+            <a:endParaRPr lang="en-US"/>
+          </a:p>
+        </p:txBody>
+      </p:sp>
+    </p:spTree>
+    <p:extLst>
+      <p:ext uri="{BB962C8B-B14F-4D97-AF65-F5344CB8AC3E}">
+        <p14:creationId xmlns:p14="http://schemas.microsoft.com/office/powerpoint/2010/main" val="351135100"/>
+      </p:ext>
+    </p:extLst>
+  </p:cSld>
+  <p:clrMapOvr>
+    <a:masterClrMapping/>
+  </p:clrMapOvr>
+</p:sld>
+</file>
+
 <file path=ppt/slides/slide27.xml><?xml version="1.0" encoding="utf-8"?>
 <p:sld xmlns:a="http://schemas.openxmlformats.org/drawingml/2006/main" xmlns:r="http://schemas.openxmlformats.org/officeDocument/2006/relationships" xmlns:p="http://schemas.openxmlformats.org/presentationml/2006/main">
   <p:cSld>
@@ -14529,26 +13410,40 @@
           <a:p>
             <a:r>
               <a:rPr lang="en-US" dirty="0"/>
-              <a:t>Nested Lists occur all the time</a:t>
-            </a:r>
-          </a:p>
-          <a:p>
+              <a:t>You should now be able to:</a:t>
+            </a:r>
+          </a:p>
+          <a:p>
+            <a:pPr lvl="1"/>
             <a:r>
               <a:rPr lang="en-US" dirty="0"/>
-              <a:t>Mutually recursive data definitions</a:t>
-            </a:r>
-          </a:p>
-          <a:p>
+              <a:t>Give examples of S-expressions</a:t>
+            </a:r>
+          </a:p>
+          <a:p>
+            <a:pPr lvl="1"/>
             <a:r>
               <a:rPr lang="en-US" dirty="0"/>
-              <a:t>Mutual recursion in the data definition leads to mutual recursion in the template</a:t>
-            </a:r>
-          </a:p>
-          <a:p>
+              <a:t>Give 3 reasons why S-expressions are important</a:t>
+            </a:r>
+          </a:p>
+          <a:p>
+            <a:pPr lvl="1"/>
             <a:r>
               <a:rPr lang="en-US" dirty="0"/>
-              <a:t>Mutual recursion in the template leads to mutual recursion in the code</a:t>
-            </a:r>
+              <a:t>Write the data definition and template for S-expressions</a:t>
+            </a:r>
+          </a:p>
+          <a:p>
+            <a:pPr lvl="1"/>
+            <a:r>
+              <a:rPr lang="en-US" dirty="0"/>
+              <a:t>Write functions on S-expressions using the template</a:t>
+            </a:r>
+          </a:p>
+          <a:p>
+            <a:pPr lvl="1"/>
+            <a:endParaRPr lang="en-US" dirty="0"/>
           </a:p>
         </p:txBody>
       </p:sp>
@@ -14578,7 +13473,7 @@
     </p:spTree>
     <p:extLst>
       <p:ext uri="{BB962C8B-B14F-4D97-AF65-F5344CB8AC3E}">
-        <p14:creationId xmlns:p14="http://schemas.microsoft.com/office/powerpoint/2010/main" val="3085036809"/>
+        <p14:creationId xmlns:p14="http://schemas.microsoft.com/office/powerpoint/2010/main" val="2281643218"/>
       </p:ext>
     </p:extLst>
   </p:cSld>
@@ -14615,16 +13510,14 @@
             <p:ph type="title"/>
           </p:nvPr>
         </p:nvSpPr>
-        <p:spPr>
-          <a:noFill/>
-        </p:spPr>
+        <p:spPr/>
         <p:txBody>
           <a:bodyPr/>
           <a:lstStyle/>
           <a:p>
             <a:r>
               <a:rPr lang="en-US" dirty="0"/>
-              <a:t>More Examples</a:t>
+              <a:t>Next Steps</a:t>
             </a:r>
           </a:p>
         </p:txBody>
@@ -14641,244 +13534,38 @@
         </p:nvSpPr>
         <p:spPr/>
         <p:txBody>
-          <a:bodyPr>
-            <a:normAutofit lnSpcReduction="10000"/>
-          </a:bodyPr>
-          <a:lstStyle/>
-          <a:p>
-            <a:pPr>
-              <a:buNone/>
-            </a:pPr>
-            <a:r>
-              <a:rPr lang="en-US" sz="2000" b="1" dirty="0">
-                <a:latin typeface="Consolas" pitchFamily="49" charset="0"/>
-                <a:cs typeface="Consolas" pitchFamily="49" charset="0"/>
-              </a:rPr>
-              <a:t>;; number-of-strings : </a:t>
-            </a:r>
-            <a:r>
-              <a:rPr lang="en-US" sz="2000" b="1" dirty="0" err="1">
-                <a:latin typeface="Consolas" pitchFamily="49" charset="0"/>
-                <a:cs typeface="Consolas" pitchFamily="49" charset="0"/>
-              </a:rPr>
-              <a:t>SoS</a:t>
-            </a:r>
-            <a:r>
-              <a:rPr lang="en-US" sz="2000" b="1" dirty="0">
-                <a:latin typeface="Consolas" pitchFamily="49" charset="0"/>
-                <a:cs typeface="Consolas" pitchFamily="49" charset="0"/>
-              </a:rPr>
-              <a:t> -&gt; Number</a:t>
-            </a:r>
-          </a:p>
-          <a:p>
-            <a:pPr>
-              <a:buNone/>
-            </a:pPr>
-            <a:r>
-              <a:rPr lang="en-US" sz="2000" b="1" dirty="0">
-                <a:latin typeface="Consolas" pitchFamily="49" charset="0"/>
-                <a:cs typeface="Consolas" pitchFamily="49" charset="0"/>
-              </a:rPr>
-              <a:t>;; number-of-strings-in-loss : </a:t>
-            </a:r>
-            <a:r>
-              <a:rPr lang="en-US" sz="2000" b="1" dirty="0" err="1">
-                <a:latin typeface="Consolas" pitchFamily="49" charset="0"/>
-                <a:cs typeface="Consolas" pitchFamily="49" charset="0"/>
-              </a:rPr>
-              <a:t>LoSS</a:t>
-            </a:r>
-            <a:r>
-              <a:rPr lang="en-US" sz="2000" b="1" dirty="0">
-                <a:latin typeface="Consolas" pitchFamily="49" charset="0"/>
-                <a:cs typeface="Consolas" pitchFamily="49" charset="0"/>
-              </a:rPr>
-              <a:t> -&gt; Number</a:t>
-            </a:r>
-          </a:p>
-          <a:p>
-            <a:pPr>
-              <a:buNone/>
-            </a:pPr>
-            <a:r>
-              <a:rPr lang="en-US" sz="2000" b="1" dirty="0">
-                <a:latin typeface="Consolas" pitchFamily="49" charset="0"/>
-                <a:cs typeface="Consolas" pitchFamily="49" charset="0"/>
-              </a:rPr>
-              <a:t>;; returns the number of strings in the given </a:t>
-            </a:r>
-            <a:r>
-              <a:rPr lang="en-US" sz="2000" b="1" dirty="0" err="1">
-                <a:latin typeface="Consolas" pitchFamily="49" charset="0"/>
-                <a:cs typeface="Consolas" pitchFamily="49" charset="0"/>
-              </a:rPr>
-              <a:t>sos</a:t>
-            </a:r>
-            <a:r>
-              <a:rPr lang="en-US" sz="2000" b="1" dirty="0">
-                <a:latin typeface="Consolas" pitchFamily="49" charset="0"/>
-                <a:cs typeface="Consolas" pitchFamily="49" charset="0"/>
-              </a:rPr>
-              <a:t> or loss.</a:t>
-            </a:r>
-          </a:p>
-          <a:p>
-            <a:pPr>
-              <a:buNone/>
-            </a:pPr>
-            <a:endParaRPr lang="en-US" sz="2000" b="1" dirty="0">
-              <a:latin typeface="Consolas" pitchFamily="49" charset="0"/>
-              <a:cs typeface="Consolas" pitchFamily="49" charset="0"/>
-            </a:endParaRPr>
-          </a:p>
-          <a:p>
-            <a:pPr>
-              <a:buNone/>
-            </a:pPr>
-            <a:r>
-              <a:rPr lang="en-US" sz="2000" b="1" dirty="0">
-                <a:latin typeface="Consolas" pitchFamily="49" charset="0"/>
-                <a:cs typeface="Consolas" pitchFamily="49" charset="0"/>
-              </a:rPr>
-              <a:t>;; characters-in : </a:t>
-            </a:r>
-            <a:r>
-              <a:rPr lang="en-US" sz="2000" b="1" dirty="0" err="1">
-                <a:latin typeface="Consolas" pitchFamily="49" charset="0"/>
-                <a:cs typeface="Consolas" pitchFamily="49" charset="0"/>
-              </a:rPr>
-              <a:t>SoS</a:t>
-            </a:r>
-            <a:r>
-              <a:rPr lang="en-US" sz="2000" b="1" dirty="0">
-                <a:latin typeface="Consolas" pitchFamily="49" charset="0"/>
-                <a:cs typeface="Consolas" pitchFamily="49" charset="0"/>
-              </a:rPr>
-              <a:t> -&gt; Number</a:t>
-            </a:r>
-          </a:p>
-          <a:p>
-            <a:pPr>
-              <a:buNone/>
-            </a:pPr>
-            <a:r>
-              <a:rPr lang="en-US" sz="2000" b="1" dirty="0">
-                <a:latin typeface="Consolas" pitchFamily="49" charset="0"/>
-                <a:cs typeface="Consolas" pitchFamily="49" charset="0"/>
-              </a:rPr>
-              <a:t>;; characters-in-loss : </a:t>
-            </a:r>
-            <a:r>
-              <a:rPr lang="en-US" sz="2000" b="1" dirty="0" err="1">
-                <a:latin typeface="Consolas" pitchFamily="49" charset="0"/>
-                <a:cs typeface="Consolas" pitchFamily="49" charset="0"/>
-              </a:rPr>
-              <a:t>LoSS</a:t>
-            </a:r>
-            <a:r>
-              <a:rPr lang="en-US" sz="2000" b="1" dirty="0">
-                <a:latin typeface="Consolas" pitchFamily="49" charset="0"/>
-                <a:cs typeface="Consolas" pitchFamily="49" charset="0"/>
-              </a:rPr>
-              <a:t> -&gt; Number</a:t>
-            </a:r>
-          </a:p>
-          <a:p>
-            <a:pPr>
-              <a:buNone/>
-            </a:pPr>
-            <a:r>
-              <a:rPr lang="en-US" sz="2000" b="1" dirty="0">
-                <a:latin typeface="Consolas" pitchFamily="49" charset="0"/>
-                <a:cs typeface="Consolas" pitchFamily="49" charset="0"/>
-              </a:rPr>
-              <a:t>;; returns the total number of characters in the strings in the given </a:t>
-            </a:r>
-            <a:r>
-              <a:rPr lang="en-US" sz="2000" b="1" dirty="0" err="1">
-                <a:latin typeface="Consolas" pitchFamily="49" charset="0"/>
-                <a:cs typeface="Consolas" pitchFamily="49" charset="0"/>
-              </a:rPr>
-              <a:t>sos</a:t>
-            </a:r>
-            <a:r>
-              <a:rPr lang="en-US" sz="2000" b="1" dirty="0">
-                <a:latin typeface="Consolas" pitchFamily="49" charset="0"/>
-                <a:cs typeface="Consolas" pitchFamily="49" charset="0"/>
-              </a:rPr>
-              <a:t> or loss.</a:t>
-            </a:r>
-          </a:p>
-          <a:p>
-            <a:pPr>
-              <a:buNone/>
-            </a:pPr>
-            <a:endParaRPr lang="en-US" sz="2000" b="1" dirty="0">
-              <a:latin typeface="Consolas" pitchFamily="49" charset="0"/>
-              <a:cs typeface="Consolas" pitchFamily="49" charset="0"/>
-            </a:endParaRPr>
-          </a:p>
-          <a:p>
-            <a:pPr>
-              <a:buNone/>
-            </a:pPr>
-            <a:r>
-              <a:rPr lang="en-US" sz="2000" b="1" dirty="0">
-                <a:latin typeface="Consolas" pitchFamily="49" charset="0"/>
-                <a:cs typeface="Consolas" pitchFamily="49" charset="0"/>
-              </a:rPr>
-              <a:t>;; number-of-sardines : </a:t>
-            </a:r>
-            <a:r>
-              <a:rPr lang="en-US" sz="2000" b="1" dirty="0" err="1">
-                <a:latin typeface="Consolas" pitchFamily="49" charset="0"/>
-                <a:cs typeface="Consolas" pitchFamily="49" charset="0"/>
-              </a:rPr>
-              <a:t>SoSardines</a:t>
-            </a:r>
-            <a:r>
-              <a:rPr lang="en-US" sz="2000" b="1" dirty="0">
-                <a:latin typeface="Consolas" pitchFamily="49" charset="0"/>
-                <a:cs typeface="Consolas" pitchFamily="49" charset="0"/>
-              </a:rPr>
-              <a:t> -&gt; Number</a:t>
-            </a:r>
-          </a:p>
-          <a:p>
-            <a:pPr>
-              <a:buNone/>
-            </a:pPr>
-            <a:r>
-              <a:rPr lang="en-US" sz="2000" b="1" dirty="0">
-                <a:latin typeface="Consolas" pitchFamily="49" charset="0"/>
-                <a:cs typeface="Consolas" pitchFamily="49" charset="0"/>
-              </a:rPr>
-              <a:t>;; returns the total number of sardines in the given </a:t>
-            </a:r>
-            <a:r>
-              <a:rPr lang="en-US" sz="2000" b="1" dirty="0" err="1">
-                <a:latin typeface="Consolas" pitchFamily="49" charset="0"/>
-                <a:cs typeface="Consolas" pitchFamily="49" charset="0"/>
-              </a:rPr>
-              <a:t>SoSardines</a:t>
-            </a:r>
-            <a:r>
-              <a:rPr lang="en-US" sz="2000" b="1" dirty="0">
-                <a:latin typeface="Consolas" pitchFamily="49" charset="0"/>
-                <a:cs typeface="Consolas" pitchFamily="49" charset="0"/>
-              </a:rPr>
-              <a:t>.</a:t>
-            </a:r>
-          </a:p>
-          <a:p>
-            <a:pPr>
-              <a:buNone/>
-            </a:pPr>
-            <a:endParaRPr lang="en-US" sz="2000" b="1" dirty="0">
-              <a:latin typeface="Courier New" pitchFamily="49" charset="0"/>
-              <a:cs typeface="Courier New" pitchFamily="49" charset="0"/>
-            </a:endParaRPr>
+          <a:bodyPr/>
+          <a:lstStyle/>
+          <a:p>
+            <a:r>
+              <a:rPr lang="en-US" dirty="0"/>
+              <a:t>Study the files 06-5-sos-derivation.rkt and 06-6-sos-and-loss.rkt in the Examples folder</a:t>
+            </a:r>
+          </a:p>
+          <a:p>
+            <a:r>
+              <a:rPr lang="en-US" dirty="0"/>
+              <a:t>If you have questions about this lesson, ask them on the Discussion Board</a:t>
+            </a:r>
+          </a:p>
+          <a:p>
+            <a:r>
+              <a:rPr lang="en-US" dirty="0"/>
+              <a:t>Do </a:t>
+            </a:r>
+            <a:r>
+              <a:rPr lang="en-US" dirty="0">
+                <a:hlinkClick r:id="rId2" action="ppaction://hlinkfile"/>
+              </a:rPr>
+              <a:t>Guided Practice 6.5</a:t>
+            </a:r>
+            <a:endParaRPr lang="en-US" dirty="0"/>
+          </a:p>
+          <a:p>
+            <a:r>
+              <a:rPr lang="en-US" dirty="0"/>
+              <a:t>Go on to the next lesson</a:t>
+            </a:r>
           </a:p>
         </p:txBody>
       </p:sp>
@@ -14908,138 +13595,7 @@
     </p:spTree>
     <p:extLst>
       <p:ext uri="{BB962C8B-B14F-4D97-AF65-F5344CB8AC3E}">
-        <p14:creationId xmlns:p14="http://schemas.microsoft.com/office/powerpoint/2010/main" val="351135100"/>
-      </p:ext>
-    </p:extLst>
-  </p:cSld>
-  <p:clrMapOvr>
-    <a:masterClrMapping/>
-  </p:clrMapOvr>
-</p:sld>
-</file>
-
-<file path=ppt/slides/slide29.xml><?xml version="1.0" encoding="utf-8"?>
-<p:sld xmlns:a="http://schemas.openxmlformats.org/drawingml/2006/main" xmlns:r="http://schemas.openxmlformats.org/officeDocument/2006/relationships" xmlns:p="http://schemas.openxmlformats.org/presentationml/2006/main">
-  <p:cSld>
-    <p:spTree>
-      <p:nvGrpSpPr>
-        <p:cNvPr id="1" name=""/>
-        <p:cNvGrpSpPr/>
-        <p:nvPr/>
-      </p:nvGrpSpPr>
-      <p:grpSpPr>
-        <a:xfrm>
-          <a:off x="0" y="0"/>
-          <a:ext cx="0" cy="0"/>
-          <a:chOff x="0" y="0"/>
-          <a:chExt cx="0" cy="0"/>
-        </a:xfrm>
-      </p:grpSpPr>
-      <p:sp>
-        <p:nvSpPr>
-          <p:cNvPr id="2" name="Title 1"/>
-          <p:cNvSpPr>
-            <a:spLocks noGrp="1"/>
-          </p:cNvSpPr>
-          <p:nvPr>
-            <p:ph type="title"/>
-          </p:nvPr>
-        </p:nvSpPr>
-        <p:spPr/>
-        <p:txBody>
-          <a:bodyPr/>
-          <a:lstStyle/>
-          <a:p>
-            <a:r>
-              <a:rPr lang="en-US" dirty="0"/>
-              <a:t>Summary</a:t>
-            </a:r>
-          </a:p>
-        </p:txBody>
-      </p:sp>
-      <p:sp>
-        <p:nvSpPr>
-          <p:cNvPr id="3" name="Content Placeholder 2"/>
-          <p:cNvSpPr>
-            <a:spLocks noGrp="1"/>
-          </p:cNvSpPr>
-          <p:nvPr>
-            <p:ph idx="1"/>
-          </p:nvPr>
-        </p:nvSpPr>
-        <p:spPr/>
-        <p:txBody>
-          <a:bodyPr>
-            <a:normAutofit/>
-          </a:bodyPr>
-          <a:lstStyle/>
-          <a:p>
-            <a:r>
-              <a:rPr lang="en-US" dirty="0"/>
-              <a:t>You should now be able to:</a:t>
-            </a:r>
-          </a:p>
-          <a:p>
-            <a:pPr lvl="1"/>
-            <a:r>
-              <a:rPr lang="en-US" dirty="0"/>
-              <a:t>Give examples of S-expressions</a:t>
-            </a:r>
-          </a:p>
-          <a:p>
-            <a:pPr lvl="1"/>
-            <a:r>
-              <a:rPr lang="en-US" dirty="0"/>
-              <a:t>Give 3 reasons why S-expressions are important</a:t>
-            </a:r>
-          </a:p>
-          <a:p>
-            <a:pPr lvl="1"/>
-            <a:r>
-              <a:rPr lang="en-US" dirty="0"/>
-              <a:t>Write the data definition and template for S-expressions</a:t>
-            </a:r>
-          </a:p>
-          <a:p>
-            <a:pPr lvl="1"/>
-            <a:r>
-              <a:rPr lang="en-US" dirty="0"/>
-              <a:t>Write functions on S-expressions using the template</a:t>
-            </a:r>
-          </a:p>
-          <a:p>
-            <a:pPr lvl="1"/>
-            <a:endParaRPr lang="en-US" dirty="0"/>
-          </a:p>
-        </p:txBody>
-      </p:sp>
-      <p:sp>
-        <p:nvSpPr>
-          <p:cNvPr id="4" name="Slide Number Placeholder 3"/>
-          <p:cNvSpPr>
-            <a:spLocks noGrp="1"/>
-          </p:cNvSpPr>
-          <p:nvPr>
-            <p:ph type="sldNum" sz="quarter" idx="12"/>
-          </p:nvPr>
-        </p:nvSpPr>
-        <p:spPr/>
-        <p:txBody>
-          <a:bodyPr/>
-          <a:lstStyle/>
-          <a:p>
-            <a:fld id="{C1D4534E-1B22-4A44-850A-B3E8E9EE687A}" type="slidenum">
-              <a:rPr lang="en-US" smtClean="0"/>
-              <a:t>29</a:t>
-            </a:fld>
-            <a:endParaRPr lang="en-US"/>
-          </a:p>
-        </p:txBody>
-      </p:sp>
-    </p:spTree>
-    <p:extLst>
-      <p:ext uri="{BB962C8B-B14F-4D97-AF65-F5344CB8AC3E}">
-        <p14:creationId xmlns:p14="http://schemas.microsoft.com/office/powerpoint/2010/main" val="2281643218"/>
+        <p14:creationId xmlns:p14="http://schemas.microsoft.com/office/powerpoint/2010/main" val="3025411515"/>
       </p:ext>
     </p:extLst>
   </p:cSld>
@@ -15152,128 +13708,6 @@
     <p:extLst>
       <p:ext uri="{BB962C8B-B14F-4D97-AF65-F5344CB8AC3E}">
         <p14:creationId xmlns:p14="http://schemas.microsoft.com/office/powerpoint/2010/main" val="1646032405"/>
-      </p:ext>
-    </p:extLst>
-  </p:cSld>
-  <p:clrMapOvr>
-    <a:masterClrMapping/>
-  </p:clrMapOvr>
-</p:sld>
-</file>
-
-<file path=ppt/slides/slide30.xml><?xml version="1.0" encoding="utf-8"?>
-<p:sld xmlns:a="http://schemas.openxmlformats.org/drawingml/2006/main" xmlns:r="http://schemas.openxmlformats.org/officeDocument/2006/relationships" xmlns:p="http://schemas.openxmlformats.org/presentationml/2006/main">
-  <p:cSld>
-    <p:spTree>
-      <p:nvGrpSpPr>
-        <p:cNvPr id="1" name=""/>
-        <p:cNvGrpSpPr/>
-        <p:nvPr/>
-      </p:nvGrpSpPr>
-      <p:grpSpPr>
-        <a:xfrm>
-          <a:off x="0" y="0"/>
-          <a:ext cx="0" cy="0"/>
-          <a:chOff x="0" y="0"/>
-          <a:chExt cx="0" cy="0"/>
-        </a:xfrm>
-      </p:grpSpPr>
-      <p:sp>
-        <p:nvSpPr>
-          <p:cNvPr id="2" name="Title 1"/>
-          <p:cNvSpPr>
-            <a:spLocks noGrp="1"/>
-          </p:cNvSpPr>
-          <p:nvPr>
-            <p:ph type="title"/>
-          </p:nvPr>
-        </p:nvSpPr>
-        <p:spPr/>
-        <p:txBody>
-          <a:bodyPr/>
-          <a:lstStyle/>
-          <a:p>
-            <a:r>
-              <a:rPr lang="en-US" dirty="0"/>
-              <a:t>Next Steps</a:t>
-            </a:r>
-          </a:p>
-        </p:txBody>
-      </p:sp>
-      <p:sp>
-        <p:nvSpPr>
-          <p:cNvPr id="3" name="Content Placeholder 2"/>
-          <p:cNvSpPr>
-            <a:spLocks noGrp="1"/>
-          </p:cNvSpPr>
-          <p:nvPr>
-            <p:ph idx="1"/>
-          </p:nvPr>
-        </p:nvSpPr>
-        <p:spPr/>
-        <p:txBody>
-          <a:bodyPr/>
-          <a:lstStyle/>
-          <a:p>
-            <a:r>
-              <a:rPr lang="en-US" dirty="0"/>
-              <a:t>Study the files 06-5-sos-derivation.rkt and 06-6-sos-and-loss.rkt in the Examples folder</a:t>
-            </a:r>
-          </a:p>
-          <a:p>
-            <a:r>
-              <a:rPr lang="en-US" dirty="0"/>
-              <a:t>If you have questions about this lesson, ask them on the Discussion Board</a:t>
-            </a:r>
-          </a:p>
-          <a:p>
-            <a:r>
-              <a:rPr lang="en-US" dirty="0"/>
-              <a:t>Do </a:t>
-            </a:r>
-            <a:r>
-              <a:rPr lang="en-US" dirty="0">
-                <a:hlinkClick r:id="rId2" action="ppaction://hlinkfile"/>
-              </a:rPr>
-              <a:t>Guided Practice 6.5</a:t>
-            </a:r>
-            <a:endParaRPr lang="en-US" dirty="0"/>
-          </a:p>
-          <a:p>
-            <a:r>
-              <a:rPr lang="en-US" dirty="0"/>
-              <a:t>Go on to the next lesson</a:t>
-            </a:r>
-          </a:p>
-        </p:txBody>
-      </p:sp>
-      <p:sp>
-        <p:nvSpPr>
-          <p:cNvPr id="4" name="Slide Number Placeholder 3"/>
-          <p:cNvSpPr>
-            <a:spLocks noGrp="1"/>
-          </p:cNvSpPr>
-          <p:nvPr>
-            <p:ph type="sldNum" sz="quarter" idx="12"/>
-          </p:nvPr>
-        </p:nvSpPr>
-        <p:spPr/>
-        <p:txBody>
-          <a:bodyPr/>
-          <a:lstStyle/>
-          <a:p>
-            <a:fld id="{C1D4534E-1B22-4A44-850A-B3E8E9EE687A}" type="slidenum">
-              <a:rPr lang="en-US" smtClean="0"/>
-              <a:t>30</a:t>
-            </a:fld>
-            <a:endParaRPr lang="en-US"/>
-          </a:p>
-        </p:txBody>
-      </p:sp>
-    </p:spTree>
-    <p:extLst>
-      <p:ext uri="{BB962C8B-B14F-4D97-AF65-F5344CB8AC3E}">
-        <p14:creationId xmlns:p14="http://schemas.microsoft.com/office/powerpoint/2010/main" val="3025411515"/>
       </p:ext>
     </p:extLst>
   </p:cSld>
@@ -17202,7 +15636,7 @@
       </p:grpSpPr>
       <p:sp>
         <p:nvSpPr>
-          <p:cNvPr id="5" name="Title 4"/>
+          <p:cNvPr id="2" name="Title 1"/>
           <p:cNvSpPr>
             <a:spLocks noGrp="1"/>
           </p:cNvSpPr>
@@ -17217,14 +15651,14 @@
           <a:p>
             <a:r>
               <a:rPr lang="en-US" dirty="0"/>
-              <a:t>Elaborating the Data Definition (1)</a:t>
-            </a:r>
-          </a:p>
-        </p:txBody>
-      </p:sp>
-      <p:sp>
-        <p:nvSpPr>
-          <p:cNvPr id="7" name="Content Placeholder 6"/>
+              <a:t>Data Structures</a:t>
+            </a:r>
+          </a:p>
+        </p:txBody>
+      </p:sp>
+      <p:sp>
+        <p:nvSpPr>
+          <p:cNvPr id="3" name="Content Placeholder 2"/>
           <p:cNvSpPr>
             <a:spLocks noGrp="1"/>
           </p:cNvSpPr>
@@ -17234,139 +15668,118 @@
         </p:nvSpPr>
         <p:spPr/>
         <p:txBody>
+          <a:bodyPr>
+            <a:normAutofit/>
+          </a:bodyPr>
+          <a:lstStyle/>
+          <a:p>
+            <a:pPr>
+              <a:buNone/>
+            </a:pPr>
+            <a:r>
+              <a:rPr lang="en-US" b="1" dirty="0">
+                <a:latin typeface="Consolas" pitchFamily="49" charset="0"/>
+                <a:cs typeface="Consolas" pitchFamily="49" charset="0"/>
+              </a:rPr>
+              <a:t>"</a:t>
+            </a:r>
+            <a:r>
+              <a:rPr lang="en-US" b="1" dirty="0" err="1">
+                <a:latin typeface="Consolas" pitchFamily="49" charset="0"/>
+                <a:cs typeface="Consolas" pitchFamily="49" charset="0"/>
+              </a:rPr>
+              <a:t>alice</a:t>
+            </a:r>
+            <a:r>
+              <a:rPr lang="en-US" b="1" dirty="0">
+                <a:latin typeface="Consolas" pitchFamily="49" charset="0"/>
+                <a:cs typeface="Consolas" pitchFamily="49" charset="0"/>
+              </a:rPr>
+              <a:t>"</a:t>
+            </a:r>
+          </a:p>
+          <a:p>
+            <a:pPr>
+              <a:buNone/>
+            </a:pPr>
+            <a:r>
+              <a:rPr lang="en-US" b="1" dirty="0">
+                <a:latin typeface="Consolas" pitchFamily="49" charset="0"/>
+                <a:cs typeface="Consolas" pitchFamily="49" charset="0"/>
+              </a:rPr>
+              <a:t>"bob"</a:t>
+            </a:r>
+          </a:p>
+          <a:p>
+            <a:pPr>
+              <a:buNone/>
+            </a:pPr>
+            <a:r>
+              <a:rPr lang="en-US" b="1" dirty="0">
+                <a:latin typeface="Consolas" pitchFamily="49" charset="0"/>
+                <a:cs typeface="Consolas" pitchFamily="49" charset="0"/>
+              </a:rPr>
+              <a:t>"</a:t>
+            </a:r>
+            <a:r>
+              <a:rPr lang="en-US" b="1" dirty="0" err="1">
+                <a:latin typeface="Consolas" pitchFamily="49" charset="0"/>
+                <a:cs typeface="Consolas" pitchFamily="49" charset="0"/>
+              </a:rPr>
+              <a:t>carole</a:t>
+            </a:r>
+            <a:r>
+              <a:rPr lang="en-US" b="1" dirty="0">
+                <a:latin typeface="Consolas" pitchFamily="49" charset="0"/>
+                <a:cs typeface="Consolas" pitchFamily="49" charset="0"/>
+              </a:rPr>
+              <a:t>"</a:t>
+            </a:r>
+          </a:p>
+          <a:p>
+            <a:pPr>
+              <a:buNone/>
+            </a:pPr>
+            <a:r>
+              <a:rPr lang="en-US" b="1" dirty="0">
+                <a:latin typeface="Consolas" pitchFamily="49" charset="0"/>
+                <a:cs typeface="Consolas" pitchFamily="49" charset="0"/>
+              </a:rPr>
+              <a:t>("</a:t>
+            </a:r>
+            <a:r>
+              <a:rPr lang="en-US" b="1" dirty="0" err="1">
+                <a:latin typeface="Consolas" pitchFamily="49" charset="0"/>
+                <a:cs typeface="Consolas" pitchFamily="49" charset="0"/>
+              </a:rPr>
+              <a:t>alice</a:t>
+            </a:r>
+            <a:r>
+              <a:rPr lang="en-US" b="1" dirty="0">
+                <a:latin typeface="Consolas" pitchFamily="49" charset="0"/>
+                <a:cs typeface="Consolas" pitchFamily="49" charset="0"/>
+              </a:rPr>
+              <a:t>" "bob")</a:t>
+            </a:r>
+          </a:p>
+        </p:txBody>
+      </p:sp>
+      <p:sp>
+        <p:nvSpPr>
+          <p:cNvPr id="18" name="Slide Number Placeholder 17"/>
+          <p:cNvSpPr>
+            <a:spLocks noGrp="1"/>
+          </p:cNvSpPr>
+          <p:nvPr>
+            <p:ph type="sldNum" sz="quarter" idx="12"/>
+          </p:nvPr>
+        </p:nvSpPr>
+        <p:spPr/>
+        <p:txBody>
           <a:bodyPr/>
           <a:lstStyle/>
           <a:p>
-            <a:r>
-              <a:rPr lang="en-US" dirty="0"/>
-              <a:t>Why is </a:t>
-            </a:r>
-            <a:r>
-              <a:rPr lang="en-US" b="1" dirty="0"/>
-              <a:t>(("</a:t>
-            </a:r>
-            <a:r>
-              <a:rPr lang="en-US" b="1" dirty="0" err="1"/>
-              <a:t>alice</a:t>
-            </a:r>
-            <a:r>
-              <a:rPr lang="en-US" b="1" dirty="0"/>
-              <a:t>" "bob") "</a:t>
-            </a:r>
-            <a:r>
-              <a:rPr lang="en-US" b="1" dirty="0" err="1"/>
-              <a:t>carole</a:t>
-            </a:r>
-            <a:r>
-              <a:rPr lang="en-US" b="1" dirty="0"/>
-              <a:t>") </a:t>
-            </a:r>
-            <a:r>
-              <a:rPr lang="en-US" dirty="0"/>
-              <a:t>an </a:t>
-            </a:r>
-            <a:r>
-              <a:rPr lang="en-US" dirty="0" err="1"/>
-              <a:t>SoS</a:t>
-            </a:r>
-            <a:r>
-              <a:rPr lang="en-US" dirty="0"/>
-              <a:t> ? </a:t>
-            </a:r>
-          </a:p>
-          <a:p>
-            <a:r>
-              <a:rPr lang="en-US" dirty="0"/>
-              <a:t>To understand this, let’s write this out in cons notation:</a:t>
-            </a:r>
-          </a:p>
-          <a:p>
-            <a:endParaRPr lang="en-US" dirty="0"/>
-          </a:p>
-          <a:p>
-            <a:pPr marL="0" indent="0">
-              <a:spcBef>
-                <a:spcPts val="0"/>
-              </a:spcBef>
-              <a:buNone/>
-            </a:pPr>
-            <a:r>
-              <a:rPr lang="en-US" sz="2800" b="1" dirty="0">
-                <a:latin typeface="Consolas" panose="020B0609020204030204" pitchFamily="49" charset="0"/>
-              </a:rPr>
-              <a:t>(cons</a:t>
-            </a:r>
-          </a:p>
-          <a:p>
-            <a:pPr marL="0" indent="0">
-              <a:spcBef>
-                <a:spcPts val="0"/>
-              </a:spcBef>
-              <a:buNone/>
-            </a:pPr>
-            <a:r>
-              <a:rPr lang="en-US" sz="2800" b="1" dirty="0">
-                <a:latin typeface="Consolas" panose="020B0609020204030204" pitchFamily="49" charset="0"/>
-              </a:rPr>
-              <a:t> (cons "</a:t>
-            </a:r>
-            <a:r>
-              <a:rPr lang="en-US" sz="2800" b="1" dirty="0" err="1">
-                <a:latin typeface="Consolas" panose="020B0609020204030204" pitchFamily="49" charset="0"/>
-              </a:rPr>
-              <a:t>alice</a:t>
-            </a:r>
-            <a:r>
-              <a:rPr lang="en-US" sz="2800" b="1" dirty="0">
-                <a:latin typeface="Consolas" panose="020B0609020204030204" pitchFamily="49" charset="0"/>
-              </a:rPr>
-              <a:t>" (cons "bob" empty))</a:t>
-            </a:r>
-          </a:p>
-          <a:p>
-            <a:pPr marL="0" indent="0">
-              <a:spcBef>
-                <a:spcPts val="0"/>
-              </a:spcBef>
-              <a:buNone/>
-            </a:pPr>
-            <a:r>
-              <a:rPr lang="en-US" sz="2800" b="1" dirty="0">
-                <a:latin typeface="Consolas" panose="020B0609020204030204" pitchFamily="49" charset="0"/>
-              </a:rPr>
-              <a:t> (cons "</a:t>
-            </a:r>
-            <a:r>
-              <a:rPr lang="en-US" sz="2800" b="1" dirty="0" err="1">
-                <a:latin typeface="Consolas" panose="020B0609020204030204" pitchFamily="49" charset="0"/>
-              </a:rPr>
-              <a:t>carole</a:t>
-            </a:r>
-            <a:r>
-              <a:rPr lang="en-US" sz="2800" b="1" dirty="0">
-                <a:latin typeface="Consolas" panose="020B0609020204030204" pitchFamily="49" charset="0"/>
-              </a:rPr>
-              <a:t>" empty))</a:t>
-            </a:r>
-          </a:p>
-        </p:txBody>
-      </p:sp>
-      <p:sp>
-        <p:nvSpPr>
-          <p:cNvPr id="4" name="Slide Number Placeholder 3"/>
-          <p:cNvSpPr>
-            <a:spLocks noGrp="1"/>
-          </p:cNvSpPr>
-          <p:nvPr>
-            <p:ph type="sldNum" sz="quarter" idx="12"/>
-          </p:nvPr>
-        </p:nvSpPr>
-        <p:spPr/>
-        <p:txBody>
-          <a:bodyPr/>
-          <a:lstStyle/>
-          <a:p>
-            <a:fld id="{2AF3B5EA-18B6-4040-9F78-6052AF49C681}" type="slidenum">
+            <a:fld id="{C1D4534E-1B22-4A44-850A-B3E8E9EE687A}" type="slidenum">
               <a:rPr lang="en-US" smtClean="0"/>
               <a:t>9</a:t>
             </a:fld>
@@ -17374,10 +15787,501 @@
           </a:p>
         </p:txBody>
       </p:sp>
+      <p:grpSp>
+        <p:nvGrpSpPr>
+          <p:cNvPr id="4" name="Group 4"/>
+          <p:cNvGrpSpPr>
+            <a:grpSpLocks/>
+          </p:cNvGrpSpPr>
+          <p:nvPr/>
+        </p:nvGrpSpPr>
+        <p:grpSpPr bwMode="auto">
+          <a:xfrm>
+            <a:off x="3619500" y="4578351"/>
+            <a:ext cx="2933700" cy="1071563"/>
+            <a:chOff x="2493" y="1488"/>
+            <a:chExt cx="1152" cy="675"/>
+          </a:xfrm>
+        </p:grpSpPr>
+        <p:grpSp>
+          <p:nvGrpSpPr>
+            <p:cNvPr id="5" name="Group 5"/>
+            <p:cNvGrpSpPr>
+              <a:grpSpLocks/>
+            </p:cNvGrpSpPr>
+            <p:nvPr/>
+          </p:nvGrpSpPr>
+          <p:grpSpPr bwMode="auto">
+            <a:xfrm>
+              <a:off x="2493" y="1488"/>
+              <a:ext cx="480" cy="192"/>
+              <a:chOff x="1392" y="1536"/>
+              <a:chExt cx="480" cy="192"/>
+            </a:xfrm>
+          </p:grpSpPr>
+          <p:sp>
+            <p:nvSpPr>
+              <p:cNvPr id="15" name="Rectangle 6"/>
+              <p:cNvSpPr>
+                <a:spLocks noChangeArrowheads="1"/>
+              </p:cNvSpPr>
+              <p:nvPr/>
+            </p:nvSpPr>
+            <p:spPr bwMode="auto">
+              <a:xfrm>
+                <a:off x="1392" y="1536"/>
+                <a:ext cx="240" cy="192"/>
+              </a:xfrm>
+              <a:prstGeom prst="rect">
+                <a:avLst/>
+              </a:prstGeom>
+              <a:noFill/>
+              <a:ln w="9525">
+                <a:solidFill>
+                  <a:schemeClr val="tx1"/>
+                </a:solidFill>
+                <a:miter lim="800000"/>
+                <a:headEnd/>
+                <a:tailEnd/>
+              </a:ln>
+              <a:effectLst/>
+            </p:spPr>
+            <p:txBody>
+              <a:bodyPr wrap="none" anchor="ctr"/>
+              <a:lstStyle/>
+              <a:p>
+                <a:endParaRPr lang="en-US"/>
+              </a:p>
+            </p:txBody>
+          </p:sp>
+          <p:sp>
+            <p:nvSpPr>
+              <p:cNvPr id="16" name="Rectangle 7"/>
+              <p:cNvSpPr>
+                <a:spLocks noChangeArrowheads="1"/>
+              </p:cNvSpPr>
+              <p:nvPr/>
+            </p:nvSpPr>
+            <p:spPr bwMode="auto">
+              <a:xfrm>
+                <a:off x="1632" y="1536"/>
+                <a:ext cx="240" cy="192"/>
+              </a:xfrm>
+              <a:prstGeom prst="rect">
+                <a:avLst/>
+              </a:prstGeom>
+              <a:noFill/>
+              <a:ln w="9525">
+                <a:solidFill>
+                  <a:schemeClr val="tx1"/>
+                </a:solidFill>
+                <a:miter lim="800000"/>
+                <a:headEnd/>
+                <a:tailEnd/>
+              </a:ln>
+              <a:effectLst/>
+            </p:spPr>
+            <p:txBody>
+              <a:bodyPr wrap="none" anchor="ctr"/>
+              <a:lstStyle/>
+              <a:p>
+                <a:endParaRPr lang="en-US"/>
+              </a:p>
+            </p:txBody>
+          </p:sp>
+        </p:grpSp>
+        <p:grpSp>
+          <p:nvGrpSpPr>
+            <p:cNvPr id="6" name="Group 8"/>
+            <p:cNvGrpSpPr>
+              <a:grpSpLocks/>
+            </p:cNvGrpSpPr>
+            <p:nvPr/>
+          </p:nvGrpSpPr>
+          <p:grpSpPr bwMode="auto">
+            <a:xfrm>
+              <a:off x="3165" y="1488"/>
+              <a:ext cx="480" cy="192"/>
+              <a:chOff x="1392" y="1536"/>
+              <a:chExt cx="480" cy="192"/>
+            </a:xfrm>
+          </p:grpSpPr>
+          <p:sp>
+            <p:nvSpPr>
+              <p:cNvPr id="13" name="Rectangle 9"/>
+              <p:cNvSpPr>
+                <a:spLocks noChangeArrowheads="1"/>
+              </p:cNvSpPr>
+              <p:nvPr/>
+            </p:nvSpPr>
+            <p:spPr bwMode="auto">
+              <a:xfrm>
+                <a:off x="1392" y="1536"/>
+                <a:ext cx="240" cy="192"/>
+              </a:xfrm>
+              <a:prstGeom prst="rect">
+                <a:avLst/>
+              </a:prstGeom>
+              <a:noFill/>
+              <a:ln w="9525">
+                <a:solidFill>
+                  <a:schemeClr val="tx1"/>
+                </a:solidFill>
+                <a:miter lim="800000"/>
+                <a:headEnd/>
+                <a:tailEnd/>
+              </a:ln>
+              <a:effectLst/>
+            </p:spPr>
+            <p:txBody>
+              <a:bodyPr wrap="none" anchor="ctr"/>
+              <a:lstStyle/>
+              <a:p>
+                <a:endParaRPr lang="en-US"/>
+              </a:p>
+            </p:txBody>
+          </p:sp>
+          <p:sp>
+            <p:nvSpPr>
+              <p:cNvPr id="14" name="Rectangle 10"/>
+              <p:cNvSpPr>
+                <a:spLocks noChangeArrowheads="1"/>
+              </p:cNvSpPr>
+              <p:nvPr/>
+            </p:nvSpPr>
+            <p:spPr bwMode="auto">
+              <a:xfrm>
+                <a:off x="1632" y="1536"/>
+                <a:ext cx="240" cy="192"/>
+              </a:xfrm>
+              <a:prstGeom prst="rect">
+                <a:avLst/>
+              </a:prstGeom>
+              <a:noFill/>
+              <a:ln w="9525">
+                <a:solidFill>
+                  <a:schemeClr val="tx1"/>
+                </a:solidFill>
+                <a:miter lim="800000"/>
+                <a:headEnd/>
+                <a:tailEnd/>
+              </a:ln>
+              <a:effectLst/>
+            </p:spPr>
+            <p:txBody>
+              <a:bodyPr wrap="none" anchor="ctr"/>
+              <a:lstStyle/>
+              <a:p>
+                <a:endParaRPr lang="en-US"/>
+              </a:p>
+            </p:txBody>
+          </p:sp>
+        </p:grpSp>
+        <p:sp>
+          <p:nvSpPr>
+            <p:cNvPr id="7" name="Line 11"/>
+            <p:cNvSpPr>
+              <a:spLocks noChangeShapeType="1"/>
+            </p:cNvSpPr>
+            <p:nvPr/>
+          </p:nvSpPr>
+          <p:spPr bwMode="auto">
+            <a:xfrm>
+              <a:off x="2829" y="1584"/>
+              <a:ext cx="336" cy="0"/>
+            </a:xfrm>
+            <a:prstGeom prst="line">
+              <a:avLst/>
+            </a:prstGeom>
+            <a:noFill/>
+            <a:ln w="9525">
+              <a:solidFill>
+                <a:schemeClr val="tx1"/>
+              </a:solidFill>
+              <a:round/>
+              <a:headEnd/>
+              <a:tailEnd type="triangle" w="med" len="med"/>
+            </a:ln>
+            <a:effectLst/>
+          </p:spPr>
+          <p:txBody>
+            <a:bodyPr wrap="none" anchor="ctr"/>
+            <a:lstStyle/>
+            <a:p>
+              <a:endParaRPr lang="en-US"/>
+            </a:p>
+          </p:txBody>
+        </p:sp>
+        <p:sp>
+          <p:nvSpPr>
+            <p:cNvPr id="8" name="Line 12"/>
+            <p:cNvSpPr>
+              <a:spLocks noChangeShapeType="1"/>
+            </p:cNvSpPr>
+            <p:nvPr/>
+          </p:nvSpPr>
+          <p:spPr bwMode="auto">
+            <a:xfrm>
+              <a:off x="3405" y="1488"/>
+              <a:ext cx="240" cy="192"/>
+            </a:xfrm>
+            <a:prstGeom prst="line">
+              <a:avLst/>
+            </a:prstGeom>
+            <a:noFill/>
+            <a:ln w="9525">
+              <a:solidFill>
+                <a:schemeClr val="tx1"/>
+              </a:solidFill>
+              <a:round/>
+              <a:headEnd/>
+              <a:tailEnd/>
+            </a:ln>
+            <a:effectLst/>
+          </p:spPr>
+          <p:txBody>
+            <a:bodyPr wrap="none" anchor="ctr"/>
+            <a:lstStyle/>
+            <a:p>
+              <a:endParaRPr lang="en-US"/>
+            </a:p>
+          </p:txBody>
+        </p:sp>
+        <p:sp>
+          <p:nvSpPr>
+            <p:cNvPr id="9" name="Line 13"/>
+            <p:cNvSpPr>
+              <a:spLocks noChangeShapeType="1"/>
+            </p:cNvSpPr>
+            <p:nvPr/>
+          </p:nvSpPr>
+          <p:spPr bwMode="auto">
+            <a:xfrm>
+              <a:off x="2589" y="1584"/>
+              <a:ext cx="0" cy="336"/>
+            </a:xfrm>
+            <a:prstGeom prst="line">
+              <a:avLst/>
+            </a:prstGeom>
+            <a:noFill/>
+            <a:ln w="9525">
+              <a:solidFill>
+                <a:schemeClr val="tx1"/>
+              </a:solidFill>
+              <a:round/>
+              <a:headEnd/>
+              <a:tailEnd type="triangle" w="med" len="med"/>
+            </a:ln>
+            <a:effectLst/>
+          </p:spPr>
+          <p:txBody>
+            <a:bodyPr wrap="none" anchor="ctr"/>
+            <a:lstStyle/>
+            <a:p>
+              <a:endParaRPr lang="en-US"/>
+            </a:p>
+          </p:txBody>
+        </p:sp>
+        <p:sp>
+          <p:nvSpPr>
+            <p:cNvPr id="10" name="Line 14"/>
+            <p:cNvSpPr>
+              <a:spLocks noChangeShapeType="1"/>
+            </p:cNvSpPr>
+            <p:nvPr/>
+          </p:nvSpPr>
+          <p:spPr bwMode="auto">
+            <a:xfrm>
+              <a:off x="3261" y="1584"/>
+              <a:ext cx="0" cy="336"/>
+            </a:xfrm>
+            <a:prstGeom prst="line">
+              <a:avLst/>
+            </a:prstGeom>
+            <a:noFill/>
+            <a:ln w="9525">
+              <a:solidFill>
+                <a:schemeClr val="tx1"/>
+              </a:solidFill>
+              <a:round/>
+              <a:headEnd/>
+              <a:tailEnd type="triangle" w="med" len="med"/>
+            </a:ln>
+            <a:effectLst/>
+          </p:spPr>
+          <p:txBody>
+            <a:bodyPr wrap="none" anchor="ctr"/>
+            <a:lstStyle/>
+            <a:p>
+              <a:endParaRPr lang="en-US"/>
+            </a:p>
+          </p:txBody>
+        </p:sp>
+        <p:sp>
+          <p:nvSpPr>
+            <p:cNvPr id="11" name="Text Box 15"/>
+            <p:cNvSpPr txBox="1">
+              <a:spLocks noChangeArrowheads="1"/>
+            </p:cNvSpPr>
+            <p:nvPr/>
+          </p:nvSpPr>
+          <p:spPr bwMode="auto">
+            <a:xfrm>
+              <a:off x="2501" y="1872"/>
+              <a:ext cx="540" cy="291"/>
+            </a:xfrm>
+            <a:prstGeom prst="rect">
+              <a:avLst/>
+            </a:prstGeom>
+            <a:noFill/>
+            <a:ln w="9525">
+              <a:noFill/>
+              <a:miter lim="800000"/>
+              <a:headEnd/>
+              <a:tailEnd/>
+            </a:ln>
+            <a:effectLst/>
+          </p:spPr>
+          <p:txBody>
+            <a:bodyPr wrap="none">
+              <a:spAutoFit/>
+            </a:bodyPr>
+            <a:lstStyle/>
+            <a:p>
+              <a:r>
+                <a:rPr lang="en-US" sz="2400" b="1" dirty="0">
+                  <a:latin typeface="Consolas" pitchFamily="49" charset="0"/>
+                  <a:cs typeface="Consolas" pitchFamily="49" charset="0"/>
+                </a:rPr>
+                <a:t>"</a:t>
+              </a:r>
+              <a:r>
+                <a:rPr lang="en-US" sz="2400" b="1" dirty="0" err="1">
+                  <a:latin typeface="Consolas" pitchFamily="49" charset="0"/>
+                  <a:cs typeface="Consolas" pitchFamily="49" charset="0"/>
+                </a:rPr>
+                <a:t>alice</a:t>
+              </a:r>
+              <a:r>
+                <a:rPr lang="en-US" sz="2400" b="1" dirty="0">
+                  <a:latin typeface="Consolas" pitchFamily="49" charset="0"/>
+                  <a:cs typeface="Consolas" pitchFamily="49" charset="0"/>
+                </a:rPr>
+                <a:t>"</a:t>
+              </a:r>
+              <a:endParaRPr lang="en-US" sz="2400" b="1" i="0" dirty="0">
+                <a:latin typeface="Consolas" pitchFamily="49" charset="0"/>
+                <a:cs typeface="Consolas" pitchFamily="49" charset="0"/>
+              </a:endParaRPr>
+            </a:p>
+          </p:txBody>
+        </p:sp>
+        <p:sp>
+          <p:nvSpPr>
+            <p:cNvPr id="12" name="Text Box 16"/>
+            <p:cNvSpPr txBox="1">
+              <a:spLocks noChangeArrowheads="1"/>
+            </p:cNvSpPr>
+            <p:nvPr/>
+          </p:nvSpPr>
+          <p:spPr bwMode="auto">
+            <a:xfrm>
+              <a:off x="3161" y="1872"/>
+              <a:ext cx="406" cy="291"/>
+            </a:xfrm>
+            <a:prstGeom prst="rect">
+              <a:avLst/>
+            </a:prstGeom>
+            <a:noFill/>
+            <a:ln w="9525">
+              <a:noFill/>
+              <a:miter lim="800000"/>
+              <a:headEnd/>
+              <a:tailEnd/>
+            </a:ln>
+            <a:effectLst/>
+          </p:spPr>
+          <p:txBody>
+            <a:bodyPr wrap="none">
+              <a:spAutoFit/>
+            </a:bodyPr>
+            <a:lstStyle/>
+            <a:p>
+              <a:r>
+                <a:rPr lang="en-US" sz="2400" b="1" i="0" dirty="0">
+                  <a:latin typeface="Consolas" pitchFamily="49" charset="0"/>
+                  <a:cs typeface="Consolas" pitchFamily="49" charset="0"/>
+                </a:rPr>
+                <a:t>"bob"</a:t>
+              </a:r>
+            </a:p>
+          </p:txBody>
+        </p:sp>
+      </p:grpSp>
+      <p:sp>
+        <p:nvSpPr>
+          <p:cNvPr id="17" name="Rectangle 16"/>
+          <p:cNvSpPr/>
+          <p:nvPr/>
+        </p:nvSpPr>
+        <p:spPr>
+          <a:xfrm>
+            <a:off x="5410200" y="1676400"/>
+            <a:ext cx="3581400" cy="914400"/>
+          </a:xfrm>
+          <a:prstGeom prst="rect">
+            <a:avLst/>
+          </a:prstGeom>
+          <a:solidFill>
+            <a:schemeClr val="accent3">
+              <a:lumMod val="40000"/>
+              <a:lumOff val="60000"/>
+            </a:schemeClr>
+          </a:solidFill>
+          <a:ln/>
+        </p:spPr>
+        <p:style>
+          <a:lnRef idx="2">
+            <a:schemeClr val="accent1"/>
+          </a:lnRef>
+          <a:fillRef idx="1">
+            <a:schemeClr val="lt1"/>
+          </a:fillRef>
+          <a:effectRef idx="0">
+            <a:schemeClr val="accent1"/>
+          </a:effectRef>
+          <a:fontRef idx="minor">
+            <a:schemeClr val="dk1"/>
+          </a:fontRef>
+        </p:style>
+        <p:txBody>
+          <a:bodyPr rot="0" spcFirstLastPara="0" vertOverflow="overflow" horzOverflow="overflow" vert="horz" wrap="square" lIns="91440" tIns="45720" rIns="91440" bIns="45720" numCol="1" spcCol="0" rtlCol="0" fromWordArt="0" anchor="ctr" anchorCtr="0" forceAA="0" compatLnSpc="1">
+            <a:prstTxWarp prst="textNoShape">
+              <a:avLst/>
+            </a:prstTxWarp>
+            <a:noAutofit/>
+          </a:bodyPr>
+          <a:lstStyle/>
+          <a:p>
+            <a:pPr>
+              <a:defRPr/>
+            </a:pPr>
+            <a:r>
+              <a:rPr lang="en-US" dirty="0">
+                <a:solidFill>
+                  <a:schemeClr val="tx1"/>
+                </a:solidFill>
+              </a:rPr>
+              <a:t>A list of S-expressions is implemented as a singly-linked list.  Here is an example.</a:t>
+            </a:r>
+            <a:endParaRPr lang="en-US" dirty="0"/>
+          </a:p>
+        </p:txBody>
+      </p:sp>
     </p:spTree>
     <p:extLst>
       <p:ext uri="{BB962C8B-B14F-4D97-AF65-F5344CB8AC3E}">
-        <p14:creationId xmlns:p14="http://schemas.microsoft.com/office/powerpoint/2010/main" val="3951734049"/>
+        <p14:creationId xmlns:p14="http://schemas.microsoft.com/office/powerpoint/2010/main" val="3808444269"/>
       </p:ext>
     </p:extLst>
   </p:cSld>

</xml_diff>